<commit_message>
Right version (wel op save gedrukt)
</commit_message>
<xml_diff>
--- a/Architectuurcontext - Sarphati.pptx
+++ b/Architectuurcontext - Sarphati.pptx
@@ -18,11 +18,6 @@
     <p:sldId id="262" r:id="rId11"/>
     <p:sldId id="263" r:id="rId12"/>
     <p:sldId id="264" r:id="rId13"/>
-    <p:sldId id="265" r:id="rId14"/>
-    <p:sldId id="266" r:id="rId15"/>
-    <p:sldId id="267" r:id="rId16"/>
-    <p:sldId id="268" r:id="rId17"/>
-    <p:sldId id="269" r:id="rId18"/>
   </p:sldIdLst>
   <p:sldSz cx="9144000" cy="6858000"/>
   <p:notesSz cx="6858000" cy="9144000"/>
@@ -270,7 +265,7 @@
           <a:bodyPr lIns="0" rIns="0" tIns="0" bIns="0" anchor="b"/>
           <a:p>
             <a:pPr algn="r"/>
-            <a:fld id="{CDC6044C-C819-4D6A-BC9A-055359092516}" type="slidenum">
+            <a:fld id="{4573929D-845E-4890-99AB-E2791A47079D}" type="slidenum">
               <a:rPr b="0" lang="nl-NL" sz="1400" spc="-1" strike="noStrike">
                 <a:solidFill>
                   <a:srgbClr val="000000"/>
@@ -323,7 +318,7 @@
       </p:grpSpPr>
       <p:sp>
         <p:nvSpPr>
-          <p:cNvPr id="147" name="PlaceHolder 1"/>
+          <p:cNvPr id="135" name="PlaceHolder 1"/>
           <p:cNvSpPr>
             <a:spLocks noGrp="1"/>
           </p:cNvSpPr>
@@ -386,7 +381,7 @@
       </p:sp>
       <p:sp>
         <p:nvSpPr>
-          <p:cNvPr id="148" name="CustomShape 2"/>
+          <p:cNvPr id="136" name="CustomShape 2"/>
           <p:cNvSpPr/>
           <p:nvPr/>
         </p:nvSpPr>
@@ -417,7 +412,7 @@
                 <a:spcPct val="100000"/>
               </a:lnSpc>
             </a:pPr>
-            <a:fld id="{D2E37B0F-A016-4C3E-A142-E918C88874BB}" type="slidenum">
+            <a:fld id="{5D8EA832-DF6E-4251-B309-76DCEEC38E9E}" type="slidenum">
               <a:rPr b="0" lang="nl-NL" sz="1200" spc="-1" strike="noStrike">
                 <a:solidFill>
                   <a:srgbClr val="000000"/>
@@ -470,7 +465,7 @@
       </p:grpSpPr>
       <p:sp>
         <p:nvSpPr>
-          <p:cNvPr id="149" name="PlaceHolder 1"/>
+          <p:cNvPr id="137" name="PlaceHolder 1"/>
           <p:cNvSpPr>
             <a:spLocks noGrp="1"/>
           </p:cNvSpPr>
@@ -533,7 +528,7 @@
       </p:sp>
       <p:sp>
         <p:nvSpPr>
-          <p:cNvPr id="150" name="CustomShape 2"/>
+          <p:cNvPr id="138" name="CustomShape 2"/>
           <p:cNvSpPr/>
           <p:nvPr/>
         </p:nvSpPr>
@@ -564,7 +559,7 @@
                 <a:spcPct val="100000"/>
               </a:lnSpc>
             </a:pPr>
-            <a:fld id="{5CE55980-2396-4B99-BD23-CE6249359719}" type="slidenum">
+            <a:fld id="{642CE97F-7E4B-4033-A708-8CFD4DFAC15F}" type="slidenum">
               <a:rPr b="0" lang="nl-NL" sz="1200" spc="-1" strike="noStrike">
                 <a:solidFill>
                   <a:srgbClr val="000000"/>
@@ -617,7 +612,7 @@
       </p:grpSpPr>
       <p:sp>
         <p:nvSpPr>
-          <p:cNvPr id="151" name="PlaceHolder 1"/>
+          <p:cNvPr id="139" name="PlaceHolder 1"/>
           <p:cNvSpPr>
             <a:spLocks noGrp="1"/>
           </p:cNvSpPr>
@@ -680,7 +675,7 @@
       </p:sp>
       <p:sp>
         <p:nvSpPr>
-          <p:cNvPr id="152" name="CustomShape 2"/>
+          <p:cNvPr id="140" name="CustomShape 2"/>
           <p:cNvSpPr/>
           <p:nvPr/>
         </p:nvSpPr>
@@ -711,7 +706,7 @@
                 <a:spcPct val="100000"/>
               </a:lnSpc>
             </a:pPr>
-            <a:fld id="{ED63D8E5-E708-4DFE-B4E4-DCA3A4562DFF}" type="slidenum">
+            <a:fld id="{483C5B34-DCE1-48D7-A8BF-19B1A2E8B394}" type="slidenum">
               <a:rPr b="0" lang="nl-NL" sz="1200" spc="-1" strike="noStrike">
                 <a:solidFill>
                   <a:srgbClr val="000000"/>
@@ -764,7 +759,7 @@
       </p:grpSpPr>
       <p:sp>
         <p:nvSpPr>
-          <p:cNvPr id="153" name="PlaceHolder 1"/>
+          <p:cNvPr id="141" name="PlaceHolder 1"/>
           <p:cNvSpPr>
             <a:spLocks noGrp="1"/>
           </p:cNvSpPr>
@@ -827,7 +822,7 @@
       </p:sp>
       <p:sp>
         <p:nvSpPr>
-          <p:cNvPr id="154" name="CustomShape 2"/>
+          <p:cNvPr id="142" name="CustomShape 2"/>
           <p:cNvSpPr/>
           <p:nvPr/>
         </p:nvSpPr>
@@ -858,7 +853,7 @@
                 <a:spcPct val="100000"/>
               </a:lnSpc>
             </a:pPr>
-            <a:fld id="{8697A2D5-B400-4318-A56E-60E839EAA50A}" type="slidenum">
+            <a:fld id="{F080FA0A-2010-470A-ABCB-8D1BDB30B438}" type="slidenum">
               <a:rPr b="0" lang="nl-NL" sz="1200" spc="-1" strike="noStrike">
                 <a:solidFill>
                   <a:srgbClr val="000000"/>
@@ -911,7 +906,7 @@
       </p:grpSpPr>
       <p:sp>
         <p:nvSpPr>
-          <p:cNvPr id="155" name="PlaceHolder 1"/>
+          <p:cNvPr id="143" name="PlaceHolder 1"/>
           <p:cNvSpPr>
             <a:spLocks noGrp="1"/>
           </p:cNvSpPr>
@@ -945,20 +940,20 @@
               </a:rPr>
               <a:t>Speelt de ombudsman nog een actieve noemenswaardige rol in deze situatie of alleen bij uitzondering?</a:t>
             </a:r>
-            <a:endParaRPr b="0" lang="nl-NL" sz="2000" spc="-1" strike="noStrike">
-              <a:solidFill>
-                <a:srgbClr val="000000"/>
-              </a:solidFill>
-              <a:uFill>
-                <a:solidFill>
-                  <a:srgbClr val="ffffff"/>
-                </a:solidFill>
-              </a:uFill>
-              <a:latin typeface="Arial"/>
-            </a:endParaRPr>
-          </a:p>
-          <a:p>
-            <a:endParaRPr b="0" lang="nl-NL" sz="2000" spc="-1" strike="noStrike">
+            <a:endParaRPr b="0" lang="nl-NL" sz="1800" spc="-1" strike="noStrike">
+              <a:solidFill>
+                <a:srgbClr val="000000"/>
+              </a:solidFill>
+              <a:uFill>
+                <a:solidFill>
+                  <a:srgbClr val="ffffff"/>
+                </a:solidFill>
+              </a:uFill>
+              <a:latin typeface="Arial"/>
+            </a:endParaRPr>
+          </a:p>
+          <a:p>
+            <a:endParaRPr b="0" lang="nl-NL" sz="1800" spc="-1" strike="noStrike">
               <a:solidFill>
                 <a:srgbClr val="000000"/>
               </a:solidFill>
@@ -974,7 +969,7 @@
       </p:sp>
       <p:sp>
         <p:nvSpPr>
-          <p:cNvPr id="156" name="CustomShape 2"/>
+          <p:cNvPr id="144" name="CustomShape 2"/>
           <p:cNvSpPr/>
           <p:nvPr/>
         </p:nvSpPr>
@@ -1005,7 +1000,154 @@
                 <a:spcPct val="100000"/>
               </a:lnSpc>
             </a:pPr>
-            <a:fld id="{5F63FCE0-7FB5-460D-B999-D1CCC517967C}" type="slidenum">
+            <a:fld id="{F44574FA-4CFC-4F0E-A9A8-BB114942B73C}" type="slidenum">
+              <a:rPr b="0" lang="nl-NL" sz="1200" spc="-1" strike="noStrike">
+                <a:solidFill>
+                  <a:srgbClr val="000000"/>
+                </a:solidFill>
+                <a:uFill>
+                  <a:solidFill>
+                    <a:srgbClr val="ffffff"/>
+                  </a:solidFill>
+                </a:uFill>
+                <a:latin typeface="+mn-lt"/>
+                <a:ea typeface="+mn-ea"/>
+              </a:rPr>
+              <a:t>&lt;getal&gt;</a:t>
+            </a:fld>
+            <a:endParaRPr b="0" lang="nl-NL" sz="1800" spc="-1" strike="noStrike">
+              <a:solidFill>
+                <a:srgbClr val="000000"/>
+              </a:solidFill>
+              <a:uFill>
+                <a:solidFill>
+                  <a:srgbClr val="ffffff"/>
+                </a:solidFill>
+              </a:uFill>
+              <a:latin typeface="Arial"/>
+            </a:endParaRPr>
+          </a:p>
+        </p:txBody>
+      </p:sp>
+    </p:spTree>
+  </p:cSld>
+</p:notes>
+</file>
+
+<file path=ppt/notesSlides/notesSlide9.xml><?xml version="1.0" encoding="utf-8"?>
+<p:notes xmlns:a="http://schemas.openxmlformats.org/drawingml/2006/main" xmlns:p="http://schemas.openxmlformats.org/presentationml/2006/main" xmlns:r="http://schemas.openxmlformats.org/officeDocument/2006/relationships" xmlns:p14="http://schemas.microsoft.com/office/powerpoint/2010/main" xmlns:p15="http://schemas.microsoft.com/office/powerpoint/2012/main" xmlns:mc="http://schemas.openxmlformats.org/markup-compatibility/2006">
+  <p:cSld>
+    <p:spTree>
+      <p:nvGrpSpPr>
+        <p:cNvPr id="1" name=""/>
+        <p:cNvGrpSpPr/>
+        <p:nvPr/>
+      </p:nvGrpSpPr>
+      <p:grpSpPr>
+        <a:xfrm>
+          <a:off x="0" y="0"/>
+          <a:ext cx="0" cy="0"/>
+          <a:chOff x="0" y="0"/>
+          <a:chExt cx="0" cy="0"/>
+        </a:xfrm>
+      </p:grpSpPr>
+      <p:sp>
+        <p:nvSpPr>
+          <p:cNvPr id="145" name="PlaceHolder 1"/>
+          <p:cNvSpPr>
+            <a:spLocks noGrp="1"/>
+          </p:cNvSpPr>
+          <p:nvPr>
+            <p:ph type="body"/>
+          </p:nvPr>
+        </p:nvSpPr>
+        <p:spPr>
+          <a:xfrm>
+            <a:off x="685800" y="4343400"/>
+            <a:ext cx="5485680" cy="4114080"/>
+          </a:xfrm>
+          <a:prstGeom prst="rect">
+            <a:avLst/>
+          </a:prstGeom>
+        </p:spPr>
+        <p:txBody>
+          <a:bodyPr lIns="0" rIns="0" tIns="0" bIns="0"/>
+          <a:p>
+            <a:r>
+              <a:rPr b="0" lang="nl-NL" sz="2000" spc="-1" strike="noStrike">
+                <a:solidFill>
+                  <a:srgbClr val="000000"/>
+                </a:solidFill>
+                <a:uFill>
+                  <a:solidFill>
+                    <a:srgbClr val="ffffff"/>
+                  </a:solidFill>
+                </a:uFill>
+                <a:latin typeface="Arial"/>
+              </a:rPr>
+              <a:t>Speelt de ombudsman nog een actieve noemenswaardige rol in deze situatie of alleen bij uitzondering?</a:t>
+            </a:r>
+            <a:endParaRPr b="0" lang="nl-NL" sz="1800" spc="-1" strike="noStrike">
+              <a:solidFill>
+                <a:srgbClr val="000000"/>
+              </a:solidFill>
+              <a:uFill>
+                <a:solidFill>
+                  <a:srgbClr val="ffffff"/>
+                </a:solidFill>
+              </a:uFill>
+              <a:latin typeface="Arial"/>
+            </a:endParaRPr>
+          </a:p>
+          <a:p>
+            <a:endParaRPr b="0" lang="nl-NL" sz="1800" spc="-1" strike="noStrike">
+              <a:solidFill>
+                <a:srgbClr val="000000"/>
+              </a:solidFill>
+              <a:uFill>
+                <a:solidFill>
+                  <a:srgbClr val="ffffff"/>
+                </a:solidFill>
+              </a:uFill>
+              <a:latin typeface="Arial"/>
+            </a:endParaRPr>
+          </a:p>
+        </p:txBody>
+      </p:sp>
+      <p:sp>
+        <p:nvSpPr>
+          <p:cNvPr id="146" name="CustomShape 2"/>
+          <p:cNvSpPr/>
+          <p:nvPr/>
+        </p:nvSpPr>
+        <p:spPr>
+          <a:xfrm>
+            <a:off x="3884760" y="8685360"/>
+            <a:ext cx="2971080" cy="456480"/>
+          </a:xfrm>
+          <a:prstGeom prst="rect">
+            <a:avLst/>
+          </a:prstGeom>
+          <a:noFill/>
+          <a:ln>
+            <a:noFill/>
+          </a:ln>
+        </p:spPr>
+        <p:style>
+          <a:lnRef idx="0"/>
+          <a:fillRef idx="0"/>
+          <a:effectRef idx="0"/>
+          <a:fontRef idx="minor"/>
+        </p:style>
+        <p:txBody>
+          <a:bodyPr lIns="90000" rIns="90000" tIns="45000" bIns="45000" anchor="b"/>
+          <a:p>
+            <a:pPr algn="r">
+              <a:lnSpc>
+                <a:spcPct val="100000"/>
+              </a:lnSpc>
+            </a:pPr>
+            <a:fld id="{4D717EC1-302F-4453-B16D-3E049C7AD827}" type="slidenum">
               <a:rPr b="0" lang="nl-NL" sz="1200" spc="-1" strike="noStrike">
                 <a:solidFill>
                   <a:srgbClr val="000000"/>
@@ -8840,674 +8982,6 @@
 </p:sld>
 </file>
 
-<file path=ppt/slides/slide10.xml><?xml version="1.0" encoding="utf-8"?>
-<p:sld xmlns:a="http://schemas.openxmlformats.org/drawingml/2006/main" xmlns:p="http://schemas.openxmlformats.org/presentationml/2006/main" xmlns:r="http://schemas.openxmlformats.org/officeDocument/2006/relationships" xmlns:p14="http://schemas.microsoft.com/office/powerpoint/2010/main" xmlns:p15="http://schemas.microsoft.com/office/powerpoint/2012/main" xmlns:mc="http://schemas.openxmlformats.org/markup-compatibility/2006">
-  <p:cSld>
-    <p:spTree>
-      <p:nvGrpSpPr>
-        <p:cNvPr id="1" name=""/>
-        <p:cNvGrpSpPr/>
-        <p:nvPr/>
-      </p:nvGrpSpPr>
-      <p:grpSpPr>
-        <a:xfrm>
-          <a:off x="0" y="0"/>
-          <a:ext cx="0" cy="0"/>
-          <a:chOff x="0" y="0"/>
-          <a:chExt cx="0" cy="0"/>
-        </a:xfrm>
-      </p:grpSpPr>
-      <p:sp>
-        <p:nvSpPr>
-          <p:cNvPr id="137" name="CustomShape 1"/>
-          <p:cNvSpPr/>
-          <p:nvPr/>
-        </p:nvSpPr>
-        <p:spPr>
-          <a:xfrm>
-            <a:off x="781920" y="692640"/>
-            <a:ext cx="7595280" cy="1142280"/>
-          </a:xfrm>
-          <a:prstGeom prst="rect">
-            <a:avLst/>
-          </a:prstGeom>
-          <a:noFill/>
-          <a:ln>
-            <a:noFill/>
-          </a:ln>
-        </p:spPr>
-        <p:style>
-          <a:lnRef idx="0"/>
-          <a:fillRef idx="0"/>
-          <a:effectRef idx="0"/>
-          <a:fontRef idx="minor"/>
-        </p:style>
-        <p:txBody>
-          <a:bodyPr lIns="0" rIns="0" tIns="0" bIns="0"/>
-          <a:p>
-            <a:pPr>
-              <a:lnSpc>
-                <a:spcPct val="100000"/>
-              </a:lnSpc>
-            </a:pPr>
-            <a:r>
-              <a:rPr b="1" lang="nl-NL" sz="3500" spc="-1" strike="noStrike">
-                <a:solidFill>
-                  <a:srgbClr val="ff0000"/>
-                </a:solidFill>
-                <a:uFill>
-                  <a:solidFill>
-                    <a:srgbClr val="ffffff"/>
-                  </a:solidFill>
-                </a:uFill>
-                <a:latin typeface="Corbel"/>
-              </a:rPr>
-              <a:t>Optie SuwiMail</a:t>
-            </a:r>
-            <a:endParaRPr b="0" lang="nl-NL" sz="1800" spc="-1" strike="noStrike">
-              <a:solidFill>
-                <a:srgbClr val="000000"/>
-              </a:solidFill>
-              <a:uFill>
-                <a:solidFill>
-                  <a:srgbClr val="ffffff"/>
-                </a:solidFill>
-              </a:uFill>
-              <a:latin typeface="Arial"/>
-            </a:endParaRPr>
-          </a:p>
-        </p:txBody>
-      </p:sp>
-      <p:pic>
-        <p:nvPicPr>
-          <p:cNvPr id="138" name="Tijdelijke aanduiding voor inhoud 3" descr=""/>
-          <p:cNvPicPr/>
-          <p:nvPr/>
-        </p:nvPicPr>
-        <p:blipFill>
-          <a:blip r:embed="rId1"/>
-          <a:stretch/>
-        </p:blipFill>
-        <p:spPr>
-          <a:xfrm>
-            <a:off x="1115640" y="1190160"/>
-            <a:ext cx="6840000" cy="5662080"/>
-          </a:xfrm>
-          <a:prstGeom prst="rect">
-            <a:avLst/>
-          </a:prstGeom>
-          <a:ln>
-            <a:noFill/>
-          </a:ln>
-        </p:spPr>
-      </p:pic>
-    </p:spTree>
-  </p:cSld>
-  <p:timing>
-    <p:tnLst>
-      <p:par>
-        <p:cTn id="19" dur="indefinite" restart="never" nodeType="tmRoot">
-          <p:childTnLst>
-            <p:seq>
-              <p:cTn id="20" nodeType="mainSeq"/>
-              <p:prevCondLst>
-                <p:cond delay="0" evt="onPrev">
-                  <p:tgtEl>
-                    <p:sldTgt/>
-                  </p:tgtEl>
-                </p:cond>
-              </p:prevCondLst>
-              <p:nextCondLst>
-                <p:cond delay="0" evt="onNext">
-                  <p:tgtEl>
-                    <p:sldTgt/>
-                  </p:tgtEl>
-                </p:cond>
-              </p:nextCondLst>
-            </p:seq>
-          </p:childTnLst>
-        </p:cTn>
-      </p:par>
-    </p:tnLst>
-  </p:timing>
-</p:sld>
-</file>
-
-<file path=ppt/slides/slide11.xml><?xml version="1.0" encoding="utf-8"?>
-<p:sld xmlns:a="http://schemas.openxmlformats.org/drawingml/2006/main" xmlns:p="http://schemas.openxmlformats.org/presentationml/2006/main" xmlns:r="http://schemas.openxmlformats.org/officeDocument/2006/relationships" xmlns:p14="http://schemas.microsoft.com/office/powerpoint/2010/main" xmlns:p15="http://schemas.microsoft.com/office/powerpoint/2012/main" xmlns:mc="http://schemas.openxmlformats.org/markup-compatibility/2006">
-  <p:cSld>
-    <p:spTree>
-      <p:nvGrpSpPr>
-        <p:cNvPr id="1" name=""/>
-        <p:cNvGrpSpPr/>
-        <p:nvPr/>
-      </p:nvGrpSpPr>
-      <p:grpSpPr>
-        <a:xfrm>
-          <a:off x="0" y="0"/>
-          <a:ext cx="0" cy="0"/>
-          <a:chOff x="0" y="0"/>
-          <a:chExt cx="0" cy="0"/>
-        </a:xfrm>
-      </p:grpSpPr>
-      <p:sp>
-        <p:nvSpPr>
-          <p:cNvPr id="139" name="CustomShape 1"/>
-          <p:cNvSpPr/>
-          <p:nvPr/>
-        </p:nvSpPr>
-        <p:spPr>
-          <a:xfrm>
-            <a:off x="781920" y="620640"/>
-            <a:ext cx="7595280" cy="1142280"/>
-          </a:xfrm>
-          <a:prstGeom prst="rect">
-            <a:avLst/>
-          </a:prstGeom>
-          <a:noFill/>
-          <a:ln>
-            <a:noFill/>
-          </a:ln>
-        </p:spPr>
-        <p:style>
-          <a:lnRef idx="0"/>
-          <a:fillRef idx="0"/>
-          <a:effectRef idx="0"/>
-          <a:fontRef idx="minor"/>
-        </p:style>
-        <p:txBody>
-          <a:bodyPr lIns="0" rIns="0" tIns="0" bIns="0"/>
-          <a:p>
-            <a:pPr>
-              <a:lnSpc>
-                <a:spcPct val="100000"/>
-              </a:lnSpc>
-            </a:pPr>
-            <a:r>
-              <a:rPr b="1" lang="nl-NL" sz="3500" spc="-1" strike="noStrike">
-                <a:solidFill>
-                  <a:srgbClr val="ff0000"/>
-                </a:solidFill>
-                <a:uFill>
-                  <a:solidFill>
-                    <a:srgbClr val="ffffff"/>
-                  </a:solidFill>
-                </a:uFill>
-                <a:latin typeface="Corbel"/>
-              </a:rPr>
-              <a:t>Optie ShareFile</a:t>
-            </a:r>
-            <a:endParaRPr b="0" lang="nl-NL" sz="1800" spc="-1" strike="noStrike">
-              <a:solidFill>
-                <a:srgbClr val="000000"/>
-              </a:solidFill>
-              <a:uFill>
-                <a:solidFill>
-                  <a:srgbClr val="ffffff"/>
-                </a:solidFill>
-              </a:uFill>
-              <a:latin typeface="Arial"/>
-            </a:endParaRPr>
-          </a:p>
-        </p:txBody>
-      </p:sp>
-      <p:pic>
-        <p:nvPicPr>
-          <p:cNvPr id="140" name="Tijdelijke aanduiding voor inhoud 5" descr=""/>
-          <p:cNvPicPr/>
-          <p:nvPr/>
-        </p:nvPicPr>
-        <p:blipFill>
-          <a:blip r:embed="rId1"/>
-          <a:stretch/>
-        </p:blipFill>
-        <p:spPr>
-          <a:xfrm>
-            <a:off x="1403640" y="1866600"/>
-            <a:ext cx="7632000" cy="4955400"/>
-          </a:xfrm>
-          <a:prstGeom prst="rect">
-            <a:avLst/>
-          </a:prstGeom>
-          <a:ln>
-            <a:noFill/>
-          </a:ln>
-        </p:spPr>
-      </p:pic>
-    </p:spTree>
-  </p:cSld>
-  <p:timing>
-    <p:tnLst>
-      <p:par>
-        <p:cTn id="21" dur="indefinite" restart="never" nodeType="tmRoot">
-          <p:childTnLst>
-            <p:seq>
-              <p:cTn id="22" nodeType="mainSeq"/>
-              <p:prevCondLst>
-                <p:cond delay="0" evt="onPrev">
-                  <p:tgtEl>
-                    <p:sldTgt/>
-                  </p:tgtEl>
-                </p:cond>
-              </p:prevCondLst>
-              <p:nextCondLst>
-                <p:cond delay="0" evt="onNext">
-                  <p:tgtEl>
-                    <p:sldTgt/>
-                  </p:tgtEl>
-                </p:cond>
-              </p:nextCondLst>
-            </p:seq>
-          </p:childTnLst>
-        </p:cTn>
-      </p:par>
-    </p:tnLst>
-  </p:timing>
-</p:sld>
-</file>
-
-<file path=ppt/slides/slide12.xml><?xml version="1.0" encoding="utf-8"?>
-<p:sld xmlns:a="http://schemas.openxmlformats.org/drawingml/2006/main" xmlns:p="http://schemas.openxmlformats.org/presentationml/2006/main" xmlns:r="http://schemas.openxmlformats.org/officeDocument/2006/relationships" xmlns:p14="http://schemas.microsoft.com/office/powerpoint/2010/main" xmlns:p15="http://schemas.microsoft.com/office/powerpoint/2012/main" xmlns:mc="http://schemas.openxmlformats.org/markup-compatibility/2006">
-  <p:cSld>
-    <p:spTree>
-      <p:nvGrpSpPr>
-        <p:cNvPr id="1" name=""/>
-        <p:cNvGrpSpPr/>
-        <p:nvPr/>
-      </p:nvGrpSpPr>
-      <p:grpSpPr>
-        <a:xfrm>
-          <a:off x="0" y="0"/>
-          <a:ext cx="0" cy="0"/>
-          <a:chOff x="0" y="0"/>
-          <a:chExt cx="0" cy="0"/>
-        </a:xfrm>
-      </p:grpSpPr>
-      <p:sp>
-        <p:nvSpPr>
-          <p:cNvPr id="141" name="CustomShape 1"/>
-          <p:cNvSpPr/>
-          <p:nvPr/>
-        </p:nvSpPr>
-        <p:spPr>
-          <a:xfrm>
-            <a:off x="781920" y="620640"/>
-            <a:ext cx="7595280" cy="1142280"/>
-          </a:xfrm>
-          <a:prstGeom prst="rect">
-            <a:avLst/>
-          </a:prstGeom>
-          <a:noFill/>
-          <a:ln>
-            <a:noFill/>
-          </a:ln>
-        </p:spPr>
-        <p:style>
-          <a:lnRef idx="0"/>
-          <a:fillRef idx="0"/>
-          <a:effectRef idx="0"/>
-          <a:fontRef idx="minor"/>
-        </p:style>
-        <p:txBody>
-          <a:bodyPr lIns="0" rIns="0" tIns="0" bIns="0"/>
-          <a:p>
-            <a:pPr>
-              <a:lnSpc>
-                <a:spcPct val="100000"/>
-              </a:lnSpc>
-            </a:pPr>
-            <a:r>
-              <a:rPr b="1" lang="nl-NL" sz="3500" spc="-1" strike="noStrike">
-                <a:solidFill>
-                  <a:srgbClr val="ff0000"/>
-                </a:solidFill>
-                <a:uFill>
-                  <a:solidFill>
-                    <a:srgbClr val="ffffff"/>
-                  </a:solidFill>
-                </a:uFill>
-                <a:latin typeface="Corbel"/>
-              </a:rPr>
-              <a:t>Optie DocZend</a:t>
-            </a:r>
-            <a:endParaRPr b="0" lang="nl-NL" sz="1800" spc="-1" strike="noStrike">
-              <a:solidFill>
-                <a:srgbClr val="000000"/>
-              </a:solidFill>
-              <a:uFill>
-                <a:solidFill>
-                  <a:srgbClr val="ffffff"/>
-                </a:solidFill>
-              </a:uFill>
-              <a:latin typeface="Arial"/>
-            </a:endParaRPr>
-          </a:p>
-        </p:txBody>
-      </p:sp>
-      <p:pic>
-        <p:nvPicPr>
-          <p:cNvPr id="142" name="Tijdelijke aanduiding voor inhoud 3" descr=""/>
-          <p:cNvPicPr/>
-          <p:nvPr/>
-        </p:nvPicPr>
-        <p:blipFill>
-          <a:blip r:embed="rId1"/>
-          <a:stretch/>
-        </p:blipFill>
-        <p:spPr>
-          <a:xfrm>
-            <a:off x="1763640" y="1401120"/>
-            <a:ext cx="7379640" cy="5430960"/>
-          </a:xfrm>
-          <a:prstGeom prst="rect">
-            <a:avLst/>
-          </a:prstGeom>
-          <a:ln>
-            <a:noFill/>
-          </a:ln>
-        </p:spPr>
-      </p:pic>
-    </p:spTree>
-  </p:cSld>
-  <p:timing>
-    <p:tnLst>
-      <p:par>
-        <p:cTn id="23" dur="indefinite" restart="never" nodeType="tmRoot">
-          <p:childTnLst>
-            <p:seq>
-              <p:cTn id="24" nodeType="mainSeq"/>
-              <p:prevCondLst>
-                <p:cond delay="0" evt="onPrev">
-                  <p:tgtEl>
-                    <p:sldTgt/>
-                  </p:tgtEl>
-                </p:cond>
-              </p:prevCondLst>
-              <p:nextCondLst>
-                <p:cond delay="0" evt="onNext">
-                  <p:tgtEl>
-                    <p:sldTgt/>
-                  </p:tgtEl>
-                </p:cond>
-              </p:nextCondLst>
-            </p:seq>
-          </p:childTnLst>
-        </p:cTn>
-      </p:par>
-    </p:tnLst>
-  </p:timing>
-</p:sld>
-</file>
-
-<file path=ppt/slides/slide13.xml><?xml version="1.0" encoding="utf-8"?>
-<p:sld xmlns:a="http://schemas.openxmlformats.org/drawingml/2006/main" xmlns:p="http://schemas.openxmlformats.org/presentationml/2006/main" xmlns:r="http://schemas.openxmlformats.org/officeDocument/2006/relationships" xmlns:p14="http://schemas.microsoft.com/office/powerpoint/2010/main" xmlns:p15="http://schemas.microsoft.com/office/powerpoint/2012/main" xmlns:mc="http://schemas.openxmlformats.org/markup-compatibility/2006">
-  <p:cSld>
-    <p:spTree>
-      <p:nvGrpSpPr>
-        <p:cNvPr id="1" name=""/>
-        <p:cNvGrpSpPr/>
-        <p:nvPr/>
-      </p:nvGrpSpPr>
-      <p:grpSpPr>
-        <a:xfrm>
-          <a:off x="0" y="0"/>
-          <a:ext cx="0" cy="0"/>
-          <a:chOff x="0" y="0"/>
-          <a:chExt cx="0" cy="0"/>
-        </a:xfrm>
-      </p:grpSpPr>
-      <p:sp>
-        <p:nvSpPr>
-          <p:cNvPr id="143" name="CustomShape 1"/>
-          <p:cNvSpPr/>
-          <p:nvPr/>
-        </p:nvSpPr>
-        <p:spPr>
-          <a:xfrm>
-            <a:off x="781920" y="1998360"/>
-            <a:ext cx="7595280" cy="1142280"/>
-          </a:xfrm>
-          <a:prstGeom prst="rect">
-            <a:avLst/>
-          </a:prstGeom>
-          <a:noFill/>
-          <a:ln>
-            <a:noFill/>
-          </a:ln>
-        </p:spPr>
-        <p:style>
-          <a:lnRef idx="0"/>
-          <a:fillRef idx="0"/>
-          <a:effectRef idx="0"/>
-          <a:fontRef idx="minor"/>
-        </p:style>
-        <p:txBody>
-          <a:bodyPr lIns="0" rIns="0" tIns="0" bIns="0"/>
-          <a:p>
-            <a:pPr>
-              <a:lnSpc>
-                <a:spcPct val="100000"/>
-              </a:lnSpc>
-            </a:pPr>
-            <a:r>
-              <a:rPr b="1" lang="nl-NL" sz="3500" spc="-1" strike="noStrike">
-                <a:solidFill>
-                  <a:srgbClr val="ff0000"/>
-                </a:solidFill>
-                <a:uFill>
-                  <a:solidFill>
-                    <a:srgbClr val="ffffff"/>
-                  </a:solidFill>
-                </a:uFill>
-                <a:latin typeface="Corbel"/>
-              </a:rPr>
-              <a:t>Optie VeiligOversteken.nl</a:t>
-            </a:r>
-            <a:endParaRPr b="0" lang="nl-NL" sz="1800" spc="-1" strike="noStrike">
-              <a:solidFill>
-                <a:srgbClr val="000000"/>
-              </a:solidFill>
-              <a:uFill>
-                <a:solidFill>
-                  <a:srgbClr val="ffffff"/>
-                </a:solidFill>
-              </a:uFill>
-              <a:latin typeface="Arial"/>
-            </a:endParaRPr>
-          </a:p>
-        </p:txBody>
-      </p:sp>
-      <p:sp>
-        <p:nvSpPr>
-          <p:cNvPr id="144" name="CustomShape 2"/>
-          <p:cNvSpPr/>
-          <p:nvPr/>
-        </p:nvSpPr>
-        <p:spPr>
-          <a:xfrm>
-            <a:off x="781560" y="3367440"/>
-            <a:ext cx="7595280" cy="2786400"/>
-          </a:xfrm>
-          <a:prstGeom prst="rect">
-            <a:avLst/>
-          </a:prstGeom>
-          <a:noFill/>
-          <a:ln>
-            <a:noFill/>
-          </a:ln>
-        </p:spPr>
-        <p:style>
-          <a:lnRef idx="0"/>
-          <a:fillRef idx="0"/>
-          <a:effectRef idx="0"/>
-          <a:fontRef idx="minor"/>
-        </p:style>
-      </p:sp>
-    </p:spTree>
-  </p:cSld>
-  <p:timing>
-    <p:tnLst>
-      <p:par>
-        <p:cTn id="25" dur="indefinite" restart="never" nodeType="tmRoot">
-          <p:childTnLst>
-            <p:seq>
-              <p:cTn id="26" nodeType="mainSeq"/>
-              <p:prevCondLst>
-                <p:cond delay="0" evt="onPrev">
-                  <p:tgtEl>
-                    <p:sldTgt/>
-                  </p:tgtEl>
-                </p:cond>
-              </p:prevCondLst>
-              <p:nextCondLst>
-                <p:cond delay="0" evt="onNext">
-                  <p:tgtEl>
-                    <p:sldTgt/>
-                  </p:tgtEl>
-                </p:cond>
-              </p:nextCondLst>
-            </p:seq>
-          </p:childTnLst>
-        </p:cTn>
-      </p:par>
-    </p:tnLst>
-  </p:timing>
-</p:sld>
-</file>
-
-<file path=ppt/slides/slide14.xml><?xml version="1.0" encoding="utf-8"?>
-<p:sld xmlns:a="http://schemas.openxmlformats.org/drawingml/2006/main" xmlns:p="http://schemas.openxmlformats.org/presentationml/2006/main" xmlns:r="http://schemas.openxmlformats.org/officeDocument/2006/relationships" xmlns:p14="http://schemas.microsoft.com/office/powerpoint/2010/main" xmlns:p15="http://schemas.microsoft.com/office/powerpoint/2012/main" xmlns:mc="http://schemas.openxmlformats.org/markup-compatibility/2006">
-  <p:cSld>
-    <p:spTree>
-      <p:nvGrpSpPr>
-        <p:cNvPr id="1" name=""/>
-        <p:cNvGrpSpPr/>
-        <p:nvPr/>
-      </p:nvGrpSpPr>
-      <p:grpSpPr>
-        <a:xfrm>
-          <a:off x="0" y="0"/>
-          <a:ext cx="0" cy="0"/>
-          <a:chOff x="0" y="0"/>
-          <a:chExt cx="0" cy="0"/>
-        </a:xfrm>
-      </p:grpSpPr>
-      <p:sp>
-        <p:nvSpPr>
-          <p:cNvPr id="145" name="CustomShape 1"/>
-          <p:cNvSpPr/>
-          <p:nvPr/>
-        </p:nvSpPr>
-        <p:spPr>
-          <a:xfrm>
-            <a:off x="781920" y="1124640"/>
-            <a:ext cx="7595280" cy="1142280"/>
-          </a:xfrm>
-          <a:prstGeom prst="rect">
-            <a:avLst/>
-          </a:prstGeom>
-          <a:noFill/>
-          <a:ln>
-            <a:noFill/>
-          </a:ln>
-        </p:spPr>
-        <p:style>
-          <a:lnRef idx="0"/>
-          <a:fillRef idx="0"/>
-          <a:effectRef idx="0"/>
-          <a:fontRef idx="minor"/>
-        </p:style>
-        <p:txBody>
-          <a:bodyPr lIns="0" rIns="0" tIns="0" bIns="0"/>
-          <a:p>
-            <a:pPr>
-              <a:lnSpc>
-                <a:spcPct val="100000"/>
-              </a:lnSpc>
-            </a:pPr>
-            <a:r>
-              <a:rPr b="1" lang="nl-NL" sz="3500" spc="-1" strike="noStrike">
-                <a:solidFill>
-                  <a:srgbClr val="ff0000"/>
-                </a:solidFill>
-                <a:uFill>
-                  <a:solidFill>
-                    <a:srgbClr val="ffffff"/>
-                  </a:solidFill>
-                </a:uFill>
-                <a:latin typeface="Corbel"/>
-              </a:rPr>
-              <a:t>Doelsituatie IV</a:t>
-            </a:r>
-            <a:endParaRPr b="0" lang="nl-NL" sz="1800" spc="-1" strike="noStrike">
-              <a:solidFill>
-                <a:srgbClr val="000000"/>
-              </a:solidFill>
-              <a:uFill>
-                <a:solidFill>
-                  <a:srgbClr val="ffffff"/>
-                </a:solidFill>
-              </a:uFill>
-              <a:latin typeface="Arial"/>
-            </a:endParaRPr>
-          </a:p>
-        </p:txBody>
-      </p:sp>
-      <p:pic>
-        <p:nvPicPr>
-          <p:cNvPr id="146" name="Tijdelijke aanduiding voor inhoud 3" descr=""/>
-          <p:cNvPicPr/>
-          <p:nvPr/>
-        </p:nvPicPr>
-        <p:blipFill>
-          <a:blip r:embed="rId1"/>
-          <a:stretch/>
-        </p:blipFill>
-        <p:spPr>
-          <a:xfrm>
-            <a:off x="781920" y="2394360"/>
-            <a:ext cx="8109720" cy="4449240"/>
-          </a:xfrm>
-          <a:prstGeom prst="rect">
-            <a:avLst/>
-          </a:prstGeom>
-          <a:ln>
-            <a:noFill/>
-          </a:ln>
-        </p:spPr>
-      </p:pic>
-    </p:spTree>
-  </p:cSld>
-  <p:timing>
-    <p:tnLst>
-      <p:par>
-        <p:cTn id="27" dur="indefinite" restart="never" nodeType="tmRoot">
-          <p:childTnLst>
-            <p:seq>
-              <p:cTn id="28" nodeType="mainSeq"/>
-              <p:prevCondLst>
-                <p:cond delay="0" evt="onPrev">
-                  <p:tgtEl>
-                    <p:sldTgt/>
-                  </p:tgtEl>
-                </p:cond>
-              </p:prevCondLst>
-              <p:nextCondLst>
-                <p:cond delay="0" evt="onNext">
-                  <p:tgtEl>
-                    <p:sldTgt/>
-                  </p:tgtEl>
-                </p:cond>
-              </p:nextCondLst>
-            </p:seq>
-          </p:childTnLst>
-        </p:cTn>
-      </p:par>
-    </p:tnLst>
-  </p:timing>
-</p:sld>
-</file>
-
 <file path=ppt/slides/slide2.xml><?xml version="1.0" encoding="utf-8"?>
 <p:sld xmlns:a="http://schemas.openxmlformats.org/drawingml/2006/main" xmlns:p="http://schemas.openxmlformats.org/presentationml/2006/main" xmlns:r="http://schemas.openxmlformats.org/officeDocument/2006/relationships" xmlns:p14="http://schemas.microsoft.com/office/powerpoint/2010/main" xmlns:p15="http://schemas.microsoft.com/office/powerpoint/2012/main" xmlns:mc="http://schemas.openxmlformats.org/markup-compatibility/2006">
   <p:cSld>
@@ -9534,7 +9008,7 @@
         <p:spPr>
           <a:xfrm>
             <a:off x="781920" y="1998360"/>
-            <a:ext cx="7595280" cy="1142280"/>
+            <a:ext cx="7595280" cy="4193640"/>
           </a:xfrm>
           <a:prstGeom prst="rect">
             <a:avLst/>
@@ -9613,29 +9087,21 @@
             </a:endParaRPr>
           </a:p>
           <a:p>
-            <a:pPr>
+            <a:pPr marL="216000" indent="-216000">
               <a:lnSpc>
                 <a:spcPct val="100000"/>
               </a:lnSpc>
+              <a:buClr>
+                <a:srgbClr val="000000"/>
+              </a:buClr>
+              <a:buSzPct val="45000"/>
+              <a:buFont typeface="Wingdings" charset="2"/>
+              <a:buChar char=""/>
             </a:pPr>
             <a:r>
               <a:rPr b="1" lang="nl-NL" sz="3500" spc="-1" strike="noStrike">
                 <a:solidFill>
-                  <a:srgbClr val="ff0000"/>
-                </a:solidFill>
-                <a:uFill>
-                  <a:solidFill>
-                    <a:srgbClr val="ffffff"/>
-                  </a:solidFill>
-                </a:uFill>
-                <a:latin typeface="Corbel"/>
-              </a:rPr>
-              <a:t>– </a:t>
-            </a:r>
-            <a:r>
-              <a:rPr b="1" lang="nl-NL" sz="3500" spc="-1" strike="noStrike">
-                <a:solidFill>
-                  <a:srgbClr val="ff0000"/>
+                  <a:srgbClr val="000000"/>
                 </a:solidFill>
                 <a:uFill>
                   <a:solidFill>
@@ -9659,29 +9125,21 @@
             </a:endParaRPr>
           </a:p>
           <a:p>
-            <a:pPr>
+            <a:pPr marL="216000" indent="-216000">
               <a:lnSpc>
                 <a:spcPct val="100000"/>
               </a:lnSpc>
+              <a:buClr>
+                <a:srgbClr val="000000"/>
+              </a:buClr>
+              <a:buSzPct val="45000"/>
+              <a:buFont typeface="Wingdings" charset="2"/>
+              <a:buChar char=""/>
             </a:pPr>
             <a:r>
               <a:rPr b="1" lang="nl-NL" sz="3500" spc="-1" strike="noStrike">
                 <a:solidFill>
-                  <a:srgbClr val="ff0000"/>
-                </a:solidFill>
-                <a:uFill>
-                  <a:solidFill>
-                    <a:srgbClr val="ffffff"/>
-                  </a:solidFill>
-                </a:uFill>
-                <a:latin typeface="Corbel"/>
-              </a:rPr>
-              <a:t>– </a:t>
-            </a:r>
-            <a:r>
-              <a:rPr b="1" lang="nl-NL" sz="3500" spc="-1" strike="noStrike">
-                <a:solidFill>
-                  <a:srgbClr val="ff0000"/>
+                  <a:srgbClr val="000000"/>
                 </a:solidFill>
                 <a:uFill>
                   <a:solidFill>
@@ -9705,29 +9163,21 @@
             </a:endParaRPr>
           </a:p>
           <a:p>
-            <a:pPr>
+            <a:pPr marL="216000" indent="-216000">
               <a:lnSpc>
                 <a:spcPct val="100000"/>
               </a:lnSpc>
+              <a:buClr>
+                <a:srgbClr val="000000"/>
+              </a:buClr>
+              <a:buSzPct val="45000"/>
+              <a:buFont typeface="Wingdings" charset="2"/>
+              <a:buChar char=""/>
             </a:pPr>
             <a:r>
               <a:rPr b="1" lang="nl-NL" sz="3500" spc="-1" strike="noStrike">
                 <a:solidFill>
-                  <a:srgbClr val="ff0000"/>
-                </a:solidFill>
-                <a:uFill>
-                  <a:solidFill>
-                    <a:srgbClr val="ffffff"/>
-                  </a:solidFill>
-                </a:uFill>
-                <a:latin typeface="Corbel"/>
-              </a:rPr>
-              <a:t>– </a:t>
-            </a:r>
-            <a:r>
-              <a:rPr b="1" lang="nl-NL" sz="3500" spc="-1" strike="noStrike">
-                <a:solidFill>
-                  <a:srgbClr val="ff0000"/>
+                  <a:srgbClr val="000000"/>
                 </a:solidFill>
                 <a:uFill>
                   <a:solidFill>
@@ -9751,29 +9201,21 @@
             </a:endParaRPr>
           </a:p>
           <a:p>
-            <a:pPr>
+            <a:pPr marL="216000" indent="-216000">
               <a:lnSpc>
                 <a:spcPct val="100000"/>
               </a:lnSpc>
+              <a:buClr>
+                <a:srgbClr val="000000"/>
+              </a:buClr>
+              <a:buSzPct val="45000"/>
+              <a:buFont typeface="Wingdings" charset="2"/>
+              <a:buChar char=""/>
             </a:pPr>
             <a:r>
               <a:rPr b="1" lang="nl-NL" sz="3500" spc="-1" strike="noStrike">
                 <a:solidFill>
-                  <a:srgbClr val="ff0000"/>
-                </a:solidFill>
-                <a:uFill>
-                  <a:solidFill>
-                    <a:srgbClr val="ffffff"/>
-                  </a:solidFill>
-                </a:uFill>
-                <a:latin typeface="Corbel"/>
-              </a:rPr>
-              <a:t>– </a:t>
-            </a:r>
-            <a:r>
-              <a:rPr b="1" lang="nl-NL" sz="3500" spc="-1" strike="noStrike">
-                <a:solidFill>
-                  <a:srgbClr val="ff0000"/>
+                  <a:srgbClr val="000000"/>
                 </a:solidFill>
                 <a:uFill>
                   <a:solidFill>
@@ -9797,15 +9239,21 @@
             </a:endParaRPr>
           </a:p>
           <a:p>
-            <a:pPr>
+            <a:pPr marL="216000" indent="-216000">
               <a:lnSpc>
                 <a:spcPct val="100000"/>
               </a:lnSpc>
+              <a:buClr>
+                <a:srgbClr val="000000"/>
+              </a:buClr>
+              <a:buSzPct val="45000"/>
+              <a:buFont typeface="Wingdings" charset="2"/>
+              <a:buChar char=""/>
             </a:pPr>
             <a:r>
               <a:rPr b="1" lang="nl-NL" sz="3500" spc="-1" strike="noStrike">
                 <a:solidFill>
-                  <a:srgbClr val="ff0000"/>
+                  <a:srgbClr val="000000"/>
                 </a:solidFill>
                 <a:uFill>
                   <a:solidFill>
@@ -9814,113 +9262,7 @@
                 </a:uFill>
                 <a:latin typeface="Corbel"/>
               </a:rPr>
-              <a:t>– </a:t>
-            </a:r>
-            <a:r>
-              <a:rPr b="1" lang="nl-NL" sz="3500" spc="-1" strike="noStrike">
-                <a:solidFill>
-                  <a:srgbClr val="ff0000"/>
-                </a:solidFill>
-                <a:uFill>
-                  <a:solidFill>
-                    <a:srgbClr val="ffffff"/>
-                  </a:solidFill>
-                </a:uFill>
-                <a:latin typeface="Corbel"/>
-              </a:rPr>
-              <a:t>Big data</a:t>
-            </a:r>
-            <a:endParaRPr b="0" lang="nl-NL" sz="1800" spc="-1" strike="noStrike">
-              <a:solidFill>
-                <a:srgbClr val="000000"/>
-              </a:solidFill>
-              <a:uFill>
-                <a:solidFill>
-                  <a:srgbClr val="ffffff"/>
-                </a:solidFill>
-              </a:uFill>
-              <a:latin typeface="Arial"/>
-            </a:endParaRPr>
-          </a:p>
-          <a:p>
-            <a:pPr>
-              <a:lnSpc>
-                <a:spcPct val="100000"/>
-              </a:lnSpc>
-            </a:pPr>
-            <a:r>
-              <a:rPr b="1" lang="nl-NL" sz="3500" spc="-1" strike="noStrike">
-                <a:solidFill>
-                  <a:srgbClr val="ff0000"/>
-                </a:solidFill>
-                <a:uFill>
-                  <a:solidFill>
-                    <a:srgbClr val="ffffff"/>
-                  </a:solidFill>
-                </a:uFill>
-                <a:latin typeface="Corbel"/>
-              </a:rPr>
-              <a:t>– </a:t>
-            </a:r>
-            <a:r>
-              <a:rPr b="1" lang="nl-NL" sz="3500" spc="-1" strike="noStrike">
-                <a:solidFill>
-                  <a:srgbClr val="ff0000"/>
-                </a:solidFill>
-                <a:uFill>
-                  <a:solidFill>
-                    <a:srgbClr val="ffffff"/>
-                  </a:solidFill>
-                </a:uFill>
-                <a:latin typeface="Corbel"/>
-              </a:rPr>
-              <a:t>Privacy by design</a:t>
-            </a:r>
-            <a:endParaRPr b="0" lang="nl-NL" sz="1800" spc="-1" strike="noStrike">
-              <a:solidFill>
-                <a:srgbClr val="000000"/>
-              </a:solidFill>
-              <a:uFill>
-                <a:solidFill>
-                  <a:srgbClr val="ffffff"/>
-                </a:solidFill>
-              </a:uFill>
-              <a:latin typeface="Arial"/>
-            </a:endParaRPr>
-          </a:p>
-          <a:p>
-            <a:pPr>
-              <a:lnSpc>
-                <a:spcPct val="100000"/>
-              </a:lnSpc>
-            </a:pPr>
-            <a:r>
-              <a:rPr b="1" lang="nl-NL" sz="3500" spc="-1" strike="noStrike">
-                <a:solidFill>
-                  <a:srgbClr val="ff0000"/>
-                </a:solidFill>
-                <a:uFill>
-                  <a:solidFill>
-                    <a:srgbClr val="ffffff"/>
-                  </a:solidFill>
-                </a:uFill>
-                <a:latin typeface="Corbel"/>
-              </a:rPr>
-              <a:t>– </a:t>
-            </a:r>
-            <a:r>
-              <a:rPr b="1" lang="nl-NL" sz="3500" spc="-1" strike="noStrike">
-                <a:solidFill>
-                  <a:srgbClr val="ff0000"/>
-                </a:solidFill>
-                <a:uFill>
-                  <a:solidFill>
-                    <a:srgbClr val="ffffff"/>
-                  </a:solidFill>
-                </a:uFill>
-                <a:latin typeface="Corbel"/>
-              </a:rPr>
-              <a:t>Security by design</a:t>
+              <a:t> </a:t>
             </a:r>
             <a:endParaRPr b="0" lang="nl-NL" sz="1800" spc="-1" strike="noStrike">
               <a:solidFill>
@@ -10038,7 +9380,7 @@
         <p:spPr>
           <a:xfrm>
             <a:off x="781920" y="1998360"/>
-            <a:ext cx="7595280" cy="1142280"/>
+            <a:ext cx="7595280" cy="4625640"/>
           </a:xfrm>
           <a:prstGeom prst="rect">
             <a:avLst/>
@@ -10074,28 +9416,10 @@
                 </a:uFill>
                 <a:latin typeface="Corbel"/>
               </a:rPr>
-              <a:t>ItforCare principes:</a:t>
+              <a:t>ITforCare </a:t>
             </a:r>
-            <a:endParaRPr b="0" lang="nl-NL" sz="1800" spc="-1" strike="noStrike">
-              <a:solidFill>
-                <a:srgbClr val="000000"/>
-              </a:solidFill>
-              <a:uFill>
-                <a:solidFill>
-                  <a:srgbClr val="ffffff"/>
-                </a:solidFill>
-              </a:uFill>
-              <a:latin typeface="Arial"/>
-            </a:endParaRPr>
-          </a:p>
-          <a:p>
-            <a:pPr>
-              <a:lnSpc>
-                <a:spcPct val="100000"/>
-              </a:lnSpc>
-            </a:pPr>
             <a:r>
-              <a:rPr b="1" lang="nl-NL" sz="3500" spc="-1" strike="noStrike">
+              <a:rPr b="1" lang="en-US" sz="3500" spc="-1" strike="noStrike">
                 <a:solidFill>
                   <a:srgbClr val="ff0000"/>
                 </a:solidFill>
@@ -10106,7 +9430,7 @@
                 </a:uFill>
                 <a:latin typeface="Corbel"/>
               </a:rPr>
-              <a:t>–  </a:t>
+              <a:t>principles</a:t>
             </a:r>
             <a:r>
               <a:rPr b="1" lang="nl-NL" sz="3500" spc="-1" strike="noStrike">
@@ -10120,7 +9444,159 @@
                 </a:uFill>
                 <a:latin typeface="Corbel"/>
               </a:rPr>
-              <a:t>...</a:t>
+              <a:t>:</a:t>
+            </a:r>
+            <a:endParaRPr b="0" lang="nl-NL" sz="1800" spc="-1" strike="noStrike">
+              <a:solidFill>
+                <a:srgbClr val="000000"/>
+              </a:solidFill>
+              <a:uFill>
+                <a:solidFill>
+                  <a:srgbClr val="ffffff"/>
+                </a:solidFill>
+              </a:uFill>
+              <a:latin typeface="Arial"/>
+            </a:endParaRPr>
+          </a:p>
+          <a:p>
+            <a:pPr marL="216000" indent="-216000">
+              <a:lnSpc>
+                <a:spcPct val="100000"/>
+              </a:lnSpc>
+              <a:buClr>
+                <a:srgbClr val="000000"/>
+              </a:buClr>
+              <a:buSzPct val="45000"/>
+              <a:buFont typeface="Wingdings" charset="2"/>
+              <a:buChar char=""/>
+            </a:pPr>
+            <a:r>
+              <a:rPr b="1" lang="nl-NL" sz="3500" spc="-1" strike="noStrike">
+                <a:solidFill>
+                  <a:srgbClr val="000000"/>
+                </a:solidFill>
+                <a:uFill>
+                  <a:solidFill>
+                    <a:srgbClr val="ffffff"/>
+                  </a:solidFill>
+                </a:uFill>
+                <a:latin typeface="Corbel"/>
+              </a:rPr>
+              <a:t>Privacy by design</a:t>
+            </a:r>
+            <a:endParaRPr b="0" lang="nl-NL" sz="1800" spc="-1" strike="noStrike">
+              <a:solidFill>
+                <a:srgbClr val="000000"/>
+              </a:solidFill>
+              <a:uFill>
+                <a:solidFill>
+                  <a:srgbClr val="ffffff"/>
+                </a:solidFill>
+              </a:uFill>
+              <a:latin typeface="Arial"/>
+            </a:endParaRPr>
+          </a:p>
+          <a:p>
+            <a:pPr marL="216000" indent="-216000">
+              <a:lnSpc>
+                <a:spcPct val="100000"/>
+              </a:lnSpc>
+              <a:buClr>
+                <a:srgbClr val="000000"/>
+              </a:buClr>
+              <a:buSzPct val="45000"/>
+              <a:buFont typeface="Wingdings" charset="2"/>
+              <a:buChar char=""/>
+            </a:pPr>
+            <a:r>
+              <a:rPr b="1" lang="nl-NL" sz="3500" spc="-1" strike="noStrike">
+                <a:solidFill>
+                  <a:srgbClr val="000000"/>
+                </a:solidFill>
+                <a:uFill>
+                  <a:solidFill>
+                    <a:srgbClr val="ffffff"/>
+                  </a:solidFill>
+                </a:uFill>
+                <a:latin typeface="Corbel"/>
+              </a:rPr>
+              <a:t>Security by design</a:t>
+            </a:r>
+            <a:endParaRPr b="0" lang="nl-NL" sz="1800" spc="-1" strike="noStrike">
+              <a:solidFill>
+                <a:srgbClr val="000000"/>
+              </a:solidFill>
+              <a:uFill>
+                <a:solidFill>
+                  <a:srgbClr val="ffffff"/>
+                </a:solidFill>
+              </a:uFill>
+              <a:latin typeface="Arial"/>
+            </a:endParaRPr>
+          </a:p>
+          <a:p>
+            <a:pPr marL="216000" indent="-216000">
+              <a:lnSpc>
+                <a:spcPct val="100000"/>
+              </a:lnSpc>
+              <a:buClr>
+                <a:srgbClr val="000000"/>
+              </a:buClr>
+              <a:buSzPct val="45000"/>
+              <a:buFont typeface="Wingdings" charset="2"/>
+              <a:buChar char=""/>
+            </a:pPr>
+            <a:r>
+              <a:rPr b="1" lang="nl-NL" sz="3500" spc="-1" strike="noStrike">
+                <a:solidFill>
+                  <a:srgbClr val="000000"/>
+                </a:solidFill>
+                <a:uFill>
+                  <a:solidFill>
+                    <a:srgbClr val="ffffff"/>
+                  </a:solidFill>
+                </a:uFill>
+                <a:latin typeface="Corbel"/>
+              </a:rPr>
+              <a:t>Open data</a:t>
+            </a:r>
+            <a:endParaRPr b="0" lang="nl-NL" sz="1800" spc="-1" strike="noStrike">
+              <a:solidFill>
+                <a:srgbClr val="000000"/>
+              </a:solidFill>
+              <a:uFill>
+                <a:solidFill>
+                  <a:srgbClr val="ffffff"/>
+                </a:solidFill>
+              </a:uFill>
+              <a:latin typeface="Arial"/>
+            </a:endParaRPr>
+          </a:p>
+          <a:p>
+            <a:pPr marL="216000" indent="-216000">
+              <a:lnSpc>
+                <a:spcPct val="100000"/>
+              </a:lnSpc>
+              <a:buClr>
+                <a:srgbClr val="000000"/>
+              </a:buClr>
+              <a:buSzPct val="45000"/>
+              <a:buFont typeface="Wingdings" charset="2"/>
+              <a:buChar char=""/>
+            </a:pPr>
+            <a:r>
+              <a:rPr b="1" lang="nl-NL" sz="3500" spc="-1" strike="noStrike">
+                <a:solidFill>
+                  <a:srgbClr val="000000"/>
+                </a:solidFill>
+                <a:uFill>
+                  <a:solidFill>
+                    <a:srgbClr val="ffffff"/>
+                  </a:solidFill>
+                </a:uFill>
+                <a:latin typeface="Corbel"/>
+              </a:rPr>
+              <a:t>Big data</a:t>
             </a:r>
             <a:endParaRPr b="0" lang="nl-NL" sz="1800" spc="-1" strike="noStrike">
               <a:solidFill>
@@ -11136,7 +10612,7 @@
         </p:nvSpPr>
         <p:spPr>
           <a:xfrm>
-            <a:off x="774000" y="188640"/>
+            <a:off x="756720" y="144000"/>
             <a:ext cx="7595280" cy="1142280"/>
           </a:xfrm>
           <a:prstGeom prst="rect">
@@ -11173,7 +10649,7 @@
                 </a:uFill>
                 <a:latin typeface="Corbel"/>
               </a:rPr>
-              <a:t>Doelsituatie, bedrijfslaag </a:t>
+              <a:t>Huidige situatie, informatievoorziening </a:t>
             </a:r>
             <a:endParaRPr b="0" lang="nl-NL" sz="1800" spc="-1" strike="noStrike">
               <a:solidFill>
@@ -11197,8 +10673,8 @@
         </p:nvSpPr>
         <p:spPr>
           <a:xfrm>
-            <a:off x="1434240" y="5085360"/>
-            <a:ext cx="6040440" cy="1645920"/>
+            <a:off x="1432800" y="5589360"/>
+            <a:ext cx="6069240" cy="1097280"/>
           </a:xfrm>
           <a:prstGeom prst="rect">
             <a:avLst/>
@@ -11235,7 +10711,7 @@
                 <a:latin typeface="Corbel"/>
                 <a:ea typeface="DejaVu Sans"/>
               </a:rPr>
-              <a:t>Professionals die betrokken zijn bij een cliënt kunnen nog steeds</a:t>
+              <a:t>...</a:t>
             </a:r>
             <a:endParaRPr b="0" lang="nl-NL" sz="1800" spc="-1" strike="noStrike">
               <a:solidFill>
@@ -11249,216 +10725,8 @@
               <a:latin typeface="Arial"/>
             </a:endParaRPr>
           </a:p>
-          <a:p>
-            <a:pPr>
-              <a:lnSpc>
-                <a:spcPct val="100000"/>
-              </a:lnSpc>
-            </a:pPr>
-            <a:r>
-              <a:rPr b="0" lang="nl-NL" sz="1800" spc="-1" strike="noStrike">
-                <a:solidFill>
-                  <a:srgbClr val="000000"/>
-                </a:solidFill>
-                <a:uFill>
-                  <a:solidFill>
-                    <a:srgbClr val="ffffff"/>
-                  </a:solidFill>
-                </a:uFill>
-                <a:latin typeface="Corbel"/>
-                <a:ea typeface="DejaVu Sans"/>
-              </a:rPr>
-              <a:t>informatie wisselen over de cliënt en zijn situatie. Maar nu</a:t>
-            </a:r>
-            <a:endParaRPr b="0" lang="nl-NL" sz="1800" spc="-1" strike="noStrike">
-              <a:solidFill>
-                <a:srgbClr val="000000"/>
-              </a:solidFill>
-              <a:uFill>
-                <a:solidFill>
-                  <a:srgbClr val="ffffff"/>
-                </a:solidFill>
-              </a:uFill>
-              <a:latin typeface="Arial"/>
-            </a:endParaRPr>
-          </a:p>
-          <a:p>
-            <a:pPr marL="285840" indent="-285120">
-              <a:lnSpc>
-                <a:spcPct val="100000"/>
-              </a:lnSpc>
-              <a:buClr>
-                <a:srgbClr val="000000"/>
-              </a:buClr>
-              <a:buFont typeface="Arial"/>
-              <a:buChar char="•"/>
-            </a:pPr>
-            <a:r>
-              <a:rPr b="0" lang="nl-NL" sz="1800" spc="-1" strike="noStrike">
-                <a:solidFill>
-                  <a:srgbClr val="000000"/>
-                </a:solidFill>
-                <a:uFill>
-                  <a:solidFill>
-                    <a:srgbClr val="ffffff"/>
-                  </a:solidFill>
-                </a:uFill>
-                <a:latin typeface="Corbel"/>
-                <a:ea typeface="DejaVu Sans"/>
-              </a:rPr>
-              <a:t>Goed beveiligd</a:t>
-            </a:r>
-            <a:endParaRPr b="0" lang="nl-NL" sz="1800" spc="-1" strike="noStrike">
-              <a:solidFill>
-                <a:srgbClr val="000000"/>
-              </a:solidFill>
-              <a:uFill>
-                <a:solidFill>
-                  <a:srgbClr val="ffffff"/>
-                </a:solidFill>
-              </a:uFill>
-              <a:latin typeface="Arial"/>
-            </a:endParaRPr>
-          </a:p>
-          <a:p>
-            <a:pPr marL="285840" indent="-285120">
-              <a:lnSpc>
-                <a:spcPct val="100000"/>
-              </a:lnSpc>
-              <a:buClr>
-                <a:srgbClr val="000000"/>
-              </a:buClr>
-              <a:buFont typeface="Arial"/>
-              <a:buChar char="•"/>
-            </a:pPr>
-            <a:r>
-              <a:rPr b="0" lang="nl-NL" sz="1800" spc="-1" strike="noStrike">
-                <a:solidFill>
-                  <a:srgbClr val="000000"/>
-                </a:solidFill>
-                <a:uFill>
-                  <a:solidFill>
-                    <a:srgbClr val="ffffff"/>
-                  </a:solidFill>
-                </a:uFill>
-                <a:latin typeface="Corbel"/>
-                <a:ea typeface="DejaVu Sans"/>
-              </a:rPr>
-              <a:t>Met bijlagen</a:t>
-            </a:r>
-            <a:endParaRPr b="0" lang="nl-NL" sz="1800" spc="-1" strike="noStrike">
-              <a:solidFill>
-                <a:srgbClr val="000000"/>
-              </a:solidFill>
-              <a:uFill>
-                <a:solidFill>
-                  <a:srgbClr val="ffffff"/>
-                </a:solidFill>
-              </a:uFill>
-              <a:latin typeface="Arial"/>
-            </a:endParaRPr>
-          </a:p>
-          <a:p>
-            <a:pPr marL="285840" indent="-285120">
-              <a:lnSpc>
-                <a:spcPct val="100000"/>
-              </a:lnSpc>
-              <a:buClr>
-                <a:srgbClr val="000000"/>
-              </a:buClr>
-              <a:buFont typeface="Arial"/>
-              <a:buChar char="•"/>
-            </a:pPr>
-            <a:r>
-              <a:rPr b="0" lang="nl-NL" sz="1800" spc="-1" strike="noStrike">
-                <a:solidFill>
-                  <a:srgbClr val="000000"/>
-                </a:solidFill>
-                <a:uFill>
-                  <a:solidFill>
-                    <a:srgbClr val="ffffff"/>
-                  </a:solidFill>
-                </a:uFill>
-                <a:latin typeface="Corbel"/>
-                <a:ea typeface="DejaVu Sans"/>
-              </a:rPr>
-              <a:t>Gebruiksvriendelijk</a:t>
-            </a:r>
-            <a:endParaRPr b="0" lang="nl-NL" sz="1800" spc="-1" strike="noStrike">
-              <a:solidFill>
-                <a:srgbClr val="000000"/>
-              </a:solidFill>
-              <a:uFill>
-                <a:solidFill>
-                  <a:srgbClr val="ffffff"/>
-                </a:solidFill>
-              </a:uFill>
-              <a:latin typeface="Arial"/>
-            </a:endParaRPr>
-          </a:p>
-          <a:p>
-            <a:pPr marL="285840" indent="-285120">
-              <a:lnSpc>
-                <a:spcPct val="100000"/>
-              </a:lnSpc>
-              <a:buClr>
-                <a:srgbClr val="000000"/>
-              </a:buClr>
-              <a:buFont typeface="Arial"/>
-              <a:buChar char="•"/>
-            </a:pPr>
-            <a:r>
-              <a:rPr b="0" lang="nl-NL" sz="1800" spc="-1" strike="noStrike">
-                <a:solidFill>
-                  <a:srgbClr val="000000"/>
-                </a:solidFill>
-                <a:uFill>
-                  <a:solidFill>
-                    <a:srgbClr val="ffffff"/>
-                  </a:solidFill>
-                </a:uFill>
-                <a:latin typeface="Corbel"/>
-                <a:ea typeface="DejaVu Sans"/>
-              </a:rPr>
-              <a:t>…</a:t>
-            </a:r>
-            <a:endParaRPr b="0" lang="nl-NL" sz="1800" spc="-1" strike="noStrike">
-              <a:solidFill>
-                <a:srgbClr val="000000"/>
-              </a:solidFill>
-              <a:uFill>
-                <a:solidFill>
-                  <a:srgbClr val="ffffff"/>
-                </a:solidFill>
-              </a:uFill>
-              <a:latin typeface="Arial"/>
-            </a:endParaRPr>
-          </a:p>
         </p:txBody>
       </p:sp>
-      <p:pic>
-        <p:nvPicPr>
-          <p:cNvPr id="133" name="Afbeelding 2" descr=""/>
-          <p:cNvPicPr/>
-          <p:nvPr/>
-        </p:nvPicPr>
-        <p:blipFill>
-          <a:blip r:embed="rId1"/>
-          <a:stretch/>
-        </p:blipFill>
-        <p:spPr>
-          <a:xfrm>
-            <a:off x="1407600" y="764640"/>
-            <a:ext cx="6476040" cy="4291200"/>
-          </a:xfrm>
-          <a:prstGeom prst="rect">
-            <a:avLst/>
-          </a:prstGeom>
-          <a:ln>
-            <a:noFill/>
-          </a:ln>
-        </p:spPr>
-      </p:pic>
     </p:spTree>
   </p:cSld>
   <p:timing>
@@ -11508,38 +10776,15 @@
           <a:chExt cx="0" cy="0"/>
         </a:xfrm>
       </p:grpSpPr>
-      <p:pic>
-        <p:nvPicPr>
-          <p:cNvPr id="134" name="Afbeelding 2" descr=""/>
-          <p:cNvPicPr/>
-          <p:nvPr/>
-        </p:nvPicPr>
-        <p:blipFill>
-          <a:blip r:embed="rId1"/>
-          <a:stretch/>
-        </p:blipFill>
-        <p:spPr>
-          <a:xfrm>
-            <a:off x="1187640" y="1124640"/>
-            <a:ext cx="6552000" cy="4281840"/>
-          </a:xfrm>
-          <a:prstGeom prst="rect">
-            <a:avLst/>
-          </a:prstGeom>
-          <a:ln>
-            <a:noFill/>
-          </a:ln>
-        </p:spPr>
-      </p:pic>
-      <p:sp>
-        <p:nvSpPr>
-          <p:cNvPr id="135" name="CustomShape 1"/>
+      <p:sp>
+        <p:nvSpPr>
+          <p:cNvPr id="133" name="CustomShape 1"/>
           <p:cNvSpPr/>
           <p:nvPr/>
         </p:nvSpPr>
         <p:spPr>
           <a:xfrm>
-            <a:off x="774000" y="341640"/>
+            <a:off x="756720" y="144000"/>
             <a:ext cx="7595280" cy="1142280"/>
           </a:xfrm>
           <a:prstGeom prst="rect">
@@ -11576,7 +10821,7 @@
                 </a:uFill>
                 <a:latin typeface="Corbel"/>
               </a:rPr>
-              <a:t>Huidige situatie informatievoorziening</a:t>
+              <a:t>Doelsituatie, informatievoorziening </a:t>
             </a:r>
             <a:endParaRPr b="0" lang="nl-NL" sz="1800" spc="-1" strike="noStrike">
               <a:solidFill>
@@ -11594,14 +10839,14 @@
       </p:sp>
       <p:sp>
         <p:nvSpPr>
-          <p:cNvPr id="136" name="CustomShape 2"/>
+          <p:cNvPr id="134" name="CustomShape 2"/>
           <p:cNvSpPr/>
           <p:nvPr/>
         </p:nvSpPr>
         <p:spPr>
-          <a:xfrm flipH="1" flipV="1" rot="10800000">
-            <a:off x="17172000" y="7800480"/>
-            <a:ext cx="8352000" cy="1097280"/>
+          <a:xfrm>
+            <a:off x="1432800" y="5589360"/>
+            <a:ext cx="6069240" cy="1097280"/>
           </a:xfrm>
           <a:prstGeom prst="rect">
             <a:avLst/>
@@ -11618,17 +10863,12 @@
           <a:fontRef idx="minor"/>
         </p:style>
         <p:txBody>
-          <a:bodyPr lIns="0" rIns="0" tIns="0" bIns="0"/>
-          <a:p>
-            <a:pPr marL="285840" indent="-285120">
+          <a:bodyPr wrap="none" lIns="0" rIns="0" tIns="0" bIns="0"/>
+          <a:p>
+            <a:pPr>
               <a:lnSpc>
                 <a:spcPct val="100000"/>
               </a:lnSpc>
-              <a:buClr>
-                <a:srgbClr val="000000"/>
-              </a:buClr>
-              <a:buFont typeface="Arial"/>
-              <a:buChar char="•"/>
             </a:pPr>
             <a:r>
               <a:rPr b="0" lang="nl-NL" sz="1800" spc="-1" strike="noStrike">
@@ -11643,121 +10883,7 @@
                 <a:latin typeface="Corbel"/>
                 <a:ea typeface="DejaVu Sans"/>
               </a:rPr>
-              <a:t>Uitwisseling van cliëntinformatie per email</a:t>
-            </a:r>
-            <a:endParaRPr b="0" lang="nl-NL" sz="1800" spc="-1" strike="noStrike">
-              <a:solidFill>
-                <a:srgbClr val="000000"/>
-              </a:solidFill>
-              <a:uFill>
-                <a:solidFill>
-                  <a:srgbClr val="ffffff"/>
-                </a:solidFill>
-              </a:uFill>
-              <a:latin typeface="Arial"/>
-            </a:endParaRPr>
-          </a:p>
-          <a:p>
-            <a:pPr marL="285840" indent="-285120">
-              <a:lnSpc>
-                <a:spcPct val="100000"/>
-              </a:lnSpc>
-              <a:buClr>
-                <a:srgbClr val="000000"/>
-              </a:buClr>
-              <a:buFont typeface="Arial"/>
-              <a:buChar char="•"/>
-            </a:pPr>
-            <a:r>
-              <a:rPr b="0" lang="nl-NL" sz="1800" spc="-1" strike="noStrike">
-                <a:solidFill>
-                  <a:srgbClr val="000000"/>
-                </a:solidFill>
-                <a:uFill>
-                  <a:solidFill>
-                    <a:srgbClr val="ffffff"/>
-                  </a:solidFill>
-                </a:uFill>
-                <a:latin typeface="Corbel"/>
-                <a:ea typeface="DejaVu Sans"/>
-              </a:rPr>
-              <a:t>Dus met het SMTP protocol over het Internet</a:t>
-            </a:r>
-            <a:endParaRPr b="0" lang="nl-NL" sz="1800" spc="-1" strike="noStrike">
-              <a:solidFill>
-                <a:srgbClr val="000000"/>
-              </a:solidFill>
-              <a:uFill>
-                <a:solidFill>
-                  <a:srgbClr val="ffffff"/>
-                </a:solidFill>
-              </a:uFill>
-              <a:latin typeface="Arial"/>
-            </a:endParaRPr>
-          </a:p>
-          <a:p>
-            <a:pPr marL="285840" indent="-285120">
-              <a:lnSpc>
-                <a:spcPct val="100000"/>
-              </a:lnSpc>
-              <a:buClr>
-                <a:srgbClr val="000000"/>
-              </a:buClr>
-              <a:buFont typeface="Arial"/>
-              <a:buChar char="•"/>
-            </a:pPr>
-            <a:r>
-              <a:rPr b="0" lang="nl-NL" sz="1800" spc="-1" strike="noStrike">
-                <a:solidFill>
-                  <a:srgbClr val="000000"/>
-                </a:solidFill>
-                <a:uFill>
-                  <a:solidFill>
-                    <a:srgbClr val="ffffff"/>
-                  </a:solidFill>
-                </a:uFill>
-                <a:latin typeface="Corbel"/>
-                <a:ea typeface="DejaVu Sans"/>
-              </a:rPr>
-              <a:t>Dat wordt als onvoldoende secure beoordeeld</a:t>
-            </a:r>
-            <a:endParaRPr b="0" lang="nl-NL" sz="1800" spc="-1" strike="noStrike">
-              <a:solidFill>
-                <a:srgbClr val="000000"/>
-              </a:solidFill>
-              <a:uFill>
-                <a:solidFill>
-                  <a:srgbClr val="ffffff"/>
-                </a:solidFill>
-              </a:uFill>
-              <a:latin typeface="Arial"/>
-            </a:endParaRPr>
-          </a:p>
-          <a:p>
-            <a:pPr marL="285840" indent="-285120">
-              <a:lnSpc>
-                <a:spcPct val="100000"/>
-              </a:lnSpc>
-              <a:buClr>
-                <a:srgbClr val="000000"/>
-              </a:buClr>
-              <a:buFont typeface="Arial"/>
-              <a:buChar char="•"/>
-            </a:pPr>
-            <a:r>
-              <a:rPr b="0" lang="nl-NL" sz="1800" spc="-1" strike="noStrike">
-                <a:solidFill>
-                  <a:srgbClr val="000000"/>
-                </a:solidFill>
-                <a:uFill>
-                  <a:solidFill>
-                    <a:srgbClr val="ffffff"/>
-                  </a:solidFill>
-                </a:uFill>
-                <a:latin typeface="Corbel"/>
-                <a:ea typeface="DejaVu Sans"/>
-              </a:rPr>
-              <a:t>In ieder geval niet geschikt voor dit soort informatie</a:t>
+              <a:t>...</a:t>
             </a:r>
             <a:endParaRPr b="0" lang="nl-NL" sz="1800" spc="-1" strike="noStrike">
               <a:solidFill>

</xml_diff>

<commit_message>
Procesnamen en kleur van de Representation componentjes aangepast
</commit_message>
<xml_diff>
--- a/Architectuurcontext - Sarphati.pptx
+++ b/Architectuurcontext - Sarphati.pptx
@@ -6,7 +6,7 @@
     <p:sldMasterId id="2147483661" r:id="rId2"/>
   </p:sldMasterIdLst>
   <p:notesMasterIdLst>
-    <p:notesMasterId r:id="rId16"/>
+    <p:notesMasterId r:id="rId14"/>
   </p:notesMasterIdLst>
   <p:sldIdLst>
     <p:sldId id="256" r:id="rId3"/>
@@ -14,14 +14,12 @@
     <p:sldId id="257" r:id="rId5"/>
     <p:sldId id="266" r:id="rId6"/>
     <p:sldId id="267" r:id="rId7"/>
-    <p:sldId id="268" r:id="rId8"/>
-    <p:sldId id="258" r:id="rId9"/>
-    <p:sldId id="259" r:id="rId10"/>
-    <p:sldId id="260" r:id="rId11"/>
-    <p:sldId id="261" r:id="rId12"/>
-    <p:sldId id="262" r:id="rId13"/>
-    <p:sldId id="263" r:id="rId14"/>
-    <p:sldId id="264" r:id="rId15"/>
+    <p:sldId id="269" r:id="rId8"/>
+    <p:sldId id="268" r:id="rId9"/>
+    <p:sldId id="270" r:id="rId10"/>
+    <p:sldId id="258" r:id="rId11"/>
+    <p:sldId id="259" r:id="rId12"/>
+    <p:sldId id="260" r:id="rId13"/>
   </p:sldIdLst>
   <p:sldSz cx="9144000" cy="6858000" type="screen4x3"/>
   <p:notesSz cx="6858000" cy="9144000"/>
@@ -120,6 +118,22 @@
       </a:defRPr>
     </a:lvl9pPr>
   </p:defaultTextStyle>
+  <p:extLst>
+    <p:ext uri="{EFAFB233-063F-42B5-8137-9DF3F51BA10A}">
+      <p15:sldGuideLst xmlns:p15="http://schemas.microsoft.com/office/powerpoint/2012/main">
+        <p15:guide id="1" orient="horz" pos="2160">
+          <p15:clr>
+            <a:srgbClr val="A4A3A4"/>
+          </p15:clr>
+        </p15:guide>
+        <p15:guide id="2" pos="2880">
+          <p15:clr>
+            <a:srgbClr val="A4A3A4"/>
+          </p15:clr>
+        </p15:guide>
+      </p15:sldGuideLst>
+    </p:ext>
+  </p:extLst>
 </p:presentation>
 </file>
 
@@ -359,6 +373,11 @@
         </p:txBody>
       </p:sp>
     </p:spTree>
+    <p:extLst>
+      <p:ext uri="{BB962C8B-B14F-4D97-AF65-F5344CB8AC3E}">
+        <p14:creationId xmlns:p14="http://schemas.microsoft.com/office/powerpoint/2010/main" val="3511470743"/>
+      </p:ext>
+    </p:extLst>
   </p:cSld>
   <p:clrMap bg1="lt1" tx1="dk1" bg2="lt2" tx2="dk2" accent1="accent1" accent2="accent2" accent3="accent3" accent4="accent4" accent5="accent5" accent6="accent6" hlink="hlink" folHlink="folHlink"/>
   <p:notesStyle>
@@ -579,7 +598,7 @@
                 <a:latin typeface="+mn-lt"/>
                 <a:ea typeface="+mn-ea"/>
               </a:rPr>
-              <a:t>8</a:t>
+              <a:t>10</a:t>
             </a:fld>
             <a:endParaRPr lang="nl-NL" sz="1800" b="0" strike="noStrike" spc="-1">
               <a:solidFill>
@@ -726,617 +745,7 @@
                 <a:latin typeface="+mn-lt"/>
                 <a:ea typeface="+mn-ea"/>
               </a:rPr>
-              <a:t>9</a:t>
-            </a:fld>
-            <a:endParaRPr lang="nl-NL" sz="1800" b="0" strike="noStrike" spc="-1">
-              <a:solidFill>
-                <a:srgbClr val="000000"/>
-              </a:solidFill>
-              <a:uFill>
-                <a:solidFill>
-                  <a:srgbClr val="FFFFFF"/>
-                </a:solidFill>
-              </a:uFill>
-              <a:latin typeface="Arial"/>
-            </a:endParaRPr>
-          </a:p>
-        </p:txBody>
-      </p:sp>
-    </p:spTree>
-  </p:cSld>
-  <p:clrMapOvr>
-    <a:masterClrMapping/>
-  </p:clrMapOvr>
-</p:notes>
-</file>
-
-<file path=ppt/notesSlides/notesSlide3.xml><?xml version="1.0" encoding="utf-8"?>
-<p:notes xmlns:a="http://schemas.openxmlformats.org/drawingml/2006/main" xmlns:r="http://schemas.openxmlformats.org/officeDocument/2006/relationships" xmlns:p="http://schemas.openxmlformats.org/presentationml/2006/main">
-  <p:cSld>
-    <p:spTree>
-      <p:nvGrpSpPr>
-        <p:cNvPr id="1" name=""/>
-        <p:cNvGrpSpPr/>
-        <p:nvPr/>
-      </p:nvGrpSpPr>
-      <p:grpSpPr>
-        <a:xfrm>
-          <a:off x="0" y="0"/>
-          <a:ext cx="0" cy="0"/>
-          <a:chOff x="0" y="0"/>
-          <a:chExt cx="0" cy="0"/>
-        </a:xfrm>
-      </p:grpSpPr>
-      <p:sp>
-        <p:nvSpPr>
-          <p:cNvPr id="139" name="PlaceHolder 1"/>
-          <p:cNvSpPr>
-            <a:spLocks noGrp="1"/>
-          </p:cNvSpPr>
-          <p:nvPr>
-            <p:ph type="body"/>
-          </p:nvPr>
-        </p:nvSpPr>
-        <p:spPr>
-          <a:xfrm>
-            <a:off x="685800" y="4343400"/>
-            <a:ext cx="5485680" cy="4114080"/>
-          </a:xfrm>
-          <a:prstGeom prst="rect">
-            <a:avLst/>
-          </a:prstGeom>
-        </p:spPr>
-        <p:txBody>
-          <a:bodyPr lIns="0" tIns="0" rIns="0" bIns="0"/>
-          <a:lstStyle/>
-          <a:p>
-            <a:r>
-              <a:rPr lang="nl-NL" sz="2000" b="0" strike="noStrike" spc="-1">
-                <a:solidFill>
-                  <a:srgbClr val="000000"/>
-                </a:solidFill>
-                <a:uFill>
-                  <a:solidFill>
-                    <a:srgbClr val="FFFFFF"/>
-                  </a:solidFill>
-                </a:uFill>
-                <a:latin typeface="Arial"/>
-              </a:rPr>
-              <a:t>Speelt de ombudsman nog een actieve noemenswaardige rol in deze situatie of alleen bij uitzondering?</a:t>
-            </a:r>
-          </a:p>
-          <a:p>
-            <a:endParaRPr lang="nl-NL" sz="2000" b="0" strike="noStrike" spc="-1">
-              <a:solidFill>
-                <a:srgbClr val="000000"/>
-              </a:solidFill>
-              <a:uFill>
-                <a:solidFill>
-                  <a:srgbClr val="FFFFFF"/>
-                </a:solidFill>
-              </a:uFill>
-              <a:latin typeface="Arial"/>
-            </a:endParaRPr>
-          </a:p>
-        </p:txBody>
-      </p:sp>
-      <p:sp>
-        <p:nvSpPr>
-          <p:cNvPr id="140" name="CustomShape 2"/>
-          <p:cNvSpPr/>
-          <p:nvPr/>
-        </p:nvSpPr>
-        <p:spPr>
-          <a:xfrm>
-            <a:off x="3884760" y="8685360"/>
-            <a:ext cx="2971080" cy="456480"/>
-          </a:xfrm>
-          <a:prstGeom prst="rect">
-            <a:avLst/>
-          </a:prstGeom>
-          <a:noFill/>
-          <a:ln>
-            <a:noFill/>
-          </a:ln>
-        </p:spPr>
-        <p:style>
-          <a:lnRef idx="0">
-            <a:scrgbClr r="0" g="0" b="0"/>
-          </a:lnRef>
-          <a:fillRef idx="0">
-            <a:scrgbClr r="0" g="0" b="0"/>
-          </a:fillRef>
-          <a:effectRef idx="0">
-            <a:scrgbClr r="0" g="0" b="0"/>
-          </a:effectRef>
-          <a:fontRef idx="minor"/>
-        </p:style>
-        <p:txBody>
-          <a:bodyPr lIns="90000" tIns="45000" rIns="90000" bIns="45000" anchor="b"/>
-          <a:lstStyle/>
-          <a:p>
-            <a:pPr algn="r">
-              <a:lnSpc>
-                <a:spcPct val="100000"/>
-              </a:lnSpc>
-            </a:pPr>
-            <a:fld id="{483C5B34-DCE1-48D7-A8BF-19B1A2E8B394}" type="slidenum">
-              <a:rPr lang="nl-NL" sz="1200" b="0" strike="noStrike" spc="-1">
-                <a:solidFill>
-                  <a:srgbClr val="000000"/>
-                </a:solidFill>
-                <a:uFill>
-                  <a:solidFill>
-                    <a:srgbClr val="FFFFFF"/>
-                  </a:solidFill>
-                </a:uFill>
-                <a:latin typeface="+mn-lt"/>
-                <a:ea typeface="+mn-ea"/>
-              </a:rPr>
-              <a:t>10</a:t>
-            </a:fld>
-            <a:endParaRPr lang="nl-NL" sz="1800" b="0" strike="noStrike" spc="-1">
-              <a:solidFill>
-                <a:srgbClr val="000000"/>
-              </a:solidFill>
-              <a:uFill>
-                <a:solidFill>
-                  <a:srgbClr val="FFFFFF"/>
-                </a:solidFill>
-              </a:uFill>
-              <a:latin typeface="Arial"/>
-            </a:endParaRPr>
-          </a:p>
-        </p:txBody>
-      </p:sp>
-    </p:spTree>
-  </p:cSld>
-  <p:clrMapOvr>
-    <a:masterClrMapping/>
-  </p:clrMapOvr>
-</p:notes>
-</file>
-
-<file path=ppt/notesSlides/notesSlide4.xml><?xml version="1.0" encoding="utf-8"?>
-<p:notes xmlns:a="http://schemas.openxmlformats.org/drawingml/2006/main" xmlns:r="http://schemas.openxmlformats.org/officeDocument/2006/relationships" xmlns:p="http://schemas.openxmlformats.org/presentationml/2006/main">
-  <p:cSld>
-    <p:spTree>
-      <p:nvGrpSpPr>
-        <p:cNvPr id="1" name=""/>
-        <p:cNvGrpSpPr/>
-        <p:nvPr/>
-      </p:nvGrpSpPr>
-      <p:grpSpPr>
-        <a:xfrm>
-          <a:off x="0" y="0"/>
-          <a:ext cx="0" cy="0"/>
-          <a:chOff x="0" y="0"/>
-          <a:chExt cx="0" cy="0"/>
-        </a:xfrm>
-      </p:grpSpPr>
-      <p:sp>
-        <p:nvSpPr>
-          <p:cNvPr id="141" name="PlaceHolder 1"/>
-          <p:cNvSpPr>
-            <a:spLocks noGrp="1"/>
-          </p:cNvSpPr>
-          <p:nvPr>
-            <p:ph type="body"/>
-          </p:nvPr>
-        </p:nvSpPr>
-        <p:spPr>
-          <a:xfrm>
-            <a:off x="685800" y="4343400"/>
-            <a:ext cx="5485680" cy="4114080"/>
-          </a:xfrm>
-          <a:prstGeom prst="rect">
-            <a:avLst/>
-          </a:prstGeom>
-        </p:spPr>
-        <p:txBody>
-          <a:bodyPr lIns="0" tIns="0" rIns="0" bIns="0"/>
-          <a:lstStyle/>
-          <a:p>
-            <a:r>
-              <a:rPr lang="nl-NL" sz="2000" b="0" strike="noStrike" spc="-1">
-                <a:solidFill>
-                  <a:srgbClr val="000000"/>
-                </a:solidFill>
-                <a:uFill>
-                  <a:solidFill>
-                    <a:srgbClr val="FFFFFF"/>
-                  </a:solidFill>
-                </a:uFill>
-                <a:latin typeface="Arial"/>
-              </a:rPr>
-              <a:t>Speelt de ombudsman nog een actieve noemenswaardige rol in deze situatie of alleen bij uitzondering?</a:t>
-            </a:r>
-          </a:p>
-          <a:p>
-            <a:endParaRPr lang="nl-NL" sz="2000" b="0" strike="noStrike" spc="-1">
-              <a:solidFill>
-                <a:srgbClr val="000000"/>
-              </a:solidFill>
-              <a:uFill>
-                <a:solidFill>
-                  <a:srgbClr val="FFFFFF"/>
-                </a:solidFill>
-              </a:uFill>
-              <a:latin typeface="Arial"/>
-            </a:endParaRPr>
-          </a:p>
-        </p:txBody>
-      </p:sp>
-      <p:sp>
-        <p:nvSpPr>
-          <p:cNvPr id="142" name="CustomShape 2"/>
-          <p:cNvSpPr/>
-          <p:nvPr/>
-        </p:nvSpPr>
-        <p:spPr>
-          <a:xfrm>
-            <a:off x="3884760" y="8685360"/>
-            <a:ext cx="2971080" cy="456480"/>
-          </a:xfrm>
-          <a:prstGeom prst="rect">
-            <a:avLst/>
-          </a:prstGeom>
-          <a:noFill/>
-          <a:ln>
-            <a:noFill/>
-          </a:ln>
-        </p:spPr>
-        <p:style>
-          <a:lnRef idx="0">
-            <a:scrgbClr r="0" g="0" b="0"/>
-          </a:lnRef>
-          <a:fillRef idx="0">
-            <a:scrgbClr r="0" g="0" b="0"/>
-          </a:fillRef>
-          <a:effectRef idx="0">
-            <a:scrgbClr r="0" g="0" b="0"/>
-          </a:effectRef>
-          <a:fontRef idx="minor"/>
-        </p:style>
-        <p:txBody>
-          <a:bodyPr lIns="90000" tIns="45000" rIns="90000" bIns="45000" anchor="b"/>
-          <a:lstStyle/>
-          <a:p>
-            <a:pPr algn="r">
-              <a:lnSpc>
-                <a:spcPct val="100000"/>
-              </a:lnSpc>
-            </a:pPr>
-            <a:fld id="{F080FA0A-2010-470A-ABCB-8D1BDB30B438}" type="slidenum">
-              <a:rPr lang="nl-NL" sz="1200" b="0" strike="noStrike" spc="-1">
-                <a:solidFill>
-                  <a:srgbClr val="000000"/>
-                </a:solidFill>
-                <a:uFill>
-                  <a:solidFill>
-                    <a:srgbClr val="FFFFFF"/>
-                  </a:solidFill>
-                </a:uFill>
-                <a:latin typeface="+mn-lt"/>
-                <a:ea typeface="+mn-ea"/>
-              </a:rPr>
               <a:t>11</a:t>
-            </a:fld>
-            <a:endParaRPr lang="nl-NL" sz="1800" b="0" strike="noStrike" spc="-1">
-              <a:solidFill>
-                <a:srgbClr val="000000"/>
-              </a:solidFill>
-              <a:uFill>
-                <a:solidFill>
-                  <a:srgbClr val="FFFFFF"/>
-                </a:solidFill>
-              </a:uFill>
-              <a:latin typeface="Arial"/>
-            </a:endParaRPr>
-          </a:p>
-        </p:txBody>
-      </p:sp>
-    </p:spTree>
-  </p:cSld>
-  <p:clrMapOvr>
-    <a:masterClrMapping/>
-  </p:clrMapOvr>
-</p:notes>
-</file>
-
-<file path=ppt/notesSlides/notesSlide5.xml><?xml version="1.0" encoding="utf-8"?>
-<p:notes xmlns:a="http://schemas.openxmlformats.org/drawingml/2006/main" xmlns:r="http://schemas.openxmlformats.org/officeDocument/2006/relationships" xmlns:p="http://schemas.openxmlformats.org/presentationml/2006/main">
-  <p:cSld>
-    <p:spTree>
-      <p:nvGrpSpPr>
-        <p:cNvPr id="1" name=""/>
-        <p:cNvGrpSpPr/>
-        <p:nvPr/>
-      </p:nvGrpSpPr>
-      <p:grpSpPr>
-        <a:xfrm>
-          <a:off x="0" y="0"/>
-          <a:ext cx="0" cy="0"/>
-          <a:chOff x="0" y="0"/>
-          <a:chExt cx="0" cy="0"/>
-        </a:xfrm>
-      </p:grpSpPr>
-      <p:sp>
-        <p:nvSpPr>
-          <p:cNvPr id="143" name="PlaceHolder 1"/>
-          <p:cNvSpPr>
-            <a:spLocks noGrp="1"/>
-          </p:cNvSpPr>
-          <p:nvPr>
-            <p:ph type="body"/>
-          </p:nvPr>
-        </p:nvSpPr>
-        <p:spPr>
-          <a:xfrm>
-            <a:off x="685800" y="4343400"/>
-            <a:ext cx="5485680" cy="4114080"/>
-          </a:xfrm>
-          <a:prstGeom prst="rect">
-            <a:avLst/>
-          </a:prstGeom>
-        </p:spPr>
-        <p:txBody>
-          <a:bodyPr lIns="0" tIns="0" rIns="0" bIns="0"/>
-          <a:lstStyle/>
-          <a:p>
-            <a:r>
-              <a:rPr lang="nl-NL" sz="2000" b="0" strike="noStrike" spc="-1">
-                <a:solidFill>
-                  <a:srgbClr val="000000"/>
-                </a:solidFill>
-                <a:uFill>
-                  <a:solidFill>
-                    <a:srgbClr val="FFFFFF"/>
-                  </a:solidFill>
-                </a:uFill>
-                <a:latin typeface="Arial"/>
-              </a:rPr>
-              <a:t>Speelt de ombudsman nog een actieve noemenswaardige rol in deze situatie of alleen bij uitzondering?</a:t>
-            </a:r>
-            <a:endParaRPr lang="nl-NL" sz="1800" b="0" strike="noStrike" spc="-1">
-              <a:solidFill>
-                <a:srgbClr val="000000"/>
-              </a:solidFill>
-              <a:uFill>
-                <a:solidFill>
-                  <a:srgbClr val="FFFFFF"/>
-                </a:solidFill>
-              </a:uFill>
-              <a:latin typeface="Arial"/>
-            </a:endParaRPr>
-          </a:p>
-          <a:p>
-            <a:endParaRPr lang="nl-NL" sz="1800" b="0" strike="noStrike" spc="-1">
-              <a:solidFill>
-                <a:srgbClr val="000000"/>
-              </a:solidFill>
-              <a:uFill>
-                <a:solidFill>
-                  <a:srgbClr val="FFFFFF"/>
-                </a:solidFill>
-              </a:uFill>
-              <a:latin typeface="Arial"/>
-            </a:endParaRPr>
-          </a:p>
-        </p:txBody>
-      </p:sp>
-      <p:sp>
-        <p:nvSpPr>
-          <p:cNvPr id="144" name="CustomShape 2"/>
-          <p:cNvSpPr/>
-          <p:nvPr/>
-        </p:nvSpPr>
-        <p:spPr>
-          <a:xfrm>
-            <a:off x="3884760" y="8685360"/>
-            <a:ext cx="2971080" cy="456480"/>
-          </a:xfrm>
-          <a:prstGeom prst="rect">
-            <a:avLst/>
-          </a:prstGeom>
-          <a:noFill/>
-          <a:ln>
-            <a:noFill/>
-          </a:ln>
-        </p:spPr>
-        <p:style>
-          <a:lnRef idx="0">
-            <a:scrgbClr r="0" g="0" b="0"/>
-          </a:lnRef>
-          <a:fillRef idx="0">
-            <a:scrgbClr r="0" g="0" b="0"/>
-          </a:fillRef>
-          <a:effectRef idx="0">
-            <a:scrgbClr r="0" g="0" b="0"/>
-          </a:effectRef>
-          <a:fontRef idx="minor"/>
-        </p:style>
-        <p:txBody>
-          <a:bodyPr lIns="90000" tIns="45000" rIns="90000" bIns="45000" anchor="b"/>
-          <a:lstStyle/>
-          <a:p>
-            <a:pPr algn="r">
-              <a:lnSpc>
-                <a:spcPct val="100000"/>
-              </a:lnSpc>
-            </a:pPr>
-            <a:fld id="{F44574FA-4CFC-4F0E-A9A8-BB114942B73C}" type="slidenum">
-              <a:rPr lang="nl-NL" sz="1200" b="0" strike="noStrike" spc="-1">
-                <a:solidFill>
-                  <a:srgbClr val="000000"/>
-                </a:solidFill>
-                <a:uFill>
-                  <a:solidFill>
-                    <a:srgbClr val="FFFFFF"/>
-                  </a:solidFill>
-                </a:uFill>
-                <a:latin typeface="+mn-lt"/>
-                <a:ea typeface="+mn-ea"/>
-              </a:rPr>
-              <a:t>12</a:t>
-            </a:fld>
-            <a:endParaRPr lang="nl-NL" sz="1800" b="0" strike="noStrike" spc="-1">
-              <a:solidFill>
-                <a:srgbClr val="000000"/>
-              </a:solidFill>
-              <a:uFill>
-                <a:solidFill>
-                  <a:srgbClr val="FFFFFF"/>
-                </a:solidFill>
-              </a:uFill>
-              <a:latin typeface="Arial"/>
-            </a:endParaRPr>
-          </a:p>
-        </p:txBody>
-      </p:sp>
-    </p:spTree>
-  </p:cSld>
-  <p:clrMapOvr>
-    <a:masterClrMapping/>
-  </p:clrMapOvr>
-</p:notes>
-</file>
-
-<file path=ppt/notesSlides/notesSlide6.xml><?xml version="1.0" encoding="utf-8"?>
-<p:notes xmlns:a="http://schemas.openxmlformats.org/drawingml/2006/main" xmlns:r="http://schemas.openxmlformats.org/officeDocument/2006/relationships" xmlns:p="http://schemas.openxmlformats.org/presentationml/2006/main">
-  <p:cSld>
-    <p:spTree>
-      <p:nvGrpSpPr>
-        <p:cNvPr id="1" name=""/>
-        <p:cNvGrpSpPr/>
-        <p:nvPr/>
-      </p:nvGrpSpPr>
-      <p:grpSpPr>
-        <a:xfrm>
-          <a:off x="0" y="0"/>
-          <a:ext cx="0" cy="0"/>
-          <a:chOff x="0" y="0"/>
-          <a:chExt cx="0" cy="0"/>
-        </a:xfrm>
-      </p:grpSpPr>
-      <p:sp>
-        <p:nvSpPr>
-          <p:cNvPr id="145" name="PlaceHolder 1"/>
-          <p:cNvSpPr>
-            <a:spLocks noGrp="1"/>
-          </p:cNvSpPr>
-          <p:nvPr>
-            <p:ph type="body"/>
-          </p:nvPr>
-        </p:nvSpPr>
-        <p:spPr>
-          <a:xfrm>
-            <a:off x="685800" y="4343400"/>
-            <a:ext cx="5485680" cy="4114080"/>
-          </a:xfrm>
-          <a:prstGeom prst="rect">
-            <a:avLst/>
-          </a:prstGeom>
-        </p:spPr>
-        <p:txBody>
-          <a:bodyPr lIns="0" tIns="0" rIns="0" bIns="0"/>
-          <a:lstStyle/>
-          <a:p>
-            <a:r>
-              <a:rPr lang="nl-NL" sz="2000" b="0" strike="noStrike" spc="-1">
-                <a:solidFill>
-                  <a:srgbClr val="000000"/>
-                </a:solidFill>
-                <a:uFill>
-                  <a:solidFill>
-                    <a:srgbClr val="FFFFFF"/>
-                  </a:solidFill>
-                </a:uFill>
-                <a:latin typeface="Arial"/>
-              </a:rPr>
-              <a:t>Speelt de ombudsman nog een actieve noemenswaardige rol in deze situatie of alleen bij uitzondering?</a:t>
-            </a:r>
-            <a:endParaRPr lang="nl-NL" sz="1800" b="0" strike="noStrike" spc="-1">
-              <a:solidFill>
-                <a:srgbClr val="000000"/>
-              </a:solidFill>
-              <a:uFill>
-                <a:solidFill>
-                  <a:srgbClr val="FFFFFF"/>
-                </a:solidFill>
-              </a:uFill>
-              <a:latin typeface="Arial"/>
-            </a:endParaRPr>
-          </a:p>
-          <a:p>
-            <a:endParaRPr lang="nl-NL" sz="1800" b="0" strike="noStrike" spc="-1">
-              <a:solidFill>
-                <a:srgbClr val="000000"/>
-              </a:solidFill>
-              <a:uFill>
-                <a:solidFill>
-                  <a:srgbClr val="FFFFFF"/>
-                </a:solidFill>
-              </a:uFill>
-              <a:latin typeface="Arial"/>
-            </a:endParaRPr>
-          </a:p>
-        </p:txBody>
-      </p:sp>
-      <p:sp>
-        <p:nvSpPr>
-          <p:cNvPr id="146" name="CustomShape 2"/>
-          <p:cNvSpPr/>
-          <p:nvPr/>
-        </p:nvSpPr>
-        <p:spPr>
-          <a:xfrm>
-            <a:off x="3884760" y="8685360"/>
-            <a:ext cx="2971080" cy="456480"/>
-          </a:xfrm>
-          <a:prstGeom prst="rect">
-            <a:avLst/>
-          </a:prstGeom>
-          <a:noFill/>
-          <a:ln>
-            <a:noFill/>
-          </a:ln>
-        </p:spPr>
-        <p:style>
-          <a:lnRef idx="0">
-            <a:scrgbClr r="0" g="0" b="0"/>
-          </a:lnRef>
-          <a:fillRef idx="0">
-            <a:scrgbClr r="0" g="0" b="0"/>
-          </a:fillRef>
-          <a:effectRef idx="0">
-            <a:scrgbClr r="0" g="0" b="0"/>
-          </a:effectRef>
-          <a:fontRef idx="minor"/>
-        </p:style>
-        <p:txBody>
-          <a:bodyPr lIns="90000" tIns="45000" rIns="90000" bIns="45000" anchor="b"/>
-          <a:lstStyle/>
-          <a:p>
-            <a:pPr algn="r">
-              <a:lnSpc>
-                <a:spcPct val="100000"/>
-              </a:lnSpc>
-            </a:pPr>
-            <a:fld id="{4D717EC1-302F-4453-B16D-3E049C7AD827}" type="slidenum">
-              <a:rPr lang="nl-NL" sz="1200" b="0" strike="noStrike" spc="-1">
-                <a:solidFill>
-                  <a:srgbClr val="000000"/>
-                </a:solidFill>
-                <a:uFill>
-                  <a:solidFill>
-                    <a:srgbClr val="FFFFFF"/>
-                  </a:solidFill>
-                </a:uFill>
-                <a:latin typeface="+mn-lt"/>
-                <a:ea typeface="+mn-ea"/>
-              </a:rPr>
-              <a:t>13</a:t>
             </a:fld>
             <a:endParaRPr lang="nl-NL" sz="1800" b="0" strike="noStrike" spc="-1">
               <a:solidFill>
@@ -9920,7 +9329,7 @@
       </p:grpSpPr>
       <p:sp>
         <p:nvSpPr>
-          <p:cNvPr id="127" name="CustomShape 1"/>
+          <p:cNvPr id="121" name="CustomShape 1"/>
           <p:cNvSpPr/>
           <p:nvPr/>
         </p:nvSpPr>
@@ -9959,7 +9368,7 @@
               </a:lnSpc>
             </a:pPr>
             <a:r>
-              <a:rPr lang="nl-NL" sz="3500" b="1" strike="noStrike" spc="-1">
+              <a:rPr lang="nl-NL" sz="3500" b="1" strike="noStrike" spc="-1" dirty="0">
                 <a:solidFill>
                   <a:srgbClr val="FF0000"/>
                 </a:solidFill>
@@ -9970,25 +9379,14 @@
                 </a:uFill>
                 <a:latin typeface="Corbel"/>
               </a:rPr>
-              <a:t>Huidige situatie, bedrijfslaag </a:t>
+              <a:t>Huidige situatie IV</a:t>
             </a:r>
-            <a:endParaRPr lang="nl-NL" sz="1800" b="0" strike="noStrike" spc="-1">
-              <a:solidFill>
-                <a:srgbClr val="000000"/>
-              </a:solidFill>
-              <a:uFill>
-                <a:solidFill>
-                  <a:srgbClr val="FFFFFF"/>
-                </a:solidFill>
-              </a:uFill>
-              <a:latin typeface="Arial"/>
-            </a:endParaRPr>
           </a:p>
         </p:txBody>
       </p:sp>
       <p:sp>
         <p:nvSpPr>
-          <p:cNvPr id="128" name="CustomShape 2"/>
+          <p:cNvPr id="122" name="CustomShape 2"/>
           <p:cNvSpPr/>
           <p:nvPr/>
         </p:nvSpPr>
@@ -10039,7 +9437,7 @@
                 <a:latin typeface="Corbel"/>
                 <a:ea typeface="DejaVu Sans"/>
               </a:rPr>
-              <a:t>...</a:t>
+              <a:t>Verifying parent identity is an extra task for the nurse practitioner.</a:t>
             </a:r>
             <a:endParaRPr lang="nl-NL" sz="1800" b="0" strike="noStrike" spc="-1">
               <a:solidFill>
@@ -10053,8 +9451,130 @@
               <a:latin typeface="Arial"/>
             </a:endParaRPr>
           </a:p>
+          <a:p>
+            <a:pPr>
+              <a:lnSpc>
+                <a:spcPct val="100000"/>
+              </a:lnSpc>
+            </a:pPr>
+            <a:r>
+              <a:rPr lang="nl-NL" sz="1800" b="0" strike="noStrike" spc="-1">
+                <a:solidFill>
+                  <a:srgbClr val="000000"/>
+                </a:solidFill>
+                <a:uFill>
+                  <a:solidFill>
+                    <a:srgbClr val="FFFFFF"/>
+                  </a:solidFill>
+                </a:uFill>
+                <a:latin typeface="Corbel"/>
+                <a:ea typeface="DejaVu Sans"/>
+              </a:rPr>
+              <a:t>Consent and questionnaire data is gathered on paper.</a:t>
+            </a:r>
+            <a:endParaRPr lang="nl-NL" sz="1800" b="0" strike="noStrike" spc="-1">
+              <a:solidFill>
+                <a:srgbClr val="000000"/>
+              </a:solidFill>
+              <a:uFill>
+                <a:solidFill>
+                  <a:srgbClr val="FFFFFF"/>
+                </a:solidFill>
+              </a:uFill>
+              <a:latin typeface="Arial"/>
+            </a:endParaRPr>
+          </a:p>
+          <a:p>
+            <a:pPr>
+              <a:lnSpc>
+                <a:spcPct val="100000"/>
+              </a:lnSpc>
+            </a:pPr>
+            <a:r>
+              <a:rPr lang="nl-NL" sz="1800" b="0" strike="noStrike" spc="-1">
+                <a:solidFill>
+                  <a:srgbClr val="000000"/>
+                </a:solidFill>
+                <a:uFill>
+                  <a:solidFill>
+                    <a:srgbClr val="FFFFFF"/>
+                  </a:solidFill>
+                </a:uFill>
+                <a:latin typeface="Corbel"/>
+                <a:ea typeface="DejaVu Sans"/>
+              </a:rPr>
+              <a:t>Data files are stored separately on network shares within the GGD LAN.</a:t>
+            </a:r>
+            <a:endParaRPr lang="nl-NL" sz="1800" b="0" strike="noStrike" spc="-1">
+              <a:solidFill>
+                <a:srgbClr val="000000"/>
+              </a:solidFill>
+              <a:uFill>
+                <a:solidFill>
+                  <a:srgbClr val="FFFFFF"/>
+                </a:solidFill>
+              </a:uFill>
+              <a:latin typeface="Arial"/>
+            </a:endParaRPr>
+          </a:p>
+          <a:p>
+            <a:pPr>
+              <a:lnSpc>
+                <a:spcPct val="100000"/>
+              </a:lnSpc>
+            </a:pPr>
+            <a:r>
+              <a:rPr lang="nl-NL" sz="1800" b="0" strike="noStrike" spc="-1">
+                <a:solidFill>
+                  <a:srgbClr val="000000"/>
+                </a:solidFill>
+                <a:uFill>
+                  <a:solidFill>
+                    <a:srgbClr val="FFFFFF"/>
+                  </a:solidFill>
+                </a:uFill>
+                <a:latin typeface="Corbel"/>
+                <a:ea typeface="DejaVu Sans"/>
+              </a:rPr>
+              <a:t>Datamanager manually combines the files into anonimized file for the researchers.</a:t>
+            </a:r>
+            <a:endParaRPr lang="nl-NL" sz="1800" b="0" strike="noStrike" spc="-1">
+              <a:solidFill>
+                <a:srgbClr val="000000"/>
+              </a:solidFill>
+              <a:uFill>
+                <a:solidFill>
+                  <a:srgbClr val="FFFFFF"/>
+                </a:solidFill>
+              </a:uFill>
+              <a:latin typeface="Arial"/>
+            </a:endParaRPr>
+          </a:p>
         </p:txBody>
       </p:sp>
+      <p:pic>
+        <p:nvPicPr>
+          <p:cNvPr id="123" name="Afbeelding 122"/>
+          <p:cNvPicPr/>
+          <p:nvPr/>
+        </p:nvPicPr>
+        <p:blipFill>
+          <a:blip r:embed="rId3"/>
+          <a:stretch/>
+        </p:blipFill>
+        <p:spPr>
+          <a:xfrm>
+            <a:off x="909000" y="792000"/>
+            <a:ext cx="7515000" cy="4885920"/>
+          </a:xfrm>
+          <a:prstGeom prst="rect">
+            <a:avLst/>
+          </a:prstGeom>
+          <a:ln>
+            <a:noFill/>
+          </a:ln>
+        </p:spPr>
+      </p:pic>
     </p:spTree>
   </p:cSld>
   <p:clrMapOvr>
@@ -10109,7 +9629,7 @@
       </p:grpSpPr>
       <p:sp>
         <p:nvSpPr>
-          <p:cNvPr id="129" name="CustomShape 1"/>
+          <p:cNvPr id="124" name="CustomShape 1"/>
           <p:cNvSpPr/>
           <p:nvPr/>
         </p:nvSpPr>
@@ -10148,7 +9668,7 @@
               </a:lnSpc>
             </a:pPr>
             <a:r>
-              <a:rPr lang="nl-NL" sz="3500" b="1" strike="noStrike" spc="-1">
+              <a:rPr lang="nl-NL" sz="3500" b="1" strike="noStrike" spc="-1" dirty="0">
                 <a:solidFill>
                   <a:srgbClr val="FF0000"/>
                 </a:solidFill>
@@ -10159,9 +9679,9 @@
                 </a:uFill>
                 <a:latin typeface="Corbel"/>
               </a:rPr>
-              <a:t>Doelsituatie, bedrijfslaag </a:t>
+              <a:t>Doelsituatie IV</a:t>
             </a:r>
-            <a:endParaRPr lang="nl-NL" sz="1800" b="0" strike="noStrike" spc="-1">
+            <a:endParaRPr lang="nl-NL" sz="1800" b="0" strike="noStrike" spc="-1" dirty="0">
               <a:solidFill>
                 <a:srgbClr val="000000"/>
               </a:solidFill>
@@ -10177,7 +9697,7 @@
       </p:sp>
       <p:sp>
         <p:nvSpPr>
-          <p:cNvPr id="130" name="CustomShape 2"/>
+          <p:cNvPr id="125" name="CustomShape 2"/>
           <p:cNvSpPr/>
           <p:nvPr/>
         </p:nvSpPr>
@@ -10216,7 +9736,7 @@
               </a:lnSpc>
             </a:pPr>
             <a:r>
-              <a:rPr lang="nl-NL" sz="1800" b="0" strike="noStrike" spc="-1">
+              <a:rPr lang="nl-NL" sz="1800" b="0" strike="noStrike" spc="-1" dirty="0">
                 <a:solidFill>
                   <a:srgbClr val="000000"/>
                 </a:solidFill>
@@ -10228,184 +9748,10 @@
                 <a:latin typeface="Corbel"/>
                 <a:ea typeface="DejaVu Sans"/>
               </a:rPr>
-              <a:t>...</a:t>
+              <a:t>Consent </a:t>
             </a:r>
-            <a:endParaRPr lang="nl-NL" sz="1800" b="0" strike="noStrike" spc="-1">
-              <a:solidFill>
-                <a:srgbClr val="000000"/>
-              </a:solidFill>
-              <a:uFill>
-                <a:solidFill>
-                  <a:srgbClr val="FFFFFF"/>
-                </a:solidFill>
-              </a:uFill>
-              <a:latin typeface="Arial"/>
-            </a:endParaRPr>
-          </a:p>
-        </p:txBody>
-      </p:sp>
-    </p:spTree>
-  </p:cSld>
-  <p:clrMapOvr>
-    <a:masterClrMapping/>
-  </p:clrMapOvr>
-  <p:timing>
-    <p:tnLst>
-      <p:par>
-        <p:cTn id="1" dur="indefinite" restart="never" nodeType="tmRoot">
-          <p:childTnLst>
-            <p:seq>
-              <p:cTn id="2" nodeType="mainSeq"/>
-              <p:prevCondLst>
-                <p:cond evt="onPrev" delay="0">
-                  <p:tgtEl>
-                    <p:sldTgt/>
-                  </p:tgtEl>
-                </p:cond>
-              </p:prevCondLst>
-              <p:nextCondLst>
-                <p:cond evt="onNext" delay="0">
-                  <p:tgtEl>
-                    <p:sldTgt/>
-                  </p:tgtEl>
-                </p:cond>
-              </p:nextCondLst>
-            </p:seq>
-          </p:childTnLst>
-        </p:cTn>
-      </p:par>
-    </p:tnLst>
-  </p:timing>
-</p:sld>
-</file>
-
-<file path=ppt/slides/slide12.xml><?xml version="1.0" encoding="utf-8"?>
-<p:sld xmlns:a="http://schemas.openxmlformats.org/drawingml/2006/main" xmlns:r="http://schemas.openxmlformats.org/officeDocument/2006/relationships" xmlns:p="http://schemas.openxmlformats.org/presentationml/2006/main">
-  <p:cSld>
-    <p:spTree>
-      <p:nvGrpSpPr>
-        <p:cNvPr id="1" name=""/>
-        <p:cNvGrpSpPr/>
-        <p:nvPr/>
-      </p:nvGrpSpPr>
-      <p:grpSpPr>
-        <a:xfrm>
-          <a:off x="0" y="0"/>
-          <a:ext cx="0" cy="0"/>
-          <a:chOff x="0" y="0"/>
-          <a:chExt cx="0" cy="0"/>
-        </a:xfrm>
-      </p:grpSpPr>
-      <p:sp>
-        <p:nvSpPr>
-          <p:cNvPr id="131" name="CustomShape 1"/>
-          <p:cNvSpPr/>
-          <p:nvPr/>
-        </p:nvSpPr>
-        <p:spPr>
-          <a:xfrm>
-            <a:off x="756720" y="144000"/>
-            <a:ext cx="7595280" cy="1142280"/>
-          </a:xfrm>
-          <a:prstGeom prst="rect">
-            <a:avLst/>
-          </a:prstGeom>
-          <a:noFill/>
-          <a:ln>
-            <a:noFill/>
-          </a:ln>
-        </p:spPr>
-        <p:style>
-          <a:lnRef idx="0">
-            <a:scrgbClr r="0" g="0" b="0"/>
-          </a:lnRef>
-          <a:fillRef idx="0">
-            <a:scrgbClr r="0" g="0" b="0"/>
-          </a:fillRef>
-          <a:effectRef idx="0">
-            <a:scrgbClr r="0" g="0" b="0"/>
-          </a:effectRef>
-          <a:fontRef idx="minor"/>
-        </p:style>
-        <p:txBody>
-          <a:bodyPr lIns="0" tIns="0" rIns="0" bIns="0"/>
-          <a:lstStyle/>
-          <a:p>
-            <a:pPr>
-              <a:lnSpc>
-                <a:spcPct val="100000"/>
-              </a:lnSpc>
-            </a:pPr>
             <a:r>
-              <a:rPr lang="nl-NL" sz="3500" b="1" strike="noStrike" spc="-1">
-                <a:solidFill>
-                  <a:srgbClr val="FF0000"/>
-                </a:solidFill>
-                <a:uFill>
-                  <a:solidFill>
-                    <a:srgbClr val="FFFFFF"/>
-                  </a:solidFill>
-                </a:uFill>
-                <a:latin typeface="Corbel"/>
-              </a:rPr>
-              <a:t>Huidige situatie, informatievoorziening </a:t>
-            </a:r>
-            <a:endParaRPr lang="nl-NL" sz="1800" b="0" strike="noStrike" spc="-1">
-              <a:solidFill>
-                <a:srgbClr val="000000"/>
-              </a:solidFill>
-              <a:uFill>
-                <a:solidFill>
-                  <a:srgbClr val="FFFFFF"/>
-                </a:solidFill>
-              </a:uFill>
-              <a:latin typeface="Arial"/>
-            </a:endParaRPr>
-          </a:p>
-        </p:txBody>
-      </p:sp>
-      <p:sp>
-        <p:nvSpPr>
-          <p:cNvPr id="132" name="CustomShape 2"/>
-          <p:cNvSpPr/>
-          <p:nvPr/>
-        </p:nvSpPr>
-        <p:spPr>
-          <a:xfrm>
-            <a:off x="1432800" y="5589360"/>
-            <a:ext cx="6069240" cy="1097280"/>
-          </a:xfrm>
-          <a:prstGeom prst="rect">
-            <a:avLst/>
-          </a:prstGeom>
-          <a:noFill/>
-          <a:ln>
-            <a:noFill/>
-          </a:ln>
-        </p:spPr>
-        <p:style>
-          <a:lnRef idx="0">
-            <a:scrgbClr r="0" g="0" b="0"/>
-          </a:lnRef>
-          <a:fillRef idx="0">
-            <a:scrgbClr r="0" g="0" b="0"/>
-          </a:fillRef>
-          <a:effectRef idx="0">
-            <a:scrgbClr r="0" g="0" b="0"/>
-          </a:effectRef>
-          <a:fontRef idx="minor"/>
-        </p:style>
-        <p:txBody>
-          <a:bodyPr wrap="none" lIns="0" tIns="0" rIns="0" bIns="0"/>
-          <a:lstStyle/>
-          <a:p>
-            <a:pPr>
-              <a:lnSpc>
-                <a:spcPct val="100000"/>
-              </a:lnSpc>
-            </a:pPr>
-            <a:r>
-              <a:rPr lang="nl-NL" sz="1800" b="0" strike="noStrike" spc="-1">
+              <a:rPr lang="nl-NL" sz="1800" b="0" strike="noStrike" spc="-1" dirty="0" err="1">
                 <a:solidFill>
                   <a:srgbClr val="000000"/>
                 </a:solidFill>
@@ -10417,184 +9763,10 @@
                 <a:latin typeface="Corbel"/>
                 <a:ea typeface="DejaVu Sans"/>
               </a:rPr>
-              <a:t>...</a:t>
+              <a:t>and</a:t>
             </a:r>
-            <a:endParaRPr lang="nl-NL" sz="1800" b="0" strike="noStrike" spc="-1">
-              <a:solidFill>
-                <a:srgbClr val="000000"/>
-              </a:solidFill>
-              <a:uFill>
-                <a:solidFill>
-                  <a:srgbClr val="FFFFFF"/>
-                </a:solidFill>
-              </a:uFill>
-              <a:latin typeface="Arial"/>
-            </a:endParaRPr>
-          </a:p>
-        </p:txBody>
-      </p:sp>
-    </p:spTree>
-  </p:cSld>
-  <p:clrMapOvr>
-    <a:masterClrMapping/>
-  </p:clrMapOvr>
-  <p:timing>
-    <p:tnLst>
-      <p:par>
-        <p:cTn id="1" dur="indefinite" restart="never" nodeType="tmRoot">
-          <p:childTnLst>
-            <p:seq>
-              <p:cTn id="2" nodeType="mainSeq"/>
-              <p:prevCondLst>
-                <p:cond evt="onPrev" delay="0">
-                  <p:tgtEl>
-                    <p:sldTgt/>
-                  </p:tgtEl>
-                </p:cond>
-              </p:prevCondLst>
-              <p:nextCondLst>
-                <p:cond evt="onNext" delay="0">
-                  <p:tgtEl>
-                    <p:sldTgt/>
-                  </p:tgtEl>
-                </p:cond>
-              </p:nextCondLst>
-            </p:seq>
-          </p:childTnLst>
-        </p:cTn>
-      </p:par>
-    </p:tnLst>
-  </p:timing>
-</p:sld>
-</file>
-
-<file path=ppt/slides/slide13.xml><?xml version="1.0" encoding="utf-8"?>
-<p:sld xmlns:a="http://schemas.openxmlformats.org/drawingml/2006/main" xmlns:r="http://schemas.openxmlformats.org/officeDocument/2006/relationships" xmlns:p="http://schemas.openxmlformats.org/presentationml/2006/main">
-  <p:cSld>
-    <p:spTree>
-      <p:nvGrpSpPr>
-        <p:cNvPr id="1" name=""/>
-        <p:cNvGrpSpPr/>
-        <p:nvPr/>
-      </p:nvGrpSpPr>
-      <p:grpSpPr>
-        <a:xfrm>
-          <a:off x="0" y="0"/>
-          <a:ext cx="0" cy="0"/>
-          <a:chOff x="0" y="0"/>
-          <a:chExt cx="0" cy="0"/>
-        </a:xfrm>
-      </p:grpSpPr>
-      <p:sp>
-        <p:nvSpPr>
-          <p:cNvPr id="133" name="CustomShape 1"/>
-          <p:cNvSpPr/>
-          <p:nvPr/>
-        </p:nvSpPr>
-        <p:spPr>
-          <a:xfrm>
-            <a:off x="756720" y="144000"/>
-            <a:ext cx="7595280" cy="1142280"/>
-          </a:xfrm>
-          <a:prstGeom prst="rect">
-            <a:avLst/>
-          </a:prstGeom>
-          <a:noFill/>
-          <a:ln>
-            <a:noFill/>
-          </a:ln>
-        </p:spPr>
-        <p:style>
-          <a:lnRef idx="0">
-            <a:scrgbClr r="0" g="0" b="0"/>
-          </a:lnRef>
-          <a:fillRef idx="0">
-            <a:scrgbClr r="0" g="0" b="0"/>
-          </a:fillRef>
-          <a:effectRef idx="0">
-            <a:scrgbClr r="0" g="0" b="0"/>
-          </a:effectRef>
-          <a:fontRef idx="minor"/>
-        </p:style>
-        <p:txBody>
-          <a:bodyPr lIns="0" tIns="0" rIns="0" bIns="0"/>
-          <a:lstStyle/>
-          <a:p>
-            <a:pPr>
-              <a:lnSpc>
-                <a:spcPct val="100000"/>
-              </a:lnSpc>
-            </a:pPr>
             <a:r>
-              <a:rPr lang="nl-NL" sz="3500" b="1" strike="noStrike" spc="-1">
-                <a:solidFill>
-                  <a:srgbClr val="FF0000"/>
-                </a:solidFill>
-                <a:uFill>
-                  <a:solidFill>
-                    <a:srgbClr val="FFFFFF"/>
-                  </a:solidFill>
-                </a:uFill>
-                <a:latin typeface="Corbel"/>
-              </a:rPr>
-              <a:t>Doelsituatie, informatievoorziening </a:t>
-            </a:r>
-            <a:endParaRPr lang="nl-NL" sz="1800" b="0" strike="noStrike" spc="-1">
-              <a:solidFill>
-                <a:srgbClr val="000000"/>
-              </a:solidFill>
-              <a:uFill>
-                <a:solidFill>
-                  <a:srgbClr val="FFFFFF"/>
-                </a:solidFill>
-              </a:uFill>
-              <a:latin typeface="Arial"/>
-            </a:endParaRPr>
-          </a:p>
-        </p:txBody>
-      </p:sp>
-      <p:sp>
-        <p:nvSpPr>
-          <p:cNvPr id="134" name="CustomShape 2"/>
-          <p:cNvSpPr/>
-          <p:nvPr/>
-        </p:nvSpPr>
-        <p:spPr>
-          <a:xfrm>
-            <a:off x="1432800" y="5589360"/>
-            <a:ext cx="6069240" cy="1097280"/>
-          </a:xfrm>
-          <a:prstGeom prst="rect">
-            <a:avLst/>
-          </a:prstGeom>
-          <a:noFill/>
-          <a:ln>
-            <a:noFill/>
-          </a:ln>
-        </p:spPr>
-        <p:style>
-          <a:lnRef idx="0">
-            <a:scrgbClr r="0" g="0" b="0"/>
-          </a:lnRef>
-          <a:fillRef idx="0">
-            <a:scrgbClr r="0" g="0" b="0"/>
-          </a:fillRef>
-          <a:effectRef idx="0">
-            <a:scrgbClr r="0" g="0" b="0"/>
-          </a:effectRef>
-          <a:fontRef idx="minor"/>
-        </p:style>
-        <p:txBody>
-          <a:bodyPr wrap="none" lIns="0" tIns="0" rIns="0" bIns="0"/>
-          <a:lstStyle/>
-          <a:p>
-            <a:pPr>
-              <a:lnSpc>
-                <a:spcPct val="100000"/>
-              </a:lnSpc>
-            </a:pPr>
-            <a:r>
-              <a:rPr lang="nl-NL" sz="1800" b="0" strike="noStrike" spc="-1">
+              <a:rPr lang="nl-NL" sz="1800" b="0" strike="noStrike" spc="-1" dirty="0">
                 <a:solidFill>
                   <a:srgbClr val="000000"/>
                 </a:solidFill>
@@ -10606,9 +9778,390 @@
                 <a:latin typeface="Corbel"/>
                 <a:ea typeface="DejaVu Sans"/>
               </a:rPr>
-              <a:t>...</a:t>
+              <a:t> questionnaire data is </a:t>
             </a:r>
-            <a:endParaRPr lang="nl-NL" sz="1800" b="0" strike="noStrike" spc="-1">
+            <a:r>
+              <a:rPr lang="nl-NL" sz="1800" b="0" strike="noStrike" spc="-1" dirty="0" err="1">
+                <a:solidFill>
+                  <a:srgbClr val="000000"/>
+                </a:solidFill>
+                <a:uFill>
+                  <a:solidFill>
+                    <a:srgbClr val="FFFFFF"/>
+                  </a:solidFill>
+                </a:uFill>
+                <a:latin typeface="Corbel"/>
+                <a:ea typeface="DejaVu Sans"/>
+              </a:rPr>
+              <a:t>gathered</a:t>
+            </a:r>
+            <a:r>
+              <a:rPr lang="nl-NL" sz="1800" b="0" strike="noStrike" spc="-1" dirty="0">
+                <a:solidFill>
+                  <a:srgbClr val="000000"/>
+                </a:solidFill>
+                <a:uFill>
+                  <a:solidFill>
+                    <a:srgbClr val="FFFFFF"/>
+                  </a:solidFill>
+                </a:uFill>
+                <a:latin typeface="Corbel"/>
+                <a:ea typeface="DejaVu Sans"/>
+              </a:rPr>
+              <a:t> </a:t>
+            </a:r>
+            <a:r>
+              <a:rPr lang="nl-NL" sz="1800" b="0" strike="noStrike" spc="-1" dirty="0" err="1">
+                <a:solidFill>
+                  <a:srgbClr val="000000"/>
+                </a:solidFill>
+                <a:uFill>
+                  <a:solidFill>
+                    <a:srgbClr val="FFFFFF"/>
+                  </a:solidFill>
+                </a:uFill>
+                <a:latin typeface="Corbel"/>
+                <a:ea typeface="DejaVu Sans"/>
+              </a:rPr>
+              <a:t>digitally</a:t>
+            </a:r>
+            <a:r>
+              <a:rPr lang="nl-NL" sz="1800" b="0" strike="noStrike" spc="-1" dirty="0">
+                <a:solidFill>
+                  <a:srgbClr val="000000"/>
+                </a:solidFill>
+                <a:uFill>
+                  <a:solidFill>
+                    <a:srgbClr val="FFFFFF"/>
+                  </a:solidFill>
+                </a:uFill>
+                <a:latin typeface="Corbel"/>
+                <a:ea typeface="DejaVu Sans"/>
+              </a:rPr>
+              <a:t> </a:t>
+            </a:r>
+            <a:r>
+              <a:rPr lang="nl-NL" sz="1800" b="0" strike="noStrike" spc="-1" dirty="0" err="1">
+                <a:solidFill>
+                  <a:srgbClr val="000000"/>
+                </a:solidFill>
+                <a:uFill>
+                  <a:solidFill>
+                    <a:srgbClr val="FFFFFF"/>
+                  </a:solidFill>
+                </a:uFill>
+                <a:latin typeface="Corbel"/>
+                <a:ea typeface="DejaVu Sans"/>
+              </a:rPr>
+              <a:t>trough</a:t>
+            </a:r>
+            <a:r>
+              <a:rPr lang="nl-NL" sz="1800" b="0" strike="noStrike" spc="-1" dirty="0">
+                <a:solidFill>
+                  <a:srgbClr val="000000"/>
+                </a:solidFill>
+                <a:uFill>
+                  <a:solidFill>
+                    <a:srgbClr val="FFFFFF"/>
+                  </a:solidFill>
+                </a:uFill>
+                <a:latin typeface="Corbel"/>
+                <a:ea typeface="DejaVu Sans"/>
+              </a:rPr>
+              <a:t> a (web) app.</a:t>
+            </a:r>
+            <a:endParaRPr lang="nl-NL" sz="1800" b="0" strike="noStrike" spc="-1" dirty="0">
+              <a:solidFill>
+                <a:srgbClr val="000000"/>
+              </a:solidFill>
+              <a:uFill>
+                <a:solidFill>
+                  <a:srgbClr val="FFFFFF"/>
+                </a:solidFill>
+              </a:uFill>
+              <a:latin typeface="Arial"/>
+            </a:endParaRPr>
+          </a:p>
+          <a:p>
+            <a:pPr>
+              <a:lnSpc>
+                <a:spcPct val="100000"/>
+              </a:lnSpc>
+            </a:pPr>
+            <a:r>
+              <a:rPr lang="nl-NL" sz="1800" b="0" strike="noStrike" spc="-1" dirty="0">
+                <a:solidFill>
+                  <a:srgbClr val="000000"/>
+                </a:solidFill>
+                <a:uFill>
+                  <a:solidFill>
+                    <a:srgbClr val="FFFFFF"/>
+                  </a:solidFill>
+                </a:uFill>
+                <a:latin typeface="Corbel"/>
+                <a:ea typeface="DejaVu Sans"/>
+              </a:rPr>
+              <a:t>Data is never </a:t>
+            </a:r>
+            <a:r>
+              <a:rPr lang="nl-NL" sz="1800" b="0" strike="noStrike" spc="-1" dirty="0" err="1">
+                <a:solidFill>
+                  <a:srgbClr val="000000"/>
+                </a:solidFill>
+                <a:uFill>
+                  <a:solidFill>
+                    <a:srgbClr val="FFFFFF"/>
+                  </a:solidFill>
+                </a:uFill>
+                <a:latin typeface="Corbel"/>
+                <a:ea typeface="DejaVu Sans"/>
+              </a:rPr>
+              <a:t>stored</a:t>
+            </a:r>
+            <a:r>
+              <a:rPr lang="nl-NL" sz="1800" b="0" strike="noStrike" spc="-1" dirty="0">
+                <a:solidFill>
+                  <a:srgbClr val="000000"/>
+                </a:solidFill>
+                <a:uFill>
+                  <a:solidFill>
+                    <a:srgbClr val="FFFFFF"/>
+                  </a:solidFill>
+                </a:uFill>
+                <a:latin typeface="Corbel"/>
+                <a:ea typeface="DejaVu Sans"/>
+              </a:rPr>
+              <a:t> on </a:t>
+            </a:r>
+            <a:r>
+              <a:rPr lang="nl-NL" sz="1800" b="0" strike="noStrike" spc="-1" dirty="0" err="1">
+                <a:solidFill>
+                  <a:srgbClr val="000000"/>
+                </a:solidFill>
+                <a:uFill>
+                  <a:solidFill>
+                    <a:srgbClr val="FFFFFF"/>
+                  </a:solidFill>
+                </a:uFill>
+                <a:latin typeface="Corbel"/>
+                <a:ea typeface="DejaVu Sans"/>
+              </a:rPr>
+              <a:t>any</a:t>
+            </a:r>
+            <a:r>
+              <a:rPr lang="nl-NL" sz="1800" b="0" strike="noStrike" spc="-1" dirty="0">
+                <a:solidFill>
+                  <a:srgbClr val="000000"/>
+                </a:solidFill>
+                <a:uFill>
+                  <a:solidFill>
+                    <a:srgbClr val="FFFFFF"/>
+                  </a:solidFill>
+                </a:uFill>
+                <a:latin typeface="Corbel"/>
+                <a:ea typeface="DejaVu Sans"/>
+              </a:rPr>
+              <a:t> </a:t>
+            </a:r>
+            <a:r>
+              <a:rPr lang="nl-NL" sz="1800" b="0" strike="noStrike" spc="-1" dirty="0" err="1">
+                <a:solidFill>
+                  <a:srgbClr val="000000"/>
+                </a:solidFill>
+                <a:uFill>
+                  <a:solidFill>
+                    <a:srgbClr val="FFFFFF"/>
+                  </a:solidFill>
+                </a:uFill>
+                <a:latin typeface="Corbel"/>
+                <a:ea typeface="DejaVu Sans"/>
+              </a:rPr>
+              <a:t>accessible</a:t>
+            </a:r>
+            <a:r>
+              <a:rPr lang="nl-NL" sz="1800" b="0" strike="noStrike" spc="-1" dirty="0">
+                <a:solidFill>
+                  <a:srgbClr val="000000"/>
+                </a:solidFill>
+                <a:uFill>
+                  <a:solidFill>
+                    <a:srgbClr val="FFFFFF"/>
+                  </a:solidFill>
+                </a:uFill>
+                <a:latin typeface="Corbel"/>
+                <a:ea typeface="DejaVu Sans"/>
+              </a:rPr>
+              <a:t> (</a:t>
+            </a:r>
+            <a:r>
+              <a:rPr lang="nl-NL" sz="1800" b="0" strike="noStrike" spc="-1" dirty="0" err="1">
+                <a:solidFill>
+                  <a:srgbClr val="000000"/>
+                </a:solidFill>
+                <a:uFill>
+                  <a:solidFill>
+                    <a:srgbClr val="FFFFFF"/>
+                  </a:solidFill>
+                </a:uFill>
+                <a:latin typeface="Corbel"/>
+                <a:ea typeface="DejaVu Sans"/>
+              </a:rPr>
+              <a:t>network</a:t>
+            </a:r>
+            <a:r>
+              <a:rPr lang="nl-NL" sz="1800" b="0" strike="noStrike" spc="-1" dirty="0">
+                <a:solidFill>
+                  <a:srgbClr val="000000"/>
+                </a:solidFill>
+                <a:uFill>
+                  <a:solidFill>
+                    <a:srgbClr val="FFFFFF"/>
+                  </a:solidFill>
+                </a:uFill>
+                <a:latin typeface="Corbel"/>
+                <a:ea typeface="DejaVu Sans"/>
+              </a:rPr>
+              <a:t>) drive, but in a secure database.</a:t>
+            </a:r>
+            <a:endParaRPr lang="nl-NL" sz="1800" b="0" strike="noStrike" spc="-1" dirty="0">
+              <a:solidFill>
+                <a:srgbClr val="000000"/>
+              </a:solidFill>
+              <a:uFill>
+                <a:solidFill>
+                  <a:srgbClr val="FFFFFF"/>
+                </a:solidFill>
+              </a:uFill>
+              <a:latin typeface="Arial"/>
+            </a:endParaRPr>
+          </a:p>
+          <a:p>
+            <a:pPr>
+              <a:lnSpc>
+                <a:spcPct val="100000"/>
+              </a:lnSpc>
+            </a:pPr>
+            <a:r>
+              <a:rPr lang="nl-NL" sz="1800" b="0" strike="noStrike" spc="-1" dirty="0" err="1">
+                <a:solidFill>
+                  <a:srgbClr val="000000"/>
+                </a:solidFill>
+                <a:uFill>
+                  <a:solidFill>
+                    <a:srgbClr val="FFFFFF"/>
+                  </a:solidFill>
+                </a:uFill>
+                <a:latin typeface="Corbel"/>
+                <a:ea typeface="DejaVu Sans"/>
+              </a:rPr>
+              <a:t>Anonimized</a:t>
+            </a:r>
+            <a:r>
+              <a:rPr lang="nl-NL" sz="1800" b="0" strike="noStrike" spc="-1" dirty="0">
+                <a:solidFill>
+                  <a:srgbClr val="000000"/>
+                </a:solidFill>
+                <a:uFill>
+                  <a:solidFill>
+                    <a:srgbClr val="FFFFFF"/>
+                  </a:solidFill>
+                </a:uFill>
+                <a:latin typeface="Corbel"/>
+                <a:ea typeface="DejaVu Sans"/>
+              </a:rPr>
+              <a:t> data is made </a:t>
+            </a:r>
+            <a:r>
+              <a:rPr lang="nl-NL" sz="1800" b="0" strike="noStrike" spc="-1" dirty="0" err="1">
+                <a:solidFill>
+                  <a:srgbClr val="000000"/>
+                </a:solidFill>
+                <a:uFill>
+                  <a:solidFill>
+                    <a:srgbClr val="FFFFFF"/>
+                  </a:solidFill>
+                </a:uFill>
+                <a:latin typeface="Corbel"/>
+                <a:ea typeface="DejaVu Sans"/>
+              </a:rPr>
+              <a:t>available</a:t>
+            </a:r>
+            <a:r>
+              <a:rPr lang="nl-NL" sz="1800" b="0" strike="noStrike" spc="-1" dirty="0">
+                <a:solidFill>
+                  <a:srgbClr val="000000"/>
+                </a:solidFill>
+                <a:uFill>
+                  <a:solidFill>
+                    <a:srgbClr val="FFFFFF"/>
+                  </a:solidFill>
+                </a:uFill>
+                <a:latin typeface="Corbel"/>
+                <a:ea typeface="DejaVu Sans"/>
+              </a:rPr>
+              <a:t> </a:t>
+            </a:r>
+            <a:r>
+              <a:rPr lang="nl-NL" sz="1800" b="0" strike="noStrike" spc="-1" dirty="0" err="1">
+                <a:solidFill>
+                  <a:srgbClr val="000000"/>
+                </a:solidFill>
+                <a:uFill>
+                  <a:solidFill>
+                    <a:srgbClr val="FFFFFF"/>
+                  </a:solidFill>
+                </a:uFill>
+                <a:latin typeface="Corbel"/>
+                <a:ea typeface="DejaVu Sans"/>
+              </a:rPr>
+              <a:t>to</a:t>
+            </a:r>
+            <a:r>
+              <a:rPr lang="nl-NL" sz="1800" b="0" strike="noStrike" spc="-1" dirty="0">
+                <a:solidFill>
+                  <a:srgbClr val="000000"/>
+                </a:solidFill>
+                <a:uFill>
+                  <a:solidFill>
+                    <a:srgbClr val="FFFFFF"/>
+                  </a:solidFill>
+                </a:uFill>
+                <a:latin typeface="Corbel"/>
+                <a:ea typeface="DejaVu Sans"/>
+              </a:rPr>
+              <a:t> the </a:t>
+            </a:r>
+            <a:r>
+              <a:rPr lang="nl-NL" sz="1800" b="0" strike="noStrike" spc="-1" dirty="0" err="1">
+                <a:solidFill>
+                  <a:srgbClr val="000000"/>
+                </a:solidFill>
+                <a:uFill>
+                  <a:solidFill>
+                    <a:srgbClr val="FFFFFF"/>
+                  </a:solidFill>
+                </a:uFill>
+                <a:latin typeface="Corbel"/>
+                <a:ea typeface="DejaVu Sans"/>
+              </a:rPr>
+              <a:t>researchers</a:t>
+            </a:r>
+            <a:r>
+              <a:rPr lang="nl-NL" sz="1800" b="0" strike="noStrike" spc="-1" dirty="0">
+                <a:solidFill>
+                  <a:srgbClr val="000000"/>
+                </a:solidFill>
+                <a:uFill>
+                  <a:solidFill>
+                    <a:srgbClr val="FFFFFF"/>
+                  </a:solidFill>
+                </a:uFill>
+                <a:latin typeface="Corbel"/>
+                <a:ea typeface="DejaVu Sans"/>
+              </a:rPr>
+              <a:t> in a secure environment.</a:t>
+            </a:r>
+            <a:endParaRPr lang="nl-NL" sz="1800" b="0" strike="noStrike" spc="-1" dirty="0">
               <a:solidFill>
                 <a:srgbClr val="000000"/>
               </a:solidFill>
@@ -10622,6 +10175,29 @@
           </a:p>
         </p:txBody>
       </p:sp>
+      <p:pic>
+        <p:nvPicPr>
+          <p:cNvPr id="126" name="Afbeelding 125"/>
+          <p:cNvPicPr/>
+          <p:nvPr/>
+        </p:nvPicPr>
+        <p:blipFill>
+          <a:blip r:embed="rId3"/>
+          <a:stretch/>
+        </p:blipFill>
+        <p:spPr>
+          <a:xfrm>
+            <a:off x="909000" y="792000"/>
+            <a:ext cx="7515000" cy="4885920"/>
+          </a:xfrm>
+          <a:prstGeom prst="rect">
+            <a:avLst/>
+          </a:prstGeom>
+          <a:ln>
+            <a:noFill/>
+          </a:ln>
+        </p:spPr>
+      </p:pic>
     </p:spTree>
   </p:cSld>
   <p:clrMapOvr>
@@ -10813,7 +10389,7 @@
               </a:lnSpc>
             </a:pPr>
             <a:r>
-              <a:rPr lang="nl-NL" sz="3500" b="1" strike="noStrike" spc="-1">
+              <a:rPr lang="nl-NL" sz="3500" b="1" strike="noStrike" spc="-1" dirty="0" err="1">
                 <a:solidFill>
                   <a:srgbClr val="FF0000"/>
                 </a:solidFill>
@@ -10824,10 +10400,24 @@
                 </a:uFill>
                 <a:latin typeface="Corbel"/>
               </a:rPr>
-              <a:t>Sarphati </a:t>
+              <a:t>Sarphati</a:t>
             </a:r>
             <a:r>
-              <a:rPr lang="en-US" sz="3500" b="1" strike="noStrike" spc="-1">
+              <a:rPr lang="nl-NL" sz="3500" b="1" strike="noStrike" spc="-1" dirty="0">
+                <a:solidFill>
+                  <a:srgbClr val="FF0000"/>
+                </a:solidFill>
+                <a:uFill>
+                  <a:solidFill>
+                    <a:srgbClr val="FFFFFF"/>
+                  </a:solidFill>
+                </a:uFill>
+                <a:latin typeface="Corbel"/>
+              </a:rPr>
+              <a:t> </a:t>
+            </a:r>
+            <a:r>
+              <a:rPr lang="en-US" sz="3500" b="1" strike="noStrike" spc="-1" dirty="0">
                 <a:solidFill>
                   <a:srgbClr val="FF0000"/>
                 </a:solidFill>
@@ -10841,7 +10431,7 @@
               <a:t>principles</a:t>
             </a:r>
             <a:r>
-              <a:rPr lang="nl-NL" sz="3500" b="1" strike="noStrike" spc="-1">
+              <a:rPr lang="nl-NL" sz="3500" b="1" strike="noStrike" spc="-1" dirty="0">
                 <a:solidFill>
                   <a:srgbClr val="FF0000"/>
                 </a:solidFill>
@@ -10854,7 +10444,7 @@
               </a:rPr>
               <a:t>:</a:t>
             </a:r>
-            <a:endParaRPr lang="nl-NL" sz="1800" b="0" strike="noStrike" spc="-1">
+            <a:endParaRPr lang="nl-NL" sz="1800" b="0" strike="noStrike" spc="-1" dirty="0">
               <a:solidFill>
                 <a:srgbClr val="000000"/>
               </a:solidFill>
@@ -10879,7 +10469,7 @@
               <a:buChar char=""/>
             </a:pPr>
             <a:r>
-              <a:rPr lang="nl-NL" sz="3500" b="1" strike="noStrike" spc="-1">
+              <a:rPr lang="nl-NL" sz="3500" b="1" strike="noStrike" spc="-1" dirty="0" err="1">
                 <a:solidFill>
                   <a:srgbClr val="000000"/>
                 </a:solidFill>
@@ -10890,34 +10480,10 @@
                 </a:uFill>
                 <a:latin typeface="Corbel"/>
               </a:rPr>
-              <a:t>Youth health</a:t>
+              <a:t>Youth</a:t>
             </a:r>
-            <a:endParaRPr lang="nl-NL" sz="1800" b="0" strike="noStrike" spc="-1">
-              <a:solidFill>
-                <a:srgbClr val="000000"/>
-              </a:solidFill>
-              <a:uFill>
-                <a:solidFill>
-                  <a:srgbClr val="FFFFFF"/>
-                </a:solidFill>
-              </a:uFill>
-              <a:latin typeface="Arial"/>
-            </a:endParaRPr>
-          </a:p>
-          <a:p>
-            <a:pPr marL="216000" indent="-216000">
-              <a:lnSpc>
-                <a:spcPct val="100000"/>
-              </a:lnSpc>
-              <a:buClr>
-                <a:srgbClr val="000000"/>
-              </a:buClr>
-              <a:buSzPct val="45000"/>
-              <a:buFont typeface="Wingdings" charset="2"/>
-              <a:buChar char=""/>
-            </a:pPr>
             <a:r>
-              <a:rPr lang="nl-NL" sz="3500" b="1" strike="noStrike" spc="-1">
+              <a:rPr lang="nl-NL" sz="3500" b="1" strike="noStrike" spc="-1" dirty="0">
                 <a:solidFill>
                   <a:srgbClr val="000000"/>
                 </a:solidFill>
@@ -10928,9 +10494,9 @@
                 </a:uFill>
                 <a:latin typeface="Corbel"/>
               </a:rPr>
-              <a:t>Informed consent</a:t>
+              <a:t> health</a:t>
             </a:r>
-            <a:endParaRPr lang="nl-NL" sz="1800" b="0" strike="noStrike" spc="-1">
+            <a:endParaRPr lang="nl-NL" sz="1800" b="0" strike="noStrike" spc="-1" dirty="0">
               <a:solidFill>
                 <a:srgbClr val="000000"/>
               </a:solidFill>
@@ -10955,7 +10521,59 @@
               <a:buChar char=""/>
             </a:pPr>
             <a:r>
-              <a:rPr lang="nl-NL" sz="3500" b="1" strike="noStrike" spc="-1">
+              <a:rPr lang="nl-NL" sz="3500" b="1" strike="noStrike" spc="-1" dirty="0" err="1">
+                <a:solidFill>
+                  <a:srgbClr val="000000"/>
+                </a:solidFill>
+                <a:uFill>
+                  <a:solidFill>
+                    <a:srgbClr val="FFFFFF"/>
+                  </a:solidFill>
+                </a:uFill>
+                <a:latin typeface="Corbel"/>
+              </a:rPr>
+              <a:t>Informed</a:t>
+            </a:r>
+            <a:r>
+              <a:rPr lang="nl-NL" sz="3500" b="1" strike="noStrike" spc="-1" dirty="0">
+                <a:solidFill>
+                  <a:srgbClr val="000000"/>
+                </a:solidFill>
+                <a:uFill>
+                  <a:solidFill>
+                    <a:srgbClr val="FFFFFF"/>
+                  </a:solidFill>
+                </a:uFill>
+                <a:latin typeface="Corbel"/>
+              </a:rPr>
+              <a:t> consent</a:t>
+            </a:r>
+            <a:endParaRPr lang="nl-NL" sz="1800" b="0" strike="noStrike" spc="-1" dirty="0">
+              <a:solidFill>
+                <a:srgbClr val="000000"/>
+              </a:solidFill>
+              <a:uFill>
+                <a:solidFill>
+                  <a:srgbClr val="FFFFFF"/>
+                </a:solidFill>
+              </a:uFill>
+              <a:latin typeface="Arial"/>
+            </a:endParaRPr>
+          </a:p>
+          <a:p>
+            <a:pPr marL="216000" indent="-216000">
+              <a:lnSpc>
+                <a:spcPct val="100000"/>
+              </a:lnSpc>
+              <a:buClr>
+                <a:srgbClr val="000000"/>
+              </a:buClr>
+              <a:buSzPct val="45000"/>
+              <a:buFont typeface="Wingdings" charset="2"/>
+              <a:buChar char=""/>
+            </a:pPr>
+            <a:r>
+              <a:rPr lang="nl-NL" sz="3500" b="1" strike="noStrike" spc="-1" dirty="0">
                 <a:solidFill>
                   <a:srgbClr val="000000"/>
                 </a:solidFill>
@@ -10968,7 +10586,7 @@
               </a:rPr>
               <a:t>User engagement</a:t>
             </a:r>
-            <a:endParaRPr lang="nl-NL" sz="1800" b="0" strike="noStrike" spc="-1">
+            <a:endParaRPr lang="nl-NL" sz="1800" b="0" strike="noStrike" spc="-1" dirty="0">
               <a:solidFill>
                 <a:srgbClr val="000000"/>
               </a:solidFill>
@@ -10993,7 +10611,7 @@
               <a:buChar char=""/>
             </a:pPr>
             <a:r>
-              <a:rPr lang="nl-NL" sz="3500" b="1" strike="noStrike" spc="-1">
+              <a:rPr lang="nl-NL" sz="3500" b="1" strike="noStrike" spc="-1" dirty="0" err="1">
                 <a:solidFill>
                   <a:srgbClr val="000000"/>
                 </a:solidFill>
@@ -11004,9 +10622,23 @@
                 </a:uFill>
                 <a:latin typeface="Corbel"/>
               </a:rPr>
-              <a:t>Longitudinal research</a:t>
+              <a:t>Longitudinal</a:t>
             </a:r>
-            <a:endParaRPr lang="nl-NL" sz="1800" b="0" strike="noStrike" spc="-1">
+            <a:r>
+              <a:rPr lang="nl-NL" sz="3500" b="1" strike="noStrike" spc="-1" dirty="0">
+                <a:solidFill>
+                  <a:srgbClr val="000000"/>
+                </a:solidFill>
+                <a:uFill>
+                  <a:solidFill>
+                    <a:srgbClr val="FFFFFF"/>
+                  </a:solidFill>
+                </a:uFill>
+                <a:latin typeface="Corbel"/>
+              </a:rPr>
+              <a:t> research</a:t>
+            </a:r>
+            <a:endParaRPr lang="nl-NL" sz="1800" b="0" strike="noStrike" spc="-1" dirty="0">
               <a:solidFill>
                 <a:srgbClr val="000000"/>
               </a:solidFill>
@@ -11031,7 +10663,7 @@
               <a:buChar char=""/>
             </a:pPr>
             <a:r>
-              <a:rPr lang="nl-NL" sz="3500" b="1" strike="noStrike" spc="-1">
+              <a:rPr lang="nl-NL" sz="3500" b="1" strike="noStrike" spc="-1" dirty="0">
                 <a:solidFill>
                   <a:srgbClr val="000000"/>
                 </a:solidFill>
@@ -11044,7 +10676,7 @@
               </a:rPr>
               <a:t> </a:t>
             </a:r>
-            <a:endParaRPr lang="nl-NL" sz="1800" b="0" strike="noStrike" spc="-1">
+            <a:endParaRPr lang="nl-NL" sz="1800" b="0" strike="noStrike" spc="-1" dirty="0">
               <a:solidFill>
                 <a:srgbClr val="000000"/>
               </a:solidFill>
@@ -11062,7 +10694,7 @@
                 <a:spcPct val="100000"/>
               </a:lnSpc>
             </a:pPr>
-            <a:endParaRPr lang="nl-NL" sz="1800" b="0" strike="noStrike" spc="-1">
+            <a:endParaRPr lang="nl-NL" sz="1800" b="0" strike="noStrike" spc="-1" dirty="0">
               <a:solidFill>
                 <a:srgbClr val="000000"/>
               </a:solidFill>
@@ -11290,7 +10922,7 @@
                 </a:uFill>
                 <a:latin typeface="Corbel"/>
               </a:rPr>
-              <a:t>Proces consultatiebureaubezoek</a:t>
+              <a:t>Proces consultatiebureaubezoek, oude situatie</a:t>
             </a:r>
             <a:endParaRPr lang="nl-NL" dirty="0"/>
           </a:p>
@@ -11308,46 +10940,38 @@
         </p:nvSpPr>
         <p:spPr>
           <a:xfrm>
-            <a:off x="646043" y="4719159"/>
-            <a:ext cx="7860366" cy="2786760"/>
+            <a:off x="646043" y="5456581"/>
+            <a:ext cx="7860366" cy="1058519"/>
           </a:xfrm>
         </p:spPr>
         <p:txBody>
           <a:bodyPr/>
           <a:lstStyle/>
           <a:p>
+            <a:pPr marL="342900" indent="-342900">
+              <a:buFont typeface="Arial" panose="020B0604020202020204" pitchFamily="34" charset="0"/>
+              <a:buChar char="•"/>
+            </a:pPr>
             <a:r>
-              <a:rPr lang="nl-NL" dirty="0"/>
-              <a:t>Instemming geven in een app </a:t>
+              <a:rPr lang="nl-NL" sz="2000" dirty="0"/>
+              <a:t>Instemming geven op papier</a:t>
             </a:r>
+          </a:p>
+          <a:p>
+            <a:pPr marL="342900" indent="-342900">
+              <a:buFont typeface="Arial" panose="020B0604020202020204" pitchFamily="34" charset="0"/>
+              <a:buChar char="•"/>
+            </a:pPr>
             <a:r>
-              <a:rPr lang="nl-NL" dirty="0" err="1"/>
-              <a:t>ipv</a:t>
-            </a:r>
-            <a:r>
-              <a:rPr lang="nl-NL" dirty="0"/>
-              <a:t> op papier</a:t>
-            </a:r>
-          </a:p>
-          <a:p>
-            <a:r>
-              <a:rPr lang="nl-NL" dirty="0"/>
-              <a:t>Vragen beantwoorden in een app </a:t>
-            </a:r>
-            <a:r>
-              <a:rPr lang="nl-NL" dirty="0" err="1"/>
-              <a:t>ipv</a:t>
-            </a:r>
-            <a:r>
-              <a:rPr lang="nl-NL" dirty="0"/>
-              <a:t> op papier</a:t>
+              <a:rPr lang="nl-NL" sz="2000" dirty="0"/>
+              <a:t>Vragen beantwoorden op papier</a:t>
             </a:r>
           </a:p>
         </p:txBody>
       </p:sp>
       <p:pic>
         <p:nvPicPr>
-          <p:cNvPr id="4" name="Afbeelding 3"/>
+          <p:cNvPr id="5" name="Afbeelding 4"/>
           <p:cNvPicPr>
             <a:picLocks noChangeAspect="1"/>
           </p:cNvPicPr>
@@ -11367,8 +10991,8 @@
         </p:blipFill>
         <p:spPr>
           <a:xfrm>
-            <a:off x="0" y="2564295"/>
-            <a:ext cx="9144000" cy="2892287"/>
+            <a:off x="0" y="2594666"/>
+            <a:ext cx="9143999" cy="3020322"/>
           </a:xfrm>
           <a:prstGeom prst="rect">
             <a:avLst/>
@@ -11437,35 +11061,7 @@
                 </a:uFill>
                 <a:latin typeface="Corbel"/>
               </a:rPr>
-              <a:t>Proces </a:t>
-            </a:r>
-            <a:r>
-              <a:rPr lang="nl-NL" b="1" spc="-1" dirty="0" err="1">
-                <a:solidFill>
-                  <a:srgbClr val="FF0000"/>
-                </a:solidFill>
-                <a:uFill>
-                  <a:solidFill>
-                    <a:srgbClr val="FFFFFF"/>
-                  </a:solidFill>
-                </a:uFill>
-                <a:latin typeface="Corbel"/>
-              </a:rPr>
-              <a:t>onderzoeksdata</a:t>
-            </a:r>
-            <a:r>
-              <a:rPr lang="nl-NL" b="1" spc="-1" dirty="0">
-                <a:solidFill>
-                  <a:srgbClr val="FF0000"/>
-                </a:solidFill>
-                <a:uFill>
-                  <a:solidFill>
-                    <a:srgbClr val="FFFFFF"/>
-                  </a:solidFill>
-                </a:uFill>
-                <a:latin typeface="Corbel"/>
-              </a:rPr>
-              <a:t> beschikbaar stellen</a:t>
+              <a:t>Proces consultatiebureaubezoek, doelsituatie</a:t>
             </a:r>
             <a:endParaRPr lang="nl-NL" dirty="0"/>
           </a:p>
@@ -11483,22 +11079,111 @@
         </p:nvSpPr>
         <p:spPr>
           <a:xfrm>
-            <a:off x="646043" y="4719159"/>
-            <a:ext cx="7860366" cy="2786760"/>
+            <a:off x="646043" y="5456581"/>
+            <a:ext cx="7860366" cy="1058519"/>
           </a:xfrm>
         </p:spPr>
         <p:txBody>
           <a:bodyPr/>
           <a:lstStyle/>
           <a:p>
-            <a:endParaRPr lang="nl-NL" dirty="0"/>
+            <a:pPr marL="342900" indent="-342900">
+              <a:buFont typeface="Arial" panose="020B0604020202020204" pitchFamily="34" charset="0"/>
+              <a:buChar char="•"/>
+            </a:pPr>
+            <a:r>
+              <a:rPr lang="nl-NL" sz="2000" dirty="0"/>
+              <a:t>Instemming geven in </a:t>
+            </a:r>
+            <a:r>
+              <a:rPr lang="nl-NL" sz="2000" dirty="0" err="1"/>
+              <a:t>app</a:t>
+            </a:r>
+            <a:r>
+              <a:rPr lang="nl-NL" sz="2000" dirty="0"/>
+              <a:t> of op website</a:t>
+            </a:r>
+          </a:p>
+          <a:p>
+            <a:pPr marL="342900" indent="-342900">
+              <a:buFont typeface="Arial" panose="020B0604020202020204" pitchFamily="34" charset="0"/>
+              <a:buChar char="•"/>
+            </a:pPr>
+            <a:r>
+              <a:rPr lang="nl-NL" sz="2000" dirty="0"/>
+              <a:t>Vragen beantwoorden in </a:t>
+            </a:r>
+            <a:r>
+              <a:rPr lang="nl-NL" sz="2000" dirty="0" err="1"/>
+              <a:t>app</a:t>
+            </a:r>
+            <a:r>
+              <a:rPr lang="nl-NL" sz="2000" dirty="0"/>
+              <a:t> of op website</a:t>
+            </a:r>
+          </a:p>
+          <a:p>
+            <a:pPr marL="342900" indent="-342900">
+              <a:buFont typeface="Arial" panose="020B0604020202020204" pitchFamily="34" charset="0"/>
+              <a:buChar char="•"/>
+            </a:pPr>
+            <a:r>
+              <a:rPr lang="nl-NL" sz="2000" dirty="0"/>
+              <a:t>Extra </a:t>
+            </a:r>
+            <a:r>
+              <a:rPr lang="nl-NL" sz="2000" dirty="0" err="1"/>
+              <a:t>onderzoeksdata</a:t>
+            </a:r>
+            <a:r>
+              <a:rPr lang="nl-NL" sz="2000" dirty="0"/>
+              <a:t> (waaronder </a:t>
+            </a:r>
+            <a:r>
+              <a:rPr lang="nl-NL" sz="2000" dirty="0" err="1"/>
+              <a:t>microbioom</a:t>
+            </a:r>
+            <a:r>
+              <a:rPr lang="nl-NL" sz="2000" dirty="0"/>
+              <a:t>)</a:t>
+            </a:r>
           </a:p>
         </p:txBody>
       </p:sp>
+      <p:pic>
+        <p:nvPicPr>
+          <p:cNvPr id="4" name="Afbeelding 3"/>
+          <p:cNvPicPr>
+            <a:picLocks noChangeAspect="1"/>
+          </p:cNvPicPr>
+          <p:nvPr/>
+        </p:nvPicPr>
+        <p:blipFill>
+          <a:blip r:embed="rId2">
+            <a:extLst>
+              <a:ext uri="{28A0092B-C50C-407E-A947-70E740481C1C}">
+                <a14:useLocalDpi xmlns:a14="http://schemas.microsoft.com/office/drawing/2010/main" val="0"/>
+              </a:ext>
+            </a:extLst>
+          </a:blip>
+          <a:stretch>
+            <a:fillRect/>
+          </a:stretch>
+        </p:blipFill>
+        <p:spPr>
+          <a:xfrm>
+            <a:off x="0" y="2916246"/>
+            <a:ext cx="9144000" cy="2604925"/>
+          </a:xfrm>
+          <a:prstGeom prst="rect">
+            <a:avLst/>
+          </a:prstGeom>
+        </p:spPr>
+      </p:pic>
     </p:spTree>
     <p:extLst>
       <p:ext uri="{BB962C8B-B14F-4D97-AF65-F5344CB8AC3E}">
-        <p14:creationId xmlns:p14="http://schemas.microsoft.com/office/powerpoint/2010/main" val="1569019290"/>
+        <p14:creationId xmlns:p14="http://schemas.microsoft.com/office/powerpoint/2010/main" val="330129984"/>
       </p:ext>
     </p:extLst>
   </p:cSld>
@@ -11527,46 +11212,26 @@
       </p:grpSpPr>
       <p:sp>
         <p:nvSpPr>
-          <p:cNvPr id="119" name="CustomShape 1"/>
-          <p:cNvSpPr/>
-          <p:nvPr/>
-        </p:nvSpPr>
-        <p:spPr>
-          <a:xfrm>
-            <a:off x="781920" y="1998360"/>
-            <a:ext cx="7595280" cy="4625640"/>
-          </a:xfrm>
-          <a:prstGeom prst="rect">
-            <a:avLst/>
-          </a:prstGeom>
-          <a:noFill/>
-          <a:ln>
-            <a:noFill/>
-          </a:ln>
-        </p:spPr>
-        <p:style>
-          <a:lnRef idx="0">
-            <a:scrgbClr r="0" g="0" b="0"/>
-          </a:lnRef>
-          <a:fillRef idx="0">
-            <a:scrgbClr r="0" g="0" b="0"/>
-          </a:fillRef>
-          <a:effectRef idx="0">
-            <a:scrgbClr r="0" g="0" b="0"/>
-          </a:effectRef>
-          <a:fontRef idx="minor"/>
-        </p:style>
+          <p:cNvPr id="2" name="Titel 1"/>
+          <p:cNvSpPr>
+            <a:spLocks noGrp="1"/>
+          </p:cNvSpPr>
+          <p:nvPr>
+            <p:ph type="title"/>
+          </p:nvPr>
+        </p:nvSpPr>
+        <p:spPr>
+          <a:xfrm>
+            <a:off x="781920" y="1193291"/>
+            <a:ext cx="7595640" cy="1142640"/>
+          </a:xfrm>
+        </p:spPr>
         <p:txBody>
-          <a:bodyPr lIns="0" tIns="0" rIns="0" bIns="0"/>
+          <a:bodyPr/>
           <a:lstStyle/>
           <a:p>
-            <a:pPr>
-              <a:lnSpc>
-                <a:spcPct val="100000"/>
-              </a:lnSpc>
-            </a:pPr>
             <a:r>
-              <a:rPr lang="nl-NL" sz="3500" b="1" strike="noStrike" spc="-1">
+              <a:rPr lang="nl-NL" b="1" spc="-1" dirty="0">
                 <a:solidFill>
                   <a:srgbClr val="FF0000"/>
                 </a:solidFill>
@@ -11577,10 +11242,10 @@
                 </a:uFill>
                 <a:latin typeface="Corbel"/>
               </a:rPr>
-              <a:t>ITforCare </a:t>
+              <a:t>Proces </a:t>
             </a:r>
             <a:r>
-              <a:rPr lang="en-US" sz="3500" b="1" strike="noStrike" spc="-1">
+              <a:rPr lang="nl-NL" b="1" spc="-1" dirty="0" err="1">
                 <a:solidFill>
                   <a:srgbClr val="FF0000"/>
                 </a:solidFill>
@@ -11591,10 +11256,10 @@
                 </a:uFill>
                 <a:latin typeface="Corbel"/>
               </a:rPr>
-              <a:t>principles</a:t>
+              <a:t>onderzoeksdata</a:t>
             </a:r>
             <a:r>
-              <a:rPr lang="nl-NL" sz="3500" b="1" strike="noStrike" spc="-1">
+              <a:rPr lang="nl-NL" b="1" spc="-1" dirty="0">
                 <a:solidFill>
                   <a:srgbClr val="FF0000"/>
                 </a:solidFill>
@@ -11605,256 +11270,79 @@
                 </a:uFill>
                 <a:latin typeface="Corbel"/>
               </a:rPr>
-              <a:t>:</a:t>
+              <a:t> beschikbaar stellen, oude situatie</a:t>
             </a:r>
-            <a:endParaRPr lang="nl-NL" sz="1800" b="0" strike="noStrike" spc="-1">
-              <a:solidFill>
-                <a:srgbClr val="000000"/>
-              </a:solidFill>
-              <a:uFill>
-                <a:solidFill>
-                  <a:srgbClr val="FFFFFF"/>
-                </a:solidFill>
-              </a:uFill>
-              <a:latin typeface="Arial"/>
-            </a:endParaRPr>
-          </a:p>
-          <a:p>
-            <a:pPr marL="216000" indent="-216000">
-              <a:lnSpc>
-                <a:spcPct val="100000"/>
-              </a:lnSpc>
-              <a:buClr>
-                <a:srgbClr val="000000"/>
-              </a:buClr>
-              <a:buSzPct val="45000"/>
-              <a:buFont typeface="Wingdings" charset="2"/>
-              <a:buChar char=""/>
-            </a:pPr>
+            <a:endParaRPr lang="nl-NL" dirty="0"/>
+          </a:p>
+        </p:txBody>
+      </p:sp>
+      <p:sp>
+        <p:nvSpPr>
+          <p:cNvPr id="3" name="Ondertitel 2"/>
+          <p:cNvSpPr>
+            <a:spLocks noGrp="1"/>
+          </p:cNvSpPr>
+          <p:nvPr>
+            <p:ph type="subTitle"/>
+          </p:nvPr>
+        </p:nvSpPr>
+        <p:spPr>
+          <a:xfrm>
+            <a:off x="583697" y="5337245"/>
+            <a:ext cx="7860366" cy="1520755"/>
+          </a:xfrm>
+        </p:spPr>
+        <p:txBody>
+          <a:bodyPr/>
+          <a:lstStyle/>
+          <a:p>
             <a:r>
-              <a:rPr lang="nl-NL" sz="3500" b="1" strike="noStrike" spc="-1">
-                <a:solidFill>
-                  <a:srgbClr val="000000"/>
-                </a:solidFill>
-                <a:uFill>
-                  <a:solidFill>
-                    <a:srgbClr val="FFFFFF"/>
-                  </a:solidFill>
-                </a:uFill>
-                <a:latin typeface="Corbel"/>
-              </a:rPr>
-              <a:t>Privacy by design</a:t>
+              <a:rPr lang="nl-NL" sz="2000" dirty="0"/>
+              <a:t>Researcher vraagt aan, datamanager maakt de dataset</a:t>
             </a:r>
-            <a:endParaRPr lang="nl-NL" sz="1800" b="0" strike="noStrike" spc="-1">
-              <a:solidFill>
-                <a:srgbClr val="000000"/>
-              </a:solidFill>
-              <a:uFill>
-                <a:solidFill>
-                  <a:srgbClr val="FFFFFF"/>
-                </a:solidFill>
-              </a:uFill>
-              <a:latin typeface="Arial"/>
-            </a:endParaRPr>
-          </a:p>
-          <a:p>
-            <a:pPr marL="216000" indent="-216000">
-              <a:lnSpc>
-                <a:spcPct val="100000"/>
-              </a:lnSpc>
-              <a:buClr>
-                <a:srgbClr val="000000"/>
-              </a:buClr>
-              <a:buSzPct val="45000"/>
-              <a:buFont typeface="Wingdings" charset="2"/>
-              <a:buChar char=""/>
-            </a:pPr>
-            <a:r>
-              <a:rPr lang="nl-NL" sz="3500" b="1" strike="noStrike" spc="-1">
-                <a:solidFill>
-                  <a:srgbClr val="000000"/>
-                </a:solidFill>
-                <a:uFill>
-                  <a:solidFill>
-                    <a:srgbClr val="FFFFFF"/>
-                  </a:solidFill>
-                </a:uFill>
-                <a:latin typeface="Corbel"/>
-              </a:rPr>
-              <a:t>Security by design</a:t>
-            </a:r>
-            <a:endParaRPr lang="nl-NL" sz="1800" b="0" strike="noStrike" spc="-1">
-              <a:solidFill>
-                <a:srgbClr val="000000"/>
-              </a:solidFill>
-              <a:uFill>
-                <a:solidFill>
-                  <a:srgbClr val="FFFFFF"/>
-                </a:solidFill>
-              </a:uFill>
-              <a:latin typeface="Arial"/>
-            </a:endParaRPr>
-          </a:p>
-          <a:p>
-            <a:pPr marL="216000" indent="-216000">
-              <a:lnSpc>
-                <a:spcPct val="100000"/>
-              </a:lnSpc>
-              <a:buClr>
-                <a:srgbClr val="000000"/>
-              </a:buClr>
-              <a:buSzPct val="45000"/>
-              <a:buFont typeface="Wingdings" charset="2"/>
-              <a:buChar char=""/>
-            </a:pPr>
-            <a:r>
-              <a:rPr lang="nl-NL" sz="3500" b="1" strike="noStrike" spc="-1">
-                <a:solidFill>
-                  <a:srgbClr val="000000"/>
-                </a:solidFill>
-                <a:uFill>
-                  <a:solidFill>
-                    <a:srgbClr val="FFFFFF"/>
-                  </a:solidFill>
-                </a:uFill>
-                <a:latin typeface="Corbel"/>
-              </a:rPr>
-              <a:t>Open data</a:t>
-            </a:r>
-            <a:endParaRPr lang="nl-NL" sz="1800" b="0" strike="noStrike" spc="-1">
-              <a:solidFill>
-                <a:srgbClr val="000000"/>
-              </a:solidFill>
-              <a:uFill>
-                <a:solidFill>
-                  <a:srgbClr val="FFFFFF"/>
-                </a:solidFill>
-              </a:uFill>
-              <a:latin typeface="Arial"/>
-            </a:endParaRPr>
-          </a:p>
-          <a:p>
-            <a:pPr marL="216000" indent="-216000">
-              <a:lnSpc>
-                <a:spcPct val="100000"/>
-              </a:lnSpc>
-              <a:buClr>
-                <a:srgbClr val="000000"/>
-              </a:buClr>
-              <a:buSzPct val="45000"/>
-              <a:buFont typeface="Wingdings" charset="2"/>
-              <a:buChar char=""/>
-            </a:pPr>
-            <a:r>
-              <a:rPr lang="nl-NL" sz="3500" b="1" strike="noStrike" spc="-1">
-                <a:solidFill>
-                  <a:srgbClr val="000000"/>
-                </a:solidFill>
-                <a:uFill>
-                  <a:solidFill>
-                    <a:srgbClr val="FFFFFF"/>
-                  </a:solidFill>
-                </a:uFill>
-                <a:latin typeface="Corbel"/>
-              </a:rPr>
-              <a:t>Big data</a:t>
-            </a:r>
-            <a:endParaRPr lang="nl-NL" sz="1800" b="0" strike="noStrike" spc="-1">
-              <a:solidFill>
-                <a:srgbClr val="000000"/>
-              </a:solidFill>
-              <a:uFill>
-                <a:solidFill>
-                  <a:srgbClr val="FFFFFF"/>
-                </a:solidFill>
-              </a:uFill>
-              <a:latin typeface="Arial"/>
-            </a:endParaRPr>
-          </a:p>
-          <a:p>
-            <a:pPr>
-              <a:lnSpc>
-                <a:spcPct val="100000"/>
-              </a:lnSpc>
-            </a:pPr>
-            <a:endParaRPr lang="nl-NL" sz="1800" b="0" strike="noStrike" spc="-1">
-              <a:solidFill>
-                <a:srgbClr val="000000"/>
-              </a:solidFill>
-              <a:uFill>
-                <a:solidFill>
-                  <a:srgbClr val="FFFFFF"/>
-                </a:solidFill>
-              </a:uFill>
-              <a:latin typeface="Arial"/>
-            </a:endParaRPr>
           </a:p>
         </p:txBody>
       </p:sp>
-      <p:sp>
-        <p:nvSpPr>
-          <p:cNvPr id="120" name="CustomShape 2"/>
-          <p:cNvSpPr/>
+      <p:pic>
+        <p:nvPicPr>
+          <p:cNvPr id="4" name="Afbeelding 3"/>
+          <p:cNvPicPr>
+            <a:picLocks noChangeAspect="1"/>
+          </p:cNvPicPr>
           <p:nvPr/>
-        </p:nvSpPr>
-        <p:spPr>
-          <a:xfrm>
-            <a:off x="781560" y="3367440"/>
-            <a:ext cx="7595280" cy="2786400"/>
+        </p:nvPicPr>
+        <p:blipFill>
+          <a:blip r:embed="rId2">
+            <a:extLst>
+              <a:ext uri="{28A0092B-C50C-407E-A947-70E740481C1C}">
+                <a14:useLocalDpi xmlns:a14="http://schemas.microsoft.com/office/drawing/2010/main" val="0"/>
+              </a:ext>
+            </a:extLst>
+          </a:blip>
+          <a:stretch>
+            <a:fillRect/>
+          </a:stretch>
+        </p:blipFill>
+        <p:spPr>
+          <a:xfrm>
+            <a:off x="0" y="2622405"/>
+            <a:ext cx="9144000" cy="3353977"/>
           </a:xfrm>
           <a:prstGeom prst="rect">
             <a:avLst/>
           </a:prstGeom>
-          <a:noFill/>
-          <a:ln>
-            <a:noFill/>
-          </a:ln>
-        </p:spPr>
-        <p:style>
-          <a:lnRef idx="0">
-            <a:scrgbClr r="0" g="0" b="0"/>
-          </a:lnRef>
-          <a:fillRef idx="0">
-            <a:scrgbClr r="0" g="0" b="0"/>
-          </a:fillRef>
-          <a:effectRef idx="0">
-            <a:scrgbClr r="0" g="0" b="0"/>
-          </a:effectRef>
-          <a:fontRef idx="minor"/>
-        </p:style>
-      </p:sp>
+        </p:spPr>
+      </p:pic>
     </p:spTree>
+    <p:extLst>
+      <p:ext uri="{BB962C8B-B14F-4D97-AF65-F5344CB8AC3E}">
+        <p14:creationId xmlns:p14="http://schemas.microsoft.com/office/powerpoint/2010/main" val="1569019290"/>
+      </p:ext>
+    </p:extLst>
   </p:cSld>
   <p:clrMapOvr>
     <a:masterClrMapping/>
   </p:clrMapOvr>
-  <p:timing>
-    <p:tnLst>
-      <p:par>
-        <p:cTn id="1" dur="indefinite" restart="never" nodeType="tmRoot">
-          <p:childTnLst>
-            <p:seq>
-              <p:cTn id="2" nodeType="mainSeq"/>
-              <p:prevCondLst>
-                <p:cond evt="onPrev" delay="0">
-                  <p:tgtEl>
-                    <p:sldTgt/>
-                  </p:tgtEl>
-                </p:cond>
-              </p:prevCondLst>
-              <p:nextCondLst>
-                <p:cond evt="onNext" delay="0">
-                  <p:tgtEl>
-                    <p:sldTgt/>
-                  </p:tgtEl>
-                </p:cond>
-              </p:nextCondLst>
-            </p:seq>
-          </p:childTnLst>
-        </p:cTn>
-      </p:par>
-    </p:tnLst>
-  </p:timing>
 </p:sld>
 </file>
 
@@ -11877,46 +11365,26 @@
       </p:grpSpPr>
       <p:sp>
         <p:nvSpPr>
-          <p:cNvPr id="121" name="CustomShape 1"/>
-          <p:cNvSpPr/>
-          <p:nvPr/>
-        </p:nvSpPr>
-        <p:spPr>
-          <a:xfrm>
-            <a:off x="756720" y="144000"/>
-            <a:ext cx="7595280" cy="1142280"/>
-          </a:xfrm>
-          <a:prstGeom prst="rect">
-            <a:avLst/>
-          </a:prstGeom>
-          <a:noFill/>
-          <a:ln>
-            <a:noFill/>
-          </a:ln>
-        </p:spPr>
-        <p:style>
-          <a:lnRef idx="0">
-            <a:scrgbClr r="0" g="0" b="0"/>
-          </a:lnRef>
-          <a:fillRef idx="0">
-            <a:scrgbClr r="0" g="0" b="0"/>
-          </a:fillRef>
-          <a:effectRef idx="0">
-            <a:scrgbClr r="0" g="0" b="0"/>
-          </a:effectRef>
-          <a:fontRef idx="minor"/>
-        </p:style>
+          <p:cNvPr id="2" name="Titel 1"/>
+          <p:cNvSpPr>
+            <a:spLocks noGrp="1"/>
+          </p:cNvSpPr>
+          <p:nvPr>
+            <p:ph type="title"/>
+          </p:nvPr>
+        </p:nvSpPr>
+        <p:spPr>
+          <a:xfrm>
+            <a:off x="781920" y="1193291"/>
+            <a:ext cx="7595640" cy="1142640"/>
+          </a:xfrm>
+        </p:spPr>
         <p:txBody>
-          <a:bodyPr lIns="0" tIns="0" rIns="0" bIns="0"/>
+          <a:bodyPr/>
           <a:lstStyle/>
           <a:p>
-            <a:pPr>
-              <a:lnSpc>
-                <a:spcPct val="100000"/>
-              </a:lnSpc>
-            </a:pPr>
             <a:r>
-              <a:rPr lang="nl-NL" sz="3500" b="1" strike="noStrike" spc="-1">
+              <a:rPr lang="nl-NL" b="1" spc="-1" dirty="0">
                 <a:solidFill>
                   <a:srgbClr val="FF0000"/>
                 </a:solidFill>
@@ -11927,66 +11395,12 @@
                 </a:uFill>
                 <a:latin typeface="Corbel"/>
               </a:rPr>
-              <a:t>Huidige situatie, proceslaag </a:t>
+              <a:t>Proces </a:t>
             </a:r>
-            <a:endParaRPr lang="nl-NL" sz="1800" b="0" strike="noStrike" spc="-1">
-              <a:solidFill>
-                <a:srgbClr val="000000"/>
-              </a:solidFill>
-              <a:uFill>
-                <a:solidFill>
-                  <a:srgbClr val="FFFFFF"/>
-                </a:solidFill>
-              </a:uFill>
-              <a:latin typeface="Arial"/>
-            </a:endParaRPr>
-          </a:p>
-        </p:txBody>
-      </p:sp>
-      <p:sp>
-        <p:nvSpPr>
-          <p:cNvPr id="122" name="CustomShape 2"/>
-          <p:cNvSpPr/>
-          <p:nvPr/>
-        </p:nvSpPr>
-        <p:spPr>
-          <a:xfrm>
-            <a:off x="1432800" y="5589360"/>
-            <a:ext cx="6069240" cy="1097280"/>
-          </a:xfrm>
-          <a:prstGeom prst="rect">
-            <a:avLst/>
-          </a:prstGeom>
-          <a:noFill/>
-          <a:ln>
-            <a:noFill/>
-          </a:ln>
-        </p:spPr>
-        <p:style>
-          <a:lnRef idx="0">
-            <a:scrgbClr r="0" g="0" b="0"/>
-          </a:lnRef>
-          <a:fillRef idx="0">
-            <a:scrgbClr r="0" g="0" b="0"/>
-          </a:fillRef>
-          <a:effectRef idx="0">
-            <a:scrgbClr r="0" g="0" b="0"/>
-          </a:effectRef>
-          <a:fontRef idx="minor"/>
-        </p:style>
-        <p:txBody>
-          <a:bodyPr wrap="none" lIns="0" tIns="0" rIns="0" bIns="0"/>
-          <a:lstStyle/>
-          <a:p>
-            <a:pPr>
-              <a:lnSpc>
-                <a:spcPct val="100000"/>
-              </a:lnSpc>
-            </a:pPr>
             <a:r>
-              <a:rPr lang="nl-NL" sz="1800" b="0" strike="noStrike" spc="-1">
-                <a:solidFill>
-                  <a:srgbClr val="000000"/>
+              <a:rPr lang="nl-NL" b="1" spc="-1" dirty="0" err="1">
+                <a:solidFill>
+                  <a:srgbClr val="FF0000"/>
                 </a:solidFill>
                 <a:uFill>
                   <a:solidFill>
@@ -11994,32 +11408,13 @@
                   </a:solidFill>
                 </a:uFill>
                 <a:latin typeface="Corbel"/>
-                <a:ea typeface="DejaVu Sans"/>
               </a:rPr>
-              <a:t>Verifying parent identity is an extra task for the nurse practitioner.</a:t>
+              <a:t>onderzoeksdata</a:t>
             </a:r>
-            <a:endParaRPr lang="nl-NL" sz="1800" b="0" strike="noStrike" spc="-1">
-              <a:solidFill>
-                <a:srgbClr val="000000"/>
-              </a:solidFill>
-              <a:uFill>
-                <a:solidFill>
-                  <a:srgbClr val="FFFFFF"/>
-                </a:solidFill>
-              </a:uFill>
-              <a:latin typeface="Arial"/>
-            </a:endParaRPr>
-          </a:p>
-          <a:p>
-            <a:pPr>
-              <a:lnSpc>
-                <a:spcPct val="100000"/>
-              </a:lnSpc>
-            </a:pPr>
             <a:r>
-              <a:rPr lang="nl-NL" sz="1800" b="0" strike="noStrike" spc="-1">
-                <a:solidFill>
-                  <a:srgbClr val="000000"/>
+              <a:rPr lang="nl-NL" b="1" spc="-1" dirty="0">
+                <a:solidFill>
+                  <a:srgbClr val="FF0000"/>
                 </a:solidFill>
                 <a:uFill>
                   <a:solidFill>
@@ -12027,145 +11422,77 @@
                   </a:solidFill>
                 </a:uFill>
                 <a:latin typeface="Corbel"/>
-                <a:ea typeface="DejaVu Sans"/>
               </a:rPr>
-              <a:t>Consent and questionnaire data is gathered on paper.</a:t>
+              <a:t> beschikbaar stellen, doelsituatie</a:t>
             </a:r>
-            <a:endParaRPr lang="nl-NL" sz="1800" b="0" strike="noStrike" spc="-1">
-              <a:solidFill>
-                <a:srgbClr val="000000"/>
-              </a:solidFill>
-              <a:uFill>
-                <a:solidFill>
-                  <a:srgbClr val="FFFFFF"/>
-                </a:solidFill>
-              </a:uFill>
-              <a:latin typeface="Arial"/>
-            </a:endParaRPr>
-          </a:p>
-          <a:p>
-            <a:pPr>
-              <a:lnSpc>
-                <a:spcPct val="100000"/>
-              </a:lnSpc>
-            </a:pPr>
-            <a:r>
-              <a:rPr lang="nl-NL" sz="1800" b="0" strike="noStrike" spc="-1">
-                <a:solidFill>
-                  <a:srgbClr val="000000"/>
-                </a:solidFill>
-                <a:uFill>
-                  <a:solidFill>
-                    <a:srgbClr val="FFFFFF"/>
-                  </a:solidFill>
-                </a:uFill>
-                <a:latin typeface="Corbel"/>
-                <a:ea typeface="DejaVu Sans"/>
-              </a:rPr>
-              <a:t>Data files are stored separately on network shares within the GGD LAN.</a:t>
-            </a:r>
-            <a:endParaRPr lang="nl-NL" sz="1800" b="0" strike="noStrike" spc="-1">
-              <a:solidFill>
-                <a:srgbClr val="000000"/>
-              </a:solidFill>
-              <a:uFill>
-                <a:solidFill>
-                  <a:srgbClr val="FFFFFF"/>
-                </a:solidFill>
-              </a:uFill>
-              <a:latin typeface="Arial"/>
-            </a:endParaRPr>
-          </a:p>
-          <a:p>
-            <a:pPr>
-              <a:lnSpc>
-                <a:spcPct val="100000"/>
-              </a:lnSpc>
-            </a:pPr>
-            <a:r>
-              <a:rPr lang="nl-NL" sz="1800" b="0" strike="noStrike" spc="-1">
-                <a:solidFill>
-                  <a:srgbClr val="000000"/>
-                </a:solidFill>
-                <a:uFill>
-                  <a:solidFill>
-                    <a:srgbClr val="FFFFFF"/>
-                  </a:solidFill>
-                </a:uFill>
-                <a:latin typeface="Corbel"/>
-                <a:ea typeface="DejaVu Sans"/>
-              </a:rPr>
-              <a:t>Datamanager manually combines the files into anonimized file for the researchers.</a:t>
-            </a:r>
-            <a:endParaRPr lang="nl-NL" sz="1800" b="0" strike="noStrike" spc="-1">
-              <a:solidFill>
-                <a:srgbClr val="000000"/>
-              </a:solidFill>
-              <a:uFill>
-                <a:solidFill>
-                  <a:srgbClr val="FFFFFF"/>
-                </a:solidFill>
-              </a:uFill>
-              <a:latin typeface="Arial"/>
-            </a:endParaRPr>
+            <a:endParaRPr lang="nl-NL" dirty="0"/>
+          </a:p>
+        </p:txBody>
+      </p:sp>
+      <p:sp>
+        <p:nvSpPr>
+          <p:cNvPr id="3" name="Ondertitel 2"/>
+          <p:cNvSpPr>
+            <a:spLocks noGrp="1"/>
+          </p:cNvSpPr>
+          <p:nvPr>
+            <p:ph type="subTitle"/>
+          </p:nvPr>
+        </p:nvSpPr>
+        <p:spPr>
+          <a:xfrm>
+            <a:off x="583697" y="5337245"/>
+            <a:ext cx="7860366" cy="1520755"/>
+          </a:xfrm>
+        </p:spPr>
+        <p:txBody>
+          <a:bodyPr/>
+          <a:lstStyle/>
+          <a:p>
+            <a:endParaRPr lang="nl-NL" sz="2000" dirty="0"/>
           </a:p>
         </p:txBody>
       </p:sp>
       <p:pic>
         <p:nvPicPr>
-          <p:cNvPr id="123" name="Afbeelding 122"/>
-          <p:cNvPicPr/>
+          <p:cNvPr id="5" name="Afbeelding 4"/>
+          <p:cNvPicPr>
+            <a:picLocks noChangeAspect="1"/>
+          </p:cNvPicPr>
           <p:nvPr/>
         </p:nvPicPr>
         <p:blipFill>
-          <a:blip r:embed="rId3"/>
-          <a:stretch/>
+          <a:blip r:embed="rId2">
+            <a:extLst>
+              <a:ext uri="{28A0092B-C50C-407E-A947-70E740481C1C}">
+                <a14:useLocalDpi xmlns:a14="http://schemas.microsoft.com/office/drawing/2010/main" val="0"/>
+              </a:ext>
+            </a:extLst>
+          </a:blip>
+          <a:stretch>
+            <a:fillRect/>
+          </a:stretch>
         </p:blipFill>
         <p:spPr>
           <a:xfrm>
-            <a:off x="909000" y="792000"/>
-            <a:ext cx="7515000" cy="4885920"/>
+            <a:off x="0" y="2591232"/>
+            <a:ext cx="9144000" cy="3353977"/>
           </a:xfrm>
           <a:prstGeom prst="rect">
             <a:avLst/>
           </a:prstGeom>
-          <a:ln>
-            <a:noFill/>
-          </a:ln>
         </p:spPr>
       </p:pic>
     </p:spTree>
+    <p:extLst>
+      <p:ext uri="{BB962C8B-B14F-4D97-AF65-F5344CB8AC3E}">
+        <p14:creationId xmlns:p14="http://schemas.microsoft.com/office/powerpoint/2010/main" val="2155529498"/>
+      </p:ext>
+    </p:extLst>
   </p:cSld>
   <p:clrMapOvr>
     <a:masterClrMapping/>
   </p:clrMapOvr>
-  <p:timing>
-    <p:tnLst>
-      <p:par>
-        <p:cTn id="1" dur="indefinite" restart="never" nodeType="tmRoot">
-          <p:childTnLst>
-            <p:seq>
-              <p:cTn id="2" nodeType="mainSeq"/>
-              <p:prevCondLst>
-                <p:cond evt="onPrev" delay="0">
-                  <p:tgtEl>
-                    <p:sldTgt/>
-                  </p:tgtEl>
-                </p:cond>
-              </p:prevCondLst>
-              <p:nextCondLst>
-                <p:cond evt="onNext" delay="0">
-                  <p:tgtEl>
-                    <p:sldTgt/>
-                  </p:tgtEl>
-                </p:cond>
-              </p:nextCondLst>
-            </p:seq>
-          </p:childTnLst>
-        </p:cTn>
-      </p:par>
-    </p:tnLst>
-  </p:timing>
 </p:sld>
 </file>
 
@@ -12188,14 +11515,14 @@
       </p:grpSpPr>
       <p:sp>
         <p:nvSpPr>
-          <p:cNvPr id="124" name="CustomShape 1"/>
+          <p:cNvPr id="119" name="CustomShape 1"/>
           <p:cNvSpPr/>
           <p:nvPr/>
         </p:nvSpPr>
         <p:spPr>
           <a:xfrm>
-            <a:off x="756720" y="144000"/>
-            <a:ext cx="7595280" cy="1142280"/>
+            <a:off x="781920" y="1998360"/>
+            <a:ext cx="7595280" cy="4625640"/>
           </a:xfrm>
           <a:prstGeom prst="rect">
             <a:avLst/>
@@ -12238,7 +11565,35 @@
                 </a:uFill>
                 <a:latin typeface="Corbel"/>
               </a:rPr>
-              <a:t>Doelsituatie, proceslaag </a:t>
+              <a:t>ITforCare </a:t>
+            </a:r>
+            <a:r>
+              <a:rPr lang="en-US" sz="3500" b="1" strike="noStrike" spc="-1">
+                <a:solidFill>
+                  <a:srgbClr val="FF0000"/>
+                </a:solidFill>
+                <a:uFill>
+                  <a:solidFill>
+                    <a:srgbClr val="FFFFFF"/>
+                  </a:solidFill>
+                </a:uFill>
+                <a:latin typeface="Corbel"/>
+              </a:rPr>
+              <a:t>principles</a:t>
+            </a:r>
+            <a:r>
+              <a:rPr lang="nl-NL" sz="3500" b="1" strike="noStrike" spc="-1">
+                <a:solidFill>
+                  <a:srgbClr val="FF0000"/>
+                </a:solidFill>
+                <a:uFill>
+                  <a:solidFill>
+                    <a:srgbClr val="FFFFFF"/>
+                  </a:solidFill>
+                </a:uFill>
+                <a:latin typeface="Corbel"/>
+              </a:rPr>
+              <a:t>:</a:t>
             </a:r>
             <a:endParaRPr lang="nl-NL" sz="1800" b="0" strike="noStrike" spc="-1">
               <a:solidFill>
@@ -12252,18 +11607,188 @@
               <a:latin typeface="Arial"/>
             </a:endParaRPr>
           </a:p>
+          <a:p>
+            <a:pPr marL="216000" indent="-216000">
+              <a:lnSpc>
+                <a:spcPct val="100000"/>
+              </a:lnSpc>
+              <a:buClr>
+                <a:srgbClr val="000000"/>
+              </a:buClr>
+              <a:buSzPct val="45000"/>
+              <a:buFont typeface="Wingdings" charset="2"/>
+              <a:buChar char=""/>
+            </a:pPr>
+            <a:r>
+              <a:rPr lang="nl-NL" sz="3500" b="1" strike="noStrike" spc="-1">
+                <a:solidFill>
+                  <a:srgbClr val="000000"/>
+                </a:solidFill>
+                <a:uFill>
+                  <a:solidFill>
+                    <a:srgbClr val="FFFFFF"/>
+                  </a:solidFill>
+                </a:uFill>
+                <a:latin typeface="Corbel"/>
+              </a:rPr>
+              <a:t>Privacy by design</a:t>
+            </a:r>
+            <a:endParaRPr lang="nl-NL" sz="1800" b="0" strike="noStrike" spc="-1">
+              <a:solidFill>
+                <a:srgbClr val="000000"/>
+              </a:solidFill>
+              <a:uFill>
+                <a:solidFill>
+                  <a:srgbClr val="FFFFFF"/>
+                </a:solidFill>
+              </a:uFill>
+              <a:latin typeface="Arial"/>
+            </a:endParaRPr>
+          </a:p>
+          <a:p>
+            <a:pPr marL="216000" indent="-216000">
+              <a:lnSpc>
+                <a:spcPct val="100000"/>
+              </a:lnSpc>
+              <a:buClr>
+                <a:srgbClr val="000000"/>
+              </a:buClr>
+              <a:buSzPct val="45000"/>
+              <a:buFont typeface="Wingdings" charset="2"/>
+              <a:buChar char=""/>
+            </a:pPr>
+            <a:r>
+              <a:rPr lang="nl-NL" sz="3500" b="1" strike="noStrike" spc="-1">
+                <a:solidFill>
+                  <a:srgbClr val="000000"/>
+                </a:solidFill>
+                <a:uFill>
+                  <a:solidFill>
+                    <a:srgbClr val="FFFFFF"/>
+                  </a:solidFill>
+                </a:uFill>
+                <a:latin typeface="Corbel"/>
+              </a:rPr>
+              <a:t>Security by design</a:t>
+            </a:r>
+            <a:endParaRPr lang="nl-NL" sz="1800" b="0" strike="noStrike" spc="-1">
+              <a:solidFill>
+                <a:srgbClr val="000000"/>
+              </a:solidFill>
+              <a:uFill>
+                <a:solidFill>
+                  <a:srgbClr val="FFFFFF"/>
+                </a:solidFill>
+              </a:uFill>
+              <a:latin typeface="Arial"/>
+            </a:endParaRPr>
+          </a:p>
+          <a:p>
+            <a:pPr marL="216000" indent="-216000">
+              <a:lnSpc>
+                <a:spcPct val="100000"/>
+              </a:lnSpc>
+              <a:buClr>
+                <a:srgbClr val="000000"/>
+              </a:buClr>
+              <a:buSzPct val="45000"/>
+              <a:buFont typeface="Wingdings" charset="2"/>
+              <a:buChar char=""/>
+            </a:pPr>
+            <a:r>
+              <a:rPr lang="nl-NL" sz="3500" b="1" strike="noStrike" spc="-1">
+                <a:solidFill>
+                  <a:srgbClr val="000000"/>
+                </a:solidFill>
+                <a:uFill>
+                  <a:solidFill>
+                    <a:srgbClr val="FFFFFF"/>
+                  </a:solidFill>
+                </a:uFill>
+                <a:latin typeface="Corbel"/>
+              </a:rPr>
+              <a:t>Open data</a:t>
+            </a:r>
+            <a:endParaRPr lang="nl-NL" sz="1800" b="0" strike="noStrike" spc="-1">
+              <a:solidFill>
+                <a:srgbClr val="000000"/>
+              </a:solidFill>
+              <a:uFill>
+                <a:solidFill>
+                  <a:srgbClr val="FFFFFF"/>
+                </a:solidFill>
+              </a:uFill>
+              <a:latin typeface="Arial"/>
+            </a:endParaRPr>
+          </a:p>
+          <a:p>
+            <a:pPr marL="216000" indent="-216000">
+              <a:lnSpc>
+                <a:spcPct val="100000"/>
+              </a:lnSpc>
+              <a:buClr>
+                <a:srgbClr val="000000"/>
+              </a:buClr>
+              <a:buSzPct val="45000"/>
+              <a:buFont typeface="Wingdings" charset="2"/>
+              <a:buChar char=""/>
+            </a:pPr>
+            <a:r>
+              <a:rPr lang="nl-NL" sz="3500" b="1" strike="noStrike" spc="-1">
+                <a:solidFill>
+                  <a:srgbClr val="000000"/>
+                </a:solidFill>
+                <a:uFill>
+                  <a:solidFill>
+                    <a:srgbClr val="FFFFFF"/>
+                  </a:solidFill>
+                </a:uFill>
+                <a:latin typeface="Corbel"/>
+              </a:rPr>
+              <a:t>Big data</a:t>
+            </a:r>
+            <a:endParaRPr lang="nl-NL" sz="1800" b="0" strike="noStrike" spc="-1">
+              <a:solidFill>
+                <a:srgbClr val="000000"/>
+              </a:solidFill>
+              <a:uFill>
+                <a:solidFill>
+                  <a:srgbClr val="FFFFFF"/>
+                </a:solidFill>
+              </a:uFill>
+              <a:latin typeface="Arial"/>
+            </a:endParaRPr>
+          </a:p>
+          <a:p>
+            <a:pPr>
+              <a:lnSpc>
+                <a:spcPct val="100000"/>
+              </a:lnSpc>
+            </a:pPr>
+            <a:endParaRPr lang="nl-NL" sz="1800" b="0" strike="noStrike" spc="-1">
+              <a:solidFill>
+                <a:srgbClr val="000000"/>
+              </a:solidFill>
+              <a:uFill>
+                <a:solidFill>
+                  <a:srgbClr val="FFFFFF"/>
+                </a:solidFill>
+              </a:uFill>
+              <a:latin typeface="Arial"/>
+            </a:endParaRPr>
+          </a:p>
         </p:txBody>
       </p:sp>
       <p:sp>
         <p:nvSpPr>
-          <p:cNvPr id="125" name="CustomShape 2"/>
+          <p:cNvPr id="120" name="CustomShape 2"/>
           <p:cNvSpPr/>
           <p:nvPr/>
         </p:nvSpPr>
         <p:spPr>
           <a:xfrm>
-            <a:off x="1432800" y="5589360"/>
-            <a:ext cx="6069240" cy="1097280"/>
+            <a:off x="781560" y="3367440"/>
+            <a:ext cx="7595280" cy="2786400"/>
           </a:xfrm>
           <a:prstGeom prst="rect">
             <a:avLst/>
@@ -12285,133 +11810,7 @@
           </a:effectRef>
           <a:fontRef idx="minor"/>
         </p:style>
-        <p:txBody>
-          <a:bodyPr wrap="none" lIns="0" tIns="0" rIns="0" bIns="0"/>
-          <a:lstStyle/>
-          <a:p>
-            <a:pPr>
-              <a:lnSpc>
-                <a:spcPct val="100000"/>
-              </a:lnSpc>
-            </a:pPr>
-            <a:r>
-              <a:rPr lang="nl-NL" sz="1800" b="0" strike="noStrike" spc="-1">
-                <a:solidFill>
-                  <a:srgbClr val="000000"/>
-                </a:solidFill>
-                <a:uFill>
-                  <a:solidFill>
-                    <a:srgbClr val="FFFFFF"/>
-                  </a:solidFill>
-                </a:uFill>
-                <a:latin typeface="Corbel"/>
-                <a:ea typeface="DejaVu Sans"/>
-              </a:rPr>
-              <a:t>Consent and questionnaire data is gathered digitally trough a (web) app.</a:t>
-            </a:r>
-            <a:endParaRPr lang="nl-NL" sz="1800" b="0" strike="noStrike" spc="-1">
-              <a:solidFill>
-                <a:srgbClr val="000000"/>
-              </a:solidFill>
-              <a:uFill>
-                <a:solidFill>
-                  <a:srgbClr val="FFFFFF"/>
-                </a:solidFill>
-              </a:uFill>
-              <a:latin typeface="Arial"/>
-            </a:endParaRPr>
-          </a:p>
-          <a:p>
-            <a:pPr>
-              <a:lnSpc>
-                <a:spcPct val="100000"/>
-              </a:lnSpc>
-            </a:pPr>
-            <a:r>
-              <a:rPr lang="nl-NL" sz="1800" b="0" strike="noStrike" spc="-1">
-                <a:solidFill>
-                  <a:srgbClr val="000000"/>
-                </a:solidFill>
-                <a:uFill>
-                  <a:solidFill>
-                    <a:srgbClr val="FFFFFF"/>
-                  </a:solidFill>
-                </a:uFill>
-                <a:latin typeface="Corbel"/>
-                <a:ea typeface="DejaVu Sans"/>
-              </a:rPr>
-              <a:t>Data is never stored on any accessible (network) drive, but in a secure database.</a:t>
-            </a:r>
-            <a:endParaRPr lang="nl-NL" sz="1800" b="0" strike="noStrike" spc="-1">
-              <a:solidFill>
-                <a:srgbClr val="000000"/>
-              </a:solidFill>
-              <a:uFill>
-                <a:solidFill>
-                  <a:srgbClr val="FFFFFF"/>
-                </a:solidFill>
-              </a:uFill>
-              <a:latin typeface="Arial"/>
-            </a:endParaRPr>
-          </a:p>
-          <a:p>
-            <a:pPr>
-              <a:lnSpc>
-                <a:spcPct val="100000"/>
-              </a:lnSpc>
-            </a:pPr>
-            <a:r>
-              <a:rPr lang="nl-NL" sz="1800" b="0" strike="noStrike" spc="-1">
-                <a:solidFill>
-                  <a:srgbClr val="000000"/>
-                </a:solidFill>
-                <a:uFill>
-                  <a:solidFill>
-                    <a:srgbClr val="FFFFFF"/>
-                  </a:solidFill>
-                </a:uFill>
-                <a:latin typeface="Corbel"/>
-                <a:ea typeface="DejaVu Sans"/>
-              </a:rPr>
-              <a:t>Anonimized data is made available to the researchers in a secure environment.</a:t>
-            </a:r>
-            <a:endParaRPr lang="nl-NL" sz="1800" b="0" strike="noStrike" spc="-1">
-              <a:solidFill>
-                <a:srgbClr val="000000"/>
-              </a:solidFill>
-              <a:uFill>
-                <a:solidFill>
-                  <a:srgbClr val="FFFFFF"/>
-                </a:solidFill>
-              </a:uFill>
-              <a:latin typeface="Arial"/>
-            </a:endParaRPr>
-          </a:p>
-        </p:txBody>
-      </p:sp>
-      <p:pic>
-        <p:nvPicPr>
-          <p:cNvPr id="126" name="Afbeelding 125"/>
-          <p:cNvPicPr/>
-          <p:nvPr/>
-        </p:nvPicPr>
-        <p:blipFill>
-          <a:blip r:embed="rId3"/>
-          <a:stretch/>
-        </p:blipFill>
-        <p:spPr>
-          <a:xfrm>
-            <a:off x="909000" y="792000"/>
-            <a:ext cx="7515000" cy="4885920"/>
-          </a:xfrm>
-          <a:prstGeom prst="rect">
-            <a:avLst/>
-          </a:prstGeom>
-          <a:ln>
-            <a:noFill/>
-          </a:ln>
-        </p:spPr>
-      </p:pic>
+      </p:sp>
     </p:spTree>
   </p:cSld>
   <p:clrMapOvr>

</xml_diff>